<commit_message>
started working on adding game tree
</commit_message>
<xml_diff>
--- a/Presentations/FinalPresentation.pptx
+++ b/Presentations/FinalPresentation.pptx
@@ -2,7 +2,7 @@
 <file path=ppt/presentation.xml><?xml version="1.0" encoding="utf-8"?>
 <p:presentation xmlns:a="http://schemas.openxmlformats.org/drawingml/2006/main" xmlns:r="http://schemas.openxmlformats.org/officeDocument/2006/relationships" xmlns:p="http://schemas.openxmlformats.org/presentationml/2006/main" autoCompressPictures="0">
   <p:sldMasterIdLst>
-    <p:sldMasterId id="2147483648" r:id="rId1"/>
+    <p:sldMasterId id="2147483736" r:id="rId1"/>
   </p:sldMasterIdLst>
   <p:sldIdLst>
     <p:sldId id="256" r:id="rId2"/>
@@ -11,16 +11,18 @@
     <p:sldId id="268" r:id="rId5"/>
     <p:sldId id="269" r:id="rId6"/>
     <p:sldId id="257" r:id="rId7"/>
-    <p:sldId id="258" r:id="rId8"/>
-    <p:sldId id="259" r:id="rId9"/>
-    <p:sldId id="261" r:id="rId10"/>
-    <p:sldId id="265" r:id="rId11"/>
-    <p:sldId id="270" r:id="rId12"/>
-    <p:sldId id="271" r:id="rId13"/>
-    <p:sldId id="272" r:id="rId14"/>
-    <p:sldId id="262" r:id="rId15"/>
-    <p:sldId id="263" r:id="rId16"/>
-    <p:sldId id="264" r:id="rId17"/>
+    <p:sldId id="274" r:id="rId8"/>
+    <p:sldId id="258" r:id="rId9"/>
+    <p:sldId id="259" r:id="rId10"/>
+    <p:sldId id="261" r:id="rId11"/>
+    <p:sldId id="265" r:id="rId12"/>
+    <p:sldId id="270" r:id="rId13"/>
+    <p:sldId id="271" r:id="rId14"/>
+    <p:sldId id="272" r:id="rId15"/>
+    <p:sldId id="262" r:id="rId16"/>
+    <p:sldId id="273" r:id="rId17"/>
+    <p:sldId id="263" r:id="rId18"/>
+    <p:sldId id="264" r:id="rId19"/>
   </p:sldIdLst>
   <p:sldSz cx="12192000" cy="6858000"/>
   <p:notesSz cx="6858000" cy="9144000"/>
@@ -146,7 +148,7 @@
       </p:grpSpPr>
       <p:grpSp>
         <p:nvGrpSpPr>
-          <p:cNvPr id="7" name="Group 6"/>
+          <p:cNvPr id="16" name="Group 15"/>
           <p:cNvGrpSpPr/>
           <p:nvPr/>
         </p:nvGrpSpPr>
@@ -158,9 +160,72 @@
             <a:chExt cx="12192000" cy="6866467"/>
           </a:xfrm>
         </p:grpSpPr>
+        <p:sp>
+          <p:nvSpPr>
+            <p:cNvPr id="15" name="Freeform 14"/>
+            <p:cNvSpPr/>
+            <p:nvPr/>
+          </p:nvSpPr>
+          <p:spPr>
+            <a:xfrm>
+              <a:off x="0" y="-7862"/>
+              <a:ext cx="863600" cy="5698067"/>
+            </a:xfrm>
+            <a:custGeom>
+              <a:avLst/>
+              <a:gdLst/>
+              <a:ahLst/>
+              <a:cxnLst/>
+              <a:rect l="l" t="t" r="r" b="b"/>
+              <a:pathLst>
+                <a:path w="863600" h="5698067">
+                  <a:moveTo>
+                    <a:pt x="0" y="8467"/>
+                  </a:moveTo>
+                  <a:lnTo>
+                    <a:pt x="863600" y="0"/>
+                  </a:lnTo>
+                  <a:lnTo>
+                    <a:pt x="863600" y="16934"/>
+                  </a:lnTo>
+                  <a:lnTo>
+                    <a:pt x="0" y="5698067"/>
+                  </a:lnTo>
+                  <a:lnTo>
+                    <a:pt x="0" y="8467"/>
+                  </a:lnTo>
+                  <a:close/>
+                </a:path>
+              </a:pathLst>
+            </a:custGeom>
+            <a:solidFill>
+              <a:schemeClr val="accent1">
+                <a:alpha val="70000"/>
+              </a:schemeClr>
+            </a:solidFill>
+            <a:ln>
+              <a:noFill/>
+            </a:ln>
+            <a:effectLst/>
+          </p:spPr>
+          <p:style>
+            <a:lnRef idx="1">
+              <a:schemeClr val="accent1"/>
+            </a:lnRef>
+            <a:fillRef idx="3">
+              <a:schemeClr val="accent1"/>
+            </a:fillRef>
+            <a:effectRef idx="2">
+              <a:schemeClr val="accent1"/>
+            </a:effectRef>
+            <a:fontRef idx="minor">
+              <a:schemeClr val="lt1"/>
+            </a:fontRef>
+          </p:style>
+        </p:sp>
         <p:cxnSp>
           <p:nvCxnSpPr>
-            <p:cNvPr id="32" name="Straight Connector 31"/>
+            <p:cNvPr id="19" name="Straight Connector 18"/>
             <p:cNvCxnSpPr/>
             <p:nvPr/>
           </p:nvCxnSpPr>
@@ -174,8 +239,8 @@
             </a:prstGeom>
             <a:ln w="9525">
               <a:solidFill>
-                <a:schemeClr val="bg1">
-                  <a:lumMod val="75000"/>
+                <a:schemeClr val="accent1">
+                  <a:alpha val="70000"/>
                 </a:schemeClr>
               </a:solidFill>
             </a:ln>
@@ -197,7 +262,7 @@
         </p:cxnSp>
         <p:cxnSp>
           <p:nvCxnSpPr>
-            <p:cNvPr id="21" name="Straight Connector 20"/>
+            <p:cNvPr id="20" name="Straight Connector 19"/>
             <p:cNvCxnSpPr/>
             <p:nvPr/>
           </p:nvCxnSpPr>
@@ -211,8 +276,8 @@
             </a:prstGeom>
             <a:ln w="9525">
               <a:solidFill>
-                <a:schemeClr val="bg1">
-                  <a:lumMod val="85000"/>
+                <a:schemeClr val="accent1">
+                  <a:alpha val="70000"/>
                 </a:schemeClr>
               </a:solidFill>
             </a:ln>
@@ -234,7 +299,7 @@
         </p:cxnSp>
         <p:sp>
           <p:nvSpPr>
-            <p:cNvPr id="24" name="Rectangle 23"/>
+            <p:cNvPr id="21" name="Rectangle 23"/>
             <p:cNvSpPr/>
             <p:nvPr/>
           </p:nvSpPr>
@@ -272,7 +337,7 @@
             </a:custGeom>
             <a:solidFill>
               <a:schemeClr val="accent1">
-                <a:alpha val="30000"/>
+                <a:alpha val="36000"/>
               </a:schemeClr>
             </a:solidFill>
             <a:ln>
@@ -297,7 +362,7 @@
         </p:sp>
         <p:sp>
           <p:nvSpPr>
-            <p:cNvPr id="26" name="Rectangle 25"/>
+            <p:cNvPr id="22" name="Rectangle 25"/>
             <p:cNvSpPr/>
             <p:nvPr/>
           </p:nvSpPr>
@@ -360,7 +425,7 @@
         </p:sp>
         <p:sp>
           <p:nvSpPr>
-            <p:cNvPr id="27" name="Isosceles Triangle 26"/>
+            <p:cNvPr id="23" name="Isosceles Triangle 22"/>
             <p:cNvSpPr/>
             <p:nvPr/>
           </p:nvSpPr>
@@ -375,8 +440,9 @@
               </a:avLst>
             </a:prstGeom>
             <a:solidFill>
-              <a:schemeClr val="accent2">
-                <a:alpha val="72000"/>
+              <a:schemeClr val="accent1">
+                <a:lumMod val="75000"/>
+                <a:alpha val="66000"/>
               </a:schemeClr>
             </a:solidFill>
             <a:ln>
@@ -401,7 +467,7 @@
         </p:sp>
         <p:sp>
           <p:nvSpPr>
-            <p:cNvPr id="28" name="Rectangle 27"/>
+            <p:cNvPr id="24" name="Rectangle 27"/>
             <p:cNvSpPr/>
             <p:nvPr/>
           </p:nvSpPr>
@@ -438,9 +504,9 @@
               </a:pathLst>
             </a:custGeom>
             <a:solidFill>
-              <a:schemeClr val="accent2">
+              <a:schemeClr val="accent1">
                 <a:lumMod val="75000"/>
-                <a:alpha val="70000"/>
+                <a:alpha val="50000"/>
               </a:schemeClr>
             </a:solidFill>
             <a:ln>
@@ -465,7 +531,7 @@
         </p:sp>
         <p:sp>
           <p:nvSpPr>
-            <p:cNvPr id="29" name="Rectangle 28"/>
+            <p:cNvPr id="25" name="Rectangle 28"/>
             <p:cNvSpPr/>
             <p:nvPr/>
           </p:nvSpPr>
@@ -502,9 +568,7 @@
               </a:pathLst>
             </a:custGeom>
             <a:solidFill>
-              <a:schemeClr val="accent1">
-                <a:lumMod val="60000"/>
-                <a:lumOff val="40000"/>
+              <a:schemeClr val="accent2">
                 <a:alpha val="70000"/>
               </a:schemeClr>
             </a:solidFill>
@@ -530,7 +594,7 @@
         </p:sp>
         <p:sp>
           <p:nvSpPr>
-            <p:cNvPr id="30" name="Rectangle 29"/>
+            <p:cNvPr id="26" name="Rectangle 29"/>
             <p:cNvSpPr/>
             <p:nvPr/>
           </p:nvSpPr>
@@ -567,48 +631,8 @@
               </a:pathLst>
             </a:custGeom>
             <a:solidFill>
-              <a:schemeClr val="accent1">
-                <a:alpha val="65000"/>
-              </a:schemeClr>
-            </a:solidFill>
-            <a:ln>
-              <a:noFill/>
-            </a:ln>
-            <a:effectLst/>
-          </p:spPr>
-          <p:style>
-            <a:lnRef idx="1">
-              <a:schemeClr val="accent1"/>
-            </a:lnRef>
-            <a:fillRef idx="3">
-              <a:schemeClr val="accent1"/>
-            </a:fillRef>
-            <a:effectRef idx="2">
-              <a:schemeClr val="accent1"/>
-            </a:effectRef>
-            <a:fontRef idx="minor">
-              <a:schemeClr val="lt1"/>
-            </a:fontRef>
-          </p:style>
-        </p:sp>
-        <p:sp>
-          <p:nvSpPr>
-            <p:cNvPr id="31" name="Isosceles Triangle 30"/>
-            <p:cNvSpPr/>
-            <p:nvPr/>
-          </p:nvSpPr>
-          <p:spPr>
-            <a:xfrm>
-              <a:off x="10371666" y="3589867"/>
-              <a:ext cx="1817159" cy="3268133"/>
-            </a:xfrm>
-            <a:prstGeom prst="triangle">
-              <a:avLst>
-                <a:gd name="adj" fmla="val 100000"/>
-              </a:avLst>
-            </a:prstGeom>
-            <a:solidFill>
-              <a:schemeClr val="accent1">
+              <a:schemeClr val="accent2">
+                <a:lumMod val="75000"/>
                 <a:alpha val="80000"/>
               </a:schemeClr>
             </a:solidFill>
@@ -634,14 +658,14 @@
         </p:sp>
         <p:sp>
           <p:nvSpPr>
-            <p:cNvPr id="19" name="Isosceles Triangle 18"/>
+            <p:cNvPr id="27" name="Isosceles Triangle 26"/>
             <p:cNvSpPr/>
             <p:nvPr/>
           </p:nvSpPr>
           <p:spPr>
-            <a:xfrm rot="10800000">
-              <a:off x="0" y="0"/>
-              <a:ext cx="842596" cy="5666154"/>
+            <a:xfrm>
+              <a:off x="10371666" y="3589867"/>
+              <a:ext cx="1817159" cy="3268133"/>
             </a:xfrm>
             <a:prstGeom prst="triangle">
               <a:avLst>
@@ -650,7 +674,8 @@
             </a:prstGeom>
             <a:solidFill>
               <a:schemeClr val="accent1">
-                <a:alpha val="85000"/>
+                <a:lumMod val="75000"/>
+                <a:alpha val="66000"/>
               </a:schemeClr>
             </a:solidFill>
             <a:ln>
@@ -848,9 +873,9 @@
           <a:lstStyle/>
           <a:p>
             <a:fld id="{B61BEF0D-F0BB-DE4B-95CE-6DB70DBA9567}" type="datetimeFigureOut">
-              <a:rPr lang="en-US" dirty="0"/>
+              <a:rPr lang="en-US" smtClean="0"/>
               <a:pPr/>
-              <a:t>4/30/2018</a:t>
+              <a:t>5/1/2018</a:t>
             </a:fld>
             <a:endParaRPr lang="en-US" dirty="0"/>
           </a:p>
@@ -891,7 +916,7 @@
           <a:lstStyle/>
           <a:p>
             <a:fld id="{D57F1E4F-1CFF-5643-939E-217C01CDF565}" type="slidenum">
-              <a:rPr lang="en-US" dirty="0"/>
+              <a:rPr lang="en-US" smtClean="0"/>
               <a:pPr/>
               <a:t>‹#›</a:t>
             </a:fld>
@@ -900,6 +925,11 @@
         </p:txBody>
       </p:sp>
     </p:spTree>
+    <p:extLst>
+      <p:ext uri="{BB962C8B-B14F-4D97-AF65-F5344CB8AC3E}">
+        <p14:creationId xmlns:p14="http://schemas.microsoft.com/office/powerpoint/2010/main" val="617533385"/>
+      </p:ext>
+    </p:extLst>
   </p:cSld>
   <p:clrMapOvr>
     <a:masterClrMapping/>
@@ -1096,9 +1126,9 @@
           <a:lstStyle/>
           <a:p>
             <a:fld id="{B61BEF0D-F0BB-DE4B-95CE-6DB70DBA9567}" type="datetimeFigureOut">
-              <a:rPr lang="en-US" dirty="0"/>
+              <a:rPr lang="en-US" smtClean="0"/>
               <a:pPr/>
-              <a:t>4/30/2018</a:t>
+              <a:t>5/1/2018</a:t>
             </a:fld>
             <a:endParaRPr lang="en-US" dirty="0"/>
           </a:p>
@@ -1139,7 +1169,7 @@
           <a:lstStyle/>
           <a:p>
             <a:fld id="{D57F1E4F-1CFF-5643-939E-217C01CDF565}" type="slidenum">
-              <a:rPr lang="en-US" dirty="0"/>
+              <a:rPr lang="en-US" smtClean="0"/>
               <a:pPr/>
               <a:t>‹#›</a:t>
             </a:fld>
@@ -1148,6 +1178,11 @@
         </p:txBody>
       </p:sp>
     </p:spTree>
+    <p:extLst>
+      <p:ext uri="{BB962C8B-B14F-4D97-AF65-F5344CB8AC3E}">
+        <p14:creationId xmlns:p14="http://schemas.microsoft.com/office/powerpoint/2010/main" val="2761649848"/>
+      </p:ext>
+    </p:extLst>
   </p:cSld>
   <p:clrMapOvr>
     <a:masterClrMapping/>
@@ -1407,9 +1442,9 @@
           <a:lstStyle/>
           <a:p>
             <a:fld id="{B61BEF0D-F0BB-DE4B-95CE-6DB70DBA9567}" type="datetimeFigureOut">
-              <a:rPr lang="en-US" dirty="0"/>
+              <a:rPr lang="en-US" smtClean="0"/>
               <a:pPr/>
-              <a:t>4/30/2018</a:t>
+              <a:t>5/1/2018</a:t>
             </a:fld>
             <a:endParaRPr lang="en-US" dirty="0"/>
           </a:p>
@@ -1450,7 +1485,7 @@
           <a:lstStyle/>
           <a:p>
             <a:fld id="{D57F1E4F-1CFF-5643-939E-217C01CDF565}" type="slidenum">
-              <a:rPr lang="en-US" dirty="0"/>
+              <a:rPr lang="en-US" smtClean="0"/>
               <a:pPr/>
               <a:t>‹#›</a:t>
             </a:fld>
@@ -1460,7 +1495,7 @@
       </p:sp>
       <p:sp>
         <p:nvSpPr>
-          <p:cNvPr id="20" name="TextBox 19"/>
+          <p:cNvPr id="24" name="TextBox 23"/>
           <p:cNvSpPr txBox="1"/>
           <p:nvPr/>
         </p:nvSpPr>
@@ -1501,7 +1536,7 @@
       </p:sp>
       <p:sp>
         <p:nvSpPr>
-          <p:cNvPr id="22" name="TextBox 21"/>
+          <p:cNvPr id="25" name="TextBox 24"/>
           <p:cNvSpPr txBox="1"/>
           <p:nvPr/>
         </p:nvSpPr>
@@ -1532,23 +1567,20 @@
                     <a:lumOff val="40000"/>
                   </a:schemeClr>
                 </a:solidFill>
+                <a:effectLst/>
                 <a:latin typeface="Arial"/>
               </a:rPr>
               <a:t>”</a:t>
             </a:r>
-            <a:endParaRPr lang="en-US" dirty="0">
-              <a:solidFill>
-                <a:schemeClr val="accent1">
-                  <a:lumMod val="60000"/>
-                  <a:lumOff val="40000"/>
-                </a:schemeClr>
-              </a:solidFill>
-              <a:latin typeface="Arial"/>
-            </a:endParaRPr>
           </a:p>
         </p:txBody>
       </p:sp>
     </p:spTree>
+    <p:extLst>
+      <p:ext uri="{BB962C8B-B14F-4D97-AF65-F5344CB8AC3E}">
+        <p14:creationId xmlns:p14="http://schemas.microsoft.com/office/powerpoint/2010/main" val="1788211959"/>
+      </p:ext>
+    </p:extLst>
   </p:cSld>
   <p:clrMapOvr>
     <a:masterClrMapping/>
@@ -1745,9 +1777,9 @@
           <a:lstStyle/>
           <a:p>
             <a:fld id="{B61BEF0D-F0BB-DE4B-95CE-6DB70DBA9567}" type="datetimeFigureOut">
-              <a:rPr lang="en-US" dirty="0"/>
+              <a:rPr lang="en-US" smtClean="0"/>
               <a:pPr/>
-              <a:t>4/30/2018</a:t>
+              <a:t>5/1/2018</a:t>
             </a:fld>
             <a:endParaRPr lang="en-US" dirty="0"/>
           </a:p>
@@ -1788,7 +1820,7 @@
           <a:lstStyle/>
           <a:p>
             <a:fld id="{D57F1E4F-1CFF-5643-939E-217C01CDF565}" type="slidenum">
-              <a:rPr lang="en-US" dirty="0"/>
+              <a:rPr lang="en-US" smtClean="0"/>
               <a:pPr/>
               <a:t>‹#›</a:t>
             </a:fld>
@@ -1797,6 +1829,11 @@
         </p:txBody>
       </p:sp>
     </p:spTree>
+    <p:extLst>
+      <p:ext uri="{BB962C8B-B14F-4D97-AF65-F5344CB8AC3E}">
+        <p14:creationId xmlns:p14="http://schemas.microsoft.com/office/powerpoint/2010/main" val="2838606903"/>
+      </p:ext>
+    </p:extLst>
   </p:cSld>
   <p:clrMapOvr>
     <a:masterClrMapping/>
@@ -2056,9 +2093,9 @@
           <a:lstStyle/>
           <a:p>
             <a:fld id="{B61BEF0D-F0BB-DE4B-95CE-6DB70DBA9567}" type="datetimeFigureOut">
-              <a:rPr lang="en-US" dirty="0"/>
+              <a:rPr lang="en-US" smtClean="0"/>
               <a:pPr/>
-              <a:t>4/30/2018</a:t>
+              <a:t>5/1/2018</a:t>
             </a:fld>
             <a:endParaRPr lang="en-US" dirty="0"/>
           </a:p>
@@ -2099,7 +2136,7 @@
           <a:lstStyle/>
           <a:p>
             <a:fld id="{D57F1E4F-1CFF-5643-939E-217C01CDF565}" type="slidenum">
-              <a:rPr lang="en-US" dirty="0"/>
+              <a:rPr lang="en-US" smtClean="0"/>
               <a:pPr/>
               <a:t>‹#›</a:t>
             </a:fld>
@@ -2190,6 +2227,11 @@
         </p:txBody>
       </p:sp>
     </p:spTree>
+    <p:extLst>
+      <p:ext uri="{BB962C8B-B14F-4D97-AF65-F5344CB8AC3E}">
+        <p14:creationId xmlns:p14="http://schemas.microsoft.com/office/powerpoint/2010/main" val="3786734375"/>
+      </p:ext>
+    </p:extLst>
   </p:cSld>
   <p:clrMapOvr>
     <a:masterClrMapping/>
@@ -2446,9 +2488,9 @@
           <a:lstStyle/>
           <a:p>
             <a:fld id="{B61BEF0D-F0BB-DE4B-95CE-6DB70DBA9567}" type="datetimeFigureOut">
-              <a:rPr lang="en-US" dirty="0"/>
+              <a:rPr lang="en-US" smtClean="0"/>
               <a:pPr/>
-              <a:t>4/30/2018</a:t>
+              <a:t>5/1/2018</a:t>
             </a:fld>
             <a:endParaRPr lang="en-US" dirty="0"/>
           </a:p>
@@ -2489,7 +2531,7 @@
           <a:lstStyle/>
           <a:p>
             <a:fld id="{D57F1E4F-1CFF-5643-939E-217C01CDF565}" type="slidenum">
-              <a:rPr lang="en-US" dirty="0"/>
+              <a:rPr lang="en-US" smtClean="0"/>
               <a:pPr/>
               <a:t>‹#›</a:t>
             </a:fld>
@@ -2498,6 +2540,11 @@
         </p:txBody>
       </p:sp>
     </p:spTree>
+    <p:extLst>
+      <p:ext uri="{BB962C8B-B14F-4D97-AF65-F5344CB8AC3E}">
+        <p14:creationId xmlns:p14="http://schemas.microsoft.com/office/powerpoint/2010/main" val="2544664954"/>
+      </p:ext>
+    </p:extLst>
   </p:cSld>
   <p:clrMapOvr>
     <a:masterClrMapping/>
@@ -2613,8 +2660,8 @@
           <a:lstStyle/>
           <a:p>
             <a:fld id="{55C6B4A9-1611-4792-9094-5F34BCA07E0B}" type="datetimeFigureOut">
-              <a:rPr lang="en-US" dirty="0"/>
-              <a:t>4/30/2018</a:t>
+              <a:rPr lang="en-US" smtClean="0"/>
+              <a:t>5/1/2018</a:t>
             </a:fld>
             <a:endParaRPr lang="en-US" dirty="0"/>
           </a:p>
@@ -2655,7 +2702,7 @@
           <a:lstStyle/>
           <a:p>
             <a:fld id="{89333C77-0158-454C-844F-B7AB9BD7DAD4}" type="slidenum">
-              <a:rPr lang="en-US" dirty="0"/>
+              <a:rPr lang="en-US" smtClean="0"/>
               <a:t>‹#›</a:t>
             </a:fld>
             <a:endParaRPr lang="en-US" dirty="0"/>
@@ -2663,6 +2710,11 @@
         </p:txBody>
       </p:sp>
     </p:spTree>
+    <p:extLst>
+      <p:ext uri="{BB962C8B-B14F-4D97-AF65-F5344CB8AC3E}">
+        <p14:creationId xmlns:p14="http://schemas.microsoft.com/office/powerpoint/2010/main" val="2446212456"/>
+      </p:ext>
+    </p:extLst>
   </p:cSld>
   <p:clrMapOvr>
     <a:masterClrMapping/>
@@ -2788,9 +2840,9 @@
           <a:lstStyle/>
           <a:p>
             <a:fld id="{B61BEF0D-F0BB-DE4B-95CE-6DB70DBA9567}" type="datetimeFigureOut">
-              <a:rPr lang="en-US" dirty="0"/>
+              <a:rPr lang="en-US" smtClean="0"/>
               <a:pPr/>
-              <a:t>4/30/2018</a:t>
+              <a:t>5/1/2018</a:t>
             </a:fld>
             <a:endParaRPr lang="en-US" dirty="0"/>
           </a:p>
@@ -2831,7 +2883,7 @@
           <a:lstStyle/>
           <a:p>
             <a:fld id="{D57F1E4F-1CFF-5643-939E-217C01CDF565}" type="slidenum">
-              <a:rPr lang="en-US" dirty="0"/>
+              <a:rPr lang="en-US" smtClean="0"/>
               <a:pPr/>
               <a:t>‹#›</a:t>
             </a:fld>
@@ -2840,6 +2892,11 @@
         </p:txBody>
       </p:sp>
     </p:spTree>
+    <p:extLst>
+      <p:ext uri="{BB962C8B-B14F-4D97-AF65-F5344CB8AC3E}">
+        <p14:creationId xmlns:p14="http://schemas.microsoft.com/office/powerpoint/2010/main" val="1650758145"/>
+      </p:ext>
+    </p:extLst>
   </p:cSld>
   <p:clrMapOvr>
     <a:masterClrMapping/>
@@ -2876,14 +2933,8 @@
         </p:nvSpPr>
         <p:spPr/>
         <p:txBody>
-          <a:bodyPr>
-            <a:normAutofit/>
-          </a:bodyPr>
-          <a:lstStyle>
-            <a:lvl1pPr>
-              <a:defRPr sz="3600"/>
-            </a:lvl1pPr>
-          </a:lstStyle>
+          <a:bodyPr/>
+          <a:lstStyle/>
           <a:p>
             <a:r>
               <a:rPr lang="en-US"/>
@@ -2961,9 +3012,9 @@
           <a:lstStyle/>
           <a:p>
             <a:fld id="{B61BEF0D-F0BB-DE4B-95CE-6DB70DBA9567}" type="datetimeFigureOut">
-              <a:rPr lang="en-US" dirty="0"/>
+              <a:rPr lang="en-US" smtClean="0"/>
               <a:pPr/>
-              <a:t>4/30/2018</a:t>
+              <a:t>5/1/2018</a:t>
             </a:fld>
             <a:endParaRPr lang="en-US" dirty="0"/>
           </a:p>
@@ -3004,7 +3055,7 @@
           <a:lstStyle/>
           <a:p>
             <a:fld id="{D57F1E4F-1CFF-5643-939E-217C01CDF565}" type="slidenum">
-              <a:rPr lang="en-US" dirty="0"/>
+              <a:rPr lang="en-US" smtClean="0"/>
               <a:pPr/>
               <a:t>‹#›</a:t>
             </a:fld>
@@ -3013,6 +3064,11 @@
         </p:txBody>
       </p:sp>
     </p:spTree>
+    <p:extLst>
+      <p:ext uri="{BB962C8B-B14F-4D97-AF65-F5344CB8AC3E}">
+        <p14:creationId xmlns:p14="http://schemas.microsoft.com/office/powerpoint/2010/main" val="3659215301"/>
+      </p:ext>
+    </p:extLst>
   </p:cSld>
   <p:clrMapOvr>
     <a:masterClrMapping/>
@@ -3205,9 +3261,9 @@
           <a:lstStyle/>
           <a:p>
             <a:fld id="{B61BEF0D-F0BB-DE4B-95CE-6DB70DBA9567}" type="datetimeFigureOut">
-              <a:rPr lang="en-US" dirty="0"/>
+              <a:rPr lang="en-US" smtClean="0"/>
               <a:pPr/>
-              <a:t>4/30/2018</a:t>
+              <a:t>5/1/2018</a:t>
             </a:fld>
             <a:endParaRPr lang="en-US" dirty="0"/>
           </a:p>
@@ -3248,7 +3304,7 @@
           <a:lstStyle/>
           <a:p>
             <a:fld id="{D57F1E4F-1CFF-5643-939E-217C01CDF565}" type="slidenum">
-              <a:rPr lang="en-US" dirty="0"/>
+              <a:rPr lang="en-US" smtClean="0"/>
               <a:pPr/>
               <a:t>‹#›</a:t>
             </a:fld>
@@ -3257,6 +3313,11 @@
         </p:txBody>
       </p:sp>
     </p:spTree>
+    <p:extLst>
+      <p:ext uri="{BB962C8B-B14F-4D97-AF65-F5344CB8AC3E}">
+        <p14:creationId xmlns:p14="http://schemas.microsoft.com/office/powerpoint/2010/main" val="100978691"/>
+      </p:ext>
+    </p:extLst>
   </p:cSld>
   <p:clrMapOvr>
     <a:masterClrMapping/>
@@ -3434,8 +3495,8 @@
           <a:lstStyle/>
           <a:p>
             <a:fld id="{EB712588-04B1-427B-82EE-E8DB90309F08}" type="datetimeFigureOut">
-              <a:rPr lang="en-US" dirty="0"/>
-              <a:t>4/30/2018</a:t>
+              <a:rPr lang="en-US" smtClean="0"/>
+              <a:t>5/1/2018</a:t>
             </a:fld>
             <a:endParaRPr lang="en-US" dirty="0"/>
           </a:p>
@@ -3476,7 +3537,7 @@
           <a:lstStyle/>
           <a:p>
             <a:fld id="{6FF9F0C5-380F-41C2-899A-BAC0F0927E16}" type="slidenum">
-              <a:rPr lang="en-US" dirty="0"/>
+              <a:rPr lang="en-US" smtClean="0"/>
               <a:t>‹#›</a:t>
             </a:fld>
             <a:endParaRPr lang="en-US" dirty="0"/>
@@ -3484,6 +3545,11 @@
         </p:txBody>
       </p:sp>
     </p:spTree>
+    <p:extLst>
+      <p:ext uri="{BB962C8B-B14F-4D97-AF65-F5344CB8AC3E}">
+        <p14:creationId xmlns:p14="http://schemas.microsoft.com/office/powerpoint/2010/main" val="2509540489"/>
+      </p:ext>
+    </p:extLst>
   </p:cSld>
   <p:clrMapOvr>
     <a:masterClrMapping/>
@@ -3803,9 +3869,9 @@
           <a:lstStyle/>
           <a:p>
             <a:fld id="{B61BEF0D-F0BB-DE4B-95CE-6DB70DBA9567}" type="datetimeFigureOut">
-              <a:rPr lang="en-US" dirty="0"/>
+              <a:rPr lang="en-US" smtClean="0"/>
               <a:pPr/>
-              <a:t>4/30/2018</a:t>
+              <a:t>5/1/2018</a:t>
             </a:fld>
             <a:endParaRPr lang="en-US" dirty="0"/>
           </a:p>
@@ -3846,7 +3912,7 @@
           <a:lstStyle/>
           <a:p>
             <a:fld id="{D57F1E4F-1CFF-5643-939E-217C01CDF565}" type="slidenum">
-              <a:rPr lang="en-US" dirty="0"/>
+              <a:rPr lang="en-US" smtClean="0"/>
               <a:pPr/>
               <a:t>‹#›</a:t>
             </a:fld>
@@ -3855,6 +3921,11 @@
         </p:txBody>
       </p:sp>
     </p:spTree>
+    <p:extLst>
+      <p:ext uri="{BB962C8B-B14F-4D97-AF65-F5344CB8AC3E}">
+        <p14:creationId xmlns:p14="http://schemas.microsoft.com/office/powerpoint/2010/main" val="2780999317"/>
+      </p:ext>
+    </p:extLst>
   </p:cSld>
   <p:clrMapOvr>
     <a:masterClrMapping/>
@@ -3923,9 +3994,9 @@
           <a:lstStyle/>
           <a:p>
             <a:fld id="{B61BEF0D-F0BB-DE4B-95CE-6DB70DBA9567}" type="datetimeFigureOut">
-              <a:rPr lang="en-US" dirty="0"/>
+              <a:rPr lang="en-US" smtClean="0"/>
               <a:pPr/>
-              <a:t>4/30/2018</a:t>
+              <a:t>5/1/2018</a:t>
             </a:fld>
             <a:endParaRPr lang="en-US" dirty="0"/>
           </a:p>
@@ -3966,7 +4037,7 @@
           <a:lstStyle/>
           <a:p>
             <a:fld id="{D57F1E4F-1CFF-5643-939E-217C01CDF565}" type="slidenum">
-              <a:rPr lang="en-US" dirty="0"/>
+              <a:rPr lang="en-US" smtClean="0"/>
               <a:pPr/>
               <a:t>‹#›</a:t>
             </a:fld>
@@ -3975,6 +4046,11 @@
         </p:txBody>
       </p:sp>
     </p:spTree>
+    <p:extLst>
+      <p:ext uri="{BB962C8B-B14F-4D97-AF65-F5344CB8AC3E}">
+        <p14:creationId xmlns:p14="http://schemas.microsoft.com/office/powerpoint/2010/main" val="3980002600"/>
+      </p:ext>
+    </p:extLst>
   </p:cSld>
   <p:clrMapOvr>
     <a:masterClrMapping/>
@@ -4015,9 +4091,9 @@
           <a:lstStyle/>
           <a:p>
             <a:fld id="{B61BEF0D-F0BB-DE4B-95CE-6DB70DBA9567}" type="datetimeFigureOut">
-              <a:rPr lang="en-US" dirty="0"/>
+              <a:rPr lang="en-US" smtClean="0"/>
               <a:pPr/>
-              <a:t>4/30/2018</a:t>
+              <a:t>5/1/2018</a:t>
             </a:fld>
             <a:endParaRPr lang="en-US" dirty="0"/>
           </a:p>
@@ -4058,7 +4134,7 @@
           <a:lstStyle/>
           <a:p>
             <a:fld id="{D57F1E4F-1CFF-5643-939E-217C01CDF565}" type="slidenum">
-              <a:rPr lang="en-US" dirty="0"/>
+              <a:rPr lang="en-US" smtClean="0"/>
               <a:pPr/>
               <a:t>‹#›</a:t>
             </a:fld>
@@ -4067,6 +4143,11 @@
         </p:txBody>
       </p:sp>
     </p:spTree>
+    <p:extLst>
+      <p:ext uri="{BB962C8B-B14F-4D97-AF65-F5344CB8AC3E}">
+        <p14:creationId xmlns:p14="http://schemas.microsoft.com/office/powerpoint/2010/main" val="2836782358"/>
+      </p:ext>
+    </p:extLst>
   </p:cSld>
   <p:clrMapOvr>
     <a:masterClrMapping/>
@@ -4267,8 +4348,8 @@
           <a:lstStyle/>
           <a:p>
             <a:fld id="{42A54C80-263E-416B-A8E0-580EDEADCBDC}" type="datetimeFigureOut">
-              <a:rPr lang="en-US" dirty="0"/>
-              <a:t>4/30/2018</a:t>
+              <a:rPr lang="en-US" smtClean="0"/>
+              <a:t>5/1/2018</a:t>
             </a:fld>
             <a:endParaRPr lang="en-US" dirty="0"/>
           </a:p>
@@ -4309,7 +4390,7 @@
           <a:lstStyle/>
           <a:p>
             <a:fld id="{519954A3-9DFD-4C44-94BA-B95130A3BA1C}" type="slidenum">
-              <a:rPr lang="en-US" dirty="0"/>
+              <a:rPr lang="en-US" smtClean="0"/>
               <a:t>‹#›</a:t>
             </a:fld>
             <a:endParaRPr lang="en-US" dirty="0"/>
@@ -4317,6 +4398,11 @@
         </p:txBody>
       </p:sp>
     </p:spTree>
+    <p:extLst>
+      <p:ext uri="{BB962C8B-B14F-4D97-AF65-F5344CB8AC3E}">
+        <p14:creationId xmlns:p14="http://schemas.microsoft.com/office/powerpoint/2010/main" val="635946743"/>
+      </p:ext>
+    </p:extLst>
   </p:cSld>
   <p:clrMapOvr>
     <a:masterClrMapping/>
@@ -4511,12 +4597,12 @@
       </p:sp>
       <p:sp>
         <p:nvSpPr>
-          <p:cNvPr id="5" name="Date Placeholder 4"/>
-          <p:cNvSpPr>
-            <a:spLocks noGrp="1"/>
-          </p:cNvSpPr>
-          <p:nvPr>
-            <p:ph type="dt" sz="half" idx="10"/>
+          <p:cNvPr id="6" name="Footer Placeholder 5"/>
+          <p:cNvSpPr>
+            <a:spLocks noGrp="1"/>
+          </p:cNvSpPr>
+          <p:nvPr>
+            <p:ph type="ftr" sz="quarter" idx="11"/>
           </p:nvPr>
         </p:nvSpPr>
         <p:spPr/>
@@ -4524,23 +4610,18 @@
           <a:bodyPr/>
           <a:lstStyle/>
           <a:p>
-            <a:fld id="{B61BEF0D-F0BB-DE4B-95CE-6DB70DBA9567}" type="datetimeFigureOut">
-              <a:rPr lang="en-US" dirty="0"/>
-              <a:pPr/>
-              <a:t>4/30/2018</a:t>
-            </a:fld>
             <a:endParaRPr lang="en-US" dirty="0"/>
           </a:p>
         </p:txBody>
       </p:sp>
       <p:sp>
         <p:nvSpPr>
-          <p:cNvPr id="6" name="Footer Placeholder 5"/>
-          <p:cNvSpPr>
-            <a:spLocks noGrp="1"/>
-          </p:cNvSpPr>
-          <p:nvPr>
-            <p:ph type="ftr" sz="quarter" idx="11"/>
+          <p:cNvPr id="7" name="Slide Number Placeholder 6"/>
+          <p:cNvSpPr>
+            <a:spLocks noGrp="1"/>
+          </p:cNvSpPr>
+          <p:nvPr>
+            <p:ph type="sldNum" sz="quarter" idx="12"/>
           </p:nvPr>
         </p:nvSpPr>
         <p:spPr/>
@@ -4548,27 +4629,8 @@
           <a:bodyPr/>
           <a:lstStyle/>
           <a:p>
-            <a:endParaRPr lang="en-US" dirty="0"/>
-          </a:p>
-        </p:txBody>
-      </p:sp>
-      <p:sp>
-        <p:nvSpPr>
-          <p:cNvPr id="7" name="Slide Number Placeholder 6"/>
-          <p:cNvSpPr>
-            <a:spLocks noGrp="1"/>
-          </p:cNvSpPr>
-          <p:nvPr>
-            <p:ph type="sldNum" sz="quarter" idx="12"/>
-          </p:nvPr>
-        </p:nvSpPr>
-        <p:spPr/>
-        <p:txBody>
-          <a:bodyPr/>
-          <a:lstStyle/>
-          <a:p>
             <a:fld id="{D57F1E4F-1CFF-5643-939E-217C01CDF565}" type="slidenum">
-              <a:rPr lang="en-US" dirty="0"/>
+              <a:rPr lang="en-US" smtClean="0"/>
               <a:pPr/>
               <a:t>‹#›</a:t>
             </a:fld>
@@ -4576,7 +4638,36 @@
           </a:p>
         </p:txBody>
       </p:sp>
+      <p:sp>
+        <p:nvSpPr>
+          <p:cNvPr id="5" name="Date Placeholder 4"/>
+          <p:cNvSpPr>
+            <a:spLocks noGrp="1"/>
+          </p:cNvSpPr>
+          <p:nvPr>
+            <p:ph type="dt" sz="half" idx="10"/>
+          </p:nvPr>
+        </p:nvSpPr>
+        <p:spPr/>
+        <p:txBody>
+          <a:bodyPr/>
+          <a:lstStyle/>
+          <a:p>
+            <a:fld id="{B61BEF0D-F0BB-DE4B-95CE-6DB70DBA9567}" type="datetimeFigureOut">
+              <a:rPr lang="en-US" smtClean="0"/>
+              <a:pPr/>
+              <a:t>5/1/2018</a:t>
+            </a:fld>
+            <a:endParaRPr lang="en-US" dirty="0"/>
+          </a:p>
+        </p:txBody>
+      </p:sp>
     </p:spTree>
+    <p:extLst>
+      <p:ext uri="{BB962C8B-B14F-4D97-AF65-F5344CB8AC3E}">
+        <p14:creationId xmlns:p14="http://schemas.microsoft.com/office/powerpoint/2010/main" val="1796794932"/>
+      </p:ext>
+    </p:extLst>
   </p:cSld>
   <p:clrMapOvr>
     <a:masterClrMapping/>
@@ -4608,7 +4699,7 @@
       </p:grpSpPr>
       <p:grpSp>
         <p:nvGrpSpPr>
-          <p:cNvPr id="7" name="Group 6"/>
+          <p:cNvPr id="44" name="Group 43"/>
           <p:cNvGrpSpPr/>
           <p:nvPr/>
         </p:nvGrpSpPr>
@@ -4636,8 +4727,8 @@
             </a:prstGeom>
             <a:ln w="9525">
               <a:solidFill>
-                <a:schemeClr val="bg1">
-                  <a:lumMod val="75000"/>
+                <a:schemeClr val="accent1">
+                  <a:alpha val="70000"/>
                 </a:schemeClr>
               </a:solidFill>
             </a:ln>
@@ -4673,8 +4764,8 @@
             </a:prstGeom>
             <a:ln w="9525">
               <a:solidFill>
-                <a:schemeClr val="bg1">
-                  <a:lumMod val="85000"/>
+                <a:schemeClr val="accent1">
+                  <a:alpha val="70000"/>
                 </a:schemeClr>
               </a:solidFill>
             </a:ln>
@@ -4734,7 +4825,7 @@
             </a:custGeom>
             <a:solidFill>
               <a:schemeClr val="accent1">
-                <a:alpha val="30000"/>
+                <a:alpha val="36000"/>
               </a:schemeClr>
             </a:solidFill>
             <a:ln>
@@ -4837,8 +4928,9 @@
               </a:avLst>
             </a:prstGeom>
             <a:solidFill>
-              <a:schemeClr val="accent2">
-                <a:alpha val="72000"/>
+              <a:schemeClr val="accent1">
+                <a:lumMod val="75000"/>
+                <a:alpha val="66000"/>
               </a:schemeClr>
             </a:solidFill>
             <a:ln>
@@ -4900,9 +4992,9 @@
               </a:pathLst>
             </a:custGeom>
             <a:solidFill>
-              <a:schemeClr val="accent2">
+              <a:schemeClr val="accent1">
                 <a:lumMod val="75000"/>
-                <a:alpha val="70000"/>
+                <a:alpha val="50000"/>
               </a:schemeClr>
             </a:solidFill>
             <a:ln>
@@ -4964,9 +5056,7 @@
               </a:pathLst>
             </a:custGeom>
             <a:solidFill>
-              <a:schemeClr val="accent1">
-                <a:lumMod val="60000"/>
-                <a:lumOff val="40000"/>
+              <a:schemeClr val="accent2">
                 <a:alpha val="70000"/>
               </a:schemeClr>
             </a:solidFill>
@@ -5029,8 +5119,9 @@
               </a:pathLst>
             </a:custGeom>
             <a:solidFill>
-              <a:schemeClr val="accent1">
-                <a:alpha val="65000"/>
+              <a:schemeClr val="accent2">
+                <a:lumMod val="75000"/>
+                <a:alpha val="80000"/>
               </a:schemeClr>
             </a:solidFill>
             <a:ln>
@@ -5071,7 +5162,8 @@
             </a:prstGeom>
             <a:solidFill>
               <a:schemeClr val="accent1">
-                <a:alpha val="80000"/>
+                <a:lumMod val="75000"/>
+                <a:alpha val="66000"/>
               </a:schemeClr>
             </a:solidFill>
             <a:ln>
@@ -5096,7 +5188,7 @@
         </p:sp>
         <p:sp>
           <p:nvSpPr>
-            <p:cNvPr id="29" name="Isosceles Triangle 28"/>
+            <p:cNvPr id="19" name="Isosceles Triangle 18"/>
             <p:cNvSpPr/>
             <p:nvPr/>
           </p:nvSpPr>
@@ -5112,7 +5204,7 @@
             </a:prstGeom>
             <a:solidFill>
               <a:schemeClr val="accent1">
-                <a:alpha val="85000"/>
+                <a:alpha val="70000"/>
               </a:schemeClr>
             </a:solidFill>
             <a:ln>
@@ -5265,9 +5357,9 @@
           </a:lstStyle>
           <a:p>
             <a:fld id="{B61BEF0D-F0BB-DE4B-95CE-6DB70DBA9567}" type="datetimeFigureOut">
-              <a:rPr lang="en-US" dirty="0"/>
+              <a:rPr lang="en-US" smtClean="0"/>
               <a:pPr/>
-              <a:t>4/30/2018</a:t>
+              <a:t>5/1/2018</a:t>
             </a:fld>
             <a:endParaRPr lang="en-US" dirty="0"/>
           </a:p>
@@ -5342,7 +5434,7 @@
           </a:lstStyle>
           <a:p>
             <a:fld id="{D57F1E4F-1CFF-5643-939E-217C01CDF565}" type="slidenum">
-              <a:rPr lang="en-US" dirty="0"/>
+              <a:rPr lang="en-US" smtClean="0"/>
               <a:pPr/>
               <a:t>‹#›</a:t>
             </a:fld>
@@ -5351,25 +5443,30 @@
         </p:txBody>
       </p:sp>
     </p:spTree>
+    <p:extLst>
+      <p:ext uri="{BB962C8B-B14F-4D97-AF65-F5344CB8AC3E}">
+        <p14:creationId xmlns:p14="http://schemas.microsoft.com/office/powerpoint/2010/main" val="1037246218"/>
+      </p:ext>
+    </p:extLst>
   </p:cSld>
   <p:clrMap bg1="lt1" tx1="dk1" bg2="lt2" tx2="dk2" accent1="accent1" accent2="accent2" accent3="accent3" accent4="accent4" accent5="accent5" accent6="accent6" hlink="hlink" folHlink="folHlink"/>
   <p:sldLayoutIdLst>
-    <p:sldLayoutId id="2147483649" r:id="rId1"/>
-    <p:sldLayoutId id="2147483650" r:id="rId2"/>
-    <p:sldLayoutId id="2147483651" r:id="rId3"/>
-    <p:sldLayoutId id="2147483665" r:id="rId4"/>
-    <p:sldLayoutId id="2147483653" r:id="rId5"/>
-    <p:sldLayoutId id="2147483654" r:id="rId6"/>
-    <p:sldLayoutId id="2147483655" r:id="rId7"/>
-    <p:sldLayoutId id="2147483666" r:id="rId8"/>
-    <p:sldLayoutId id="2147483657" r:id="rId9"/>
-    <p:sldLayoutId id="2147483660" r:id="rId10"/>
-    <p:sldLayoutId id="2147483661" r:id="rId11"/>
-    <p:sldLayoutId id="2147483662" r:id="rId12"/>
-    <p:sldLayoutId id="2147483663" r:id="rId13"/>
-    <p:sldLayoutId id="2147483664" r:id="rId14"/>
-    <p:sldLayoutId id="2147483667" r:id="rId15"/>
-    <p:sldLayoutId id="2147483659" r:id="rId16"/>
+    <p:sldLayoutId id="2147483737" r:id="rId1"/>
+    <p:sldLayoutId id="2147483738" r:id="rId2"/>
+    <p:sldLayoutId id="2147483739" r:id="rId3"/>
+    <p:sldLayoutId id="2147483740" r:id="rId4"/>
+    <p:sldLayoutId id="2147483741" r:id="rId5"/>
+    <p:sldLayoutId id="2147483742" r:id="rId6"/>
+    <p:sldLayoutId id="2147483743" r:id="rId7"/>
+    <p:sldLayoutId id="2147483744" r:id="rId8"/>
+    <p:sldLayoutId id="2147483745" r:id="rId9"/>
+    <p:sldLayoutId id="2147483746" r:id="rId10"/>
+    <p:sldLayoutId id="2147483747" r:id="rId11"/>
+    <p:sldLayoutId id="2147483748" r:id="rId12"/>
+    <p:sldLayoutId id="2147483749" r:id="rId13"/>
+    <p:sldLayoutId id="2147483750" r:id="rId14"/>
+    <p:sldLayoutId id="2147483751" r:id="rId15"/>
+    <p:sldLayoutId id="2147483752" r:id="rId16"/>
   </p:sldLayoutIdLst>
   <p:txStyles>
     <p:titleStyle>
@@ -5810,14 +5907,26 @@
           <a:p>
             <a:pPr algn="ctr"/>
             <a:r>
-              <a:rPr lang="en-US" dirty="0"/>
+              <a:rPr lang="en-US" dirty="0">
+                <a:solidFill>
+                  <a:schemeClr val="accent2"/>
+                </a:solidFill>
+              </a:rPr>
               <a:t>Puzzle-RPG Project </a:t>
             </a:r>
             <a:br>
-              <a:rPr lang="en-US" dirty="0"/>
+              <a:rPr lang="en-US" dirty="0">
+                <a:solidFill>
+                  <a:schemeClr val="accent2"/>
+                </a:solidFill>
+              </a:rPr>
             </a:br>
             <a:r>
-              <a:rPr lang="en-US" dirty="0"/>
+              <a:rPr lang="en-US" dirty="0">
+                <a:solidFill>
+                  <a:schemeClr val="accent2"/>
+                </a:solidFill>
+              </a:rPr>
               <a:t>“Rune Battle”</a:t>
             </a:r>
           </a:p>
@@ -5851,19 +5960,57 @@
           <a:p>
             <a:pPr algn="l"/>
             <a:r>
-              <a:rPr lang="en-US" dirty="0"/>
+              <a:rPr lang="en-US" dirty="0">
+                <a:solidFill>
+                  <a:schemeClr val="accent1"/>
+                </a:solidFill>
+              </a:rPr>
               <a:t>By Caleb Compton </a:t>
             </a:r>
           </a:p>
           <a:p>
             <a:pPr algn="l"/>
             <a:r>
-              <a:rPr lang="en-US" dirty="0"/>
+              <a:rPr lang="en-US" dirty="0">
+                <a:solidFill>
+                  <a:schemeClr val="accent1"/>
+                </a:solidFill>
+              </a:rPr>
               <a:t>Advised By Nathan Bean</a:t>
             </a:r>
           </a:p>
         </p:txBody>
       </p:sp>
+      <p:pic>
+        <p:nvPicPr>
+          <p:cNvPr id="5" name="Picture 4" descr="A close up of a logo&#10;&#10;Description generated with high confidence">
+            <a:extLst>
+              <a:ext uri="{FF2B5EF4-FFF2-40B4-BE49-F238E27FC236}">
+                <a16:creationId xmlns:a16="http://schemas.microsoft.com/office/drawing/2014/main" id="{82B261DE-08D0-4E06-8A41-399ED8402C09}"/>
+              </a:ext>
+            </a:extLst>
+          </p:cNvPr>
+          <p:cNvPicPr>
+            <a:picLocks noChangeAspect="1"/>
+          </p:cNvPicPr>
+          <p:nvPr/>
+        </p:nvPicPr>
+        <p:blipFill>
+          <a:blip r:embed="rId2"/>
+          <a:stretch>
+            <a:fillRect/>
+          </a:stretch>
+        </p:blipFill>
+        <p:spPr>
+          <a:xfrm>
+            <a:off x="59535" y="5276850"/>
+            <a:ext cx="1447532" cy="1447532"/>
+          </a:xfrm>
+          <a:prstGeom prst="rect">
+            <a:avLst/>
+          </a:prstGeom>
+        </p:spPr>
+      </p:pic>
     </p:spTree>
     <p:extLst>
       <p:ext uri="{BB962C8B-B14F-4D97-AF65-F5344CB8AC3E}">
@@ -5899,7 +6046,7 @@
           <p:cNvPr id="2" name="Title 1">
             <a:extLst>
               <a:ext uri="{FF2B5EF4-FFF2-40B4-BE49-F238E27FC236}">
-                <a16:creationId xmlns:a16="http://schemas.microsoft.com/office/drawing/2014/main" id="{7ADC7478-32C1-42C1-A0A2-FB3F92697DF0}"/>
+                <a16:creationId xmlns:a16="http://schemas.microsoft.com/office/drawing/2014/main" id="{8CF1AC6D-2DFE-4F7C-900D-B6C36DDC4536}"/>
               </a:ext>
             </a:extLst>
           </p:cNvPr>
@@ -5916,8 +6063,12 @@
           <a:lstStyle/>
           <a:p>
             <a:r>
-              <a:rPr lang="en-US" dirty="0"/>
-              <a:t>Animations</a:t>
+              <a:rPr lang="en-US" dirty="0">
+                <a:solidFill>
+                  <a:schemeClr val="accent2"/>
+                </a:solidFill>
+              </a:rPr>
+              <a:t>The Game Scene</a:t>
             </a:r>
           </a:p>
         </p:txBody>
@@ -5927,7 +6078,7 @@
           <p:cNvPr id="3" name="Content Placeholder 2">
             <a:extLst>
               <a:ext uri="{FF2B5EF4-FFF2-40B4-BE49-F238E27FC236}">
-                <a16:creationId xmlns:a16="http://schemas.microsoft.com/office/drawing/2014/main" id="{65F3EF80-0B27-4FAB-9559-79A7A16578A3}"/>
+                <a16:creationId xmlns:a16="http://schemas.microsoft.com/office/drawing/2014/main" id="{4172CAE2-EEE6-440B-8946-66F777D23A32}"/>
               </a:ext>
             </a:extLst>
           </p:cNvPr>
@@ -5944,48 +6095,106 @@
           <a:lstStyle/>
           <a:p>
             <a:r>
-              <a:rPr lang="en-US" dirty="0"/>
-              <a:t>Animating using a sprite sheet </a:t>
-            </a:r>
-          </a:p>
-          <a:p>
-            <a:pPr lvl="1"/>
-            <a:r>
-              <a:rPr lang="en-US" dirty="0"/>
-              <a:t>All images of a single animation cycle are in a single file</a:t>
-            </a:r>
-          </a:p>
-          <a:p>
-            <a:pPr lvl="1"/>
-            <a:r>
-              <a:rPr lang="en-US" dirty="0"/>
-              <a:t> less memory, faster load times</a:t>
-            </a:r>
-          </a:p>
-          <a:p>
-            <a:r>
-              <a:rPr lang="en-US" dirty="0"/>
-              <a:t>Load the complete sprite sheet image file, then keep track of which part you want to load for any given frame. </a:t>
-            </a:r>
-          </a:p>
-          <a:p>
-            <a:r>
-              <a:rPr lang="en-US" dirty="0"/>
-              <a:t>Every sprite animated separately, gives fine control over the scene </a:t>
-            </a:r>
-          </a:p>
-          <a:p>
-            <a:r>
-              <a:rPr lang="en-US" dirty="0"/>
-              <a:t>Animation code currently implemented, but not widely used in the program</a:t>
-            </a:r>
-          </a:p>
-        </p:txBody>
-      </p:sp>
+              <a:rPr lang="en-US" dirty="0">
+                <a:solidFill>
+                  <a:schemeClr val="tx2"/>
+                </a:solidFill>
+              </a:rPr>
+              <a:t>The majority of the actual gameplay takes place in this scene. </a:t>
+            </a:r>
+          </a:p>
+          <a:p>
+            <a:r>
+              <a:rPr lang="en-US" dirty="0">
+                <a:solidFill>
+                  <a:schemeClr val="tx2"/>
+                </a:solidFill>
+              </a:rPr>
+              <a:t>The top of the screen is reserved for drawing the characters and enemies. Players should be able to watch the battle happen, reflecting their actions on the bottom of the screen. </a:t>
+            </a:r>
+          </a:p>
+          <a:p>
+            <a:r>
+              <a:rPr lang="en-US" dirty="0">
+                <a:solidFill>
+                  <a:schemeClr val="tx2"/>
+                </a:solidFill>
+              </a:rPr>
+              <a:t>The bottom half of the screen is where gameplay takes place</a:t>
+            </a:r>
+          </a:p>
+          <a:p>
+            <a:r>
+              <a:rPr lang="en-US" dirty="0">
+                <a:solidFill>
+                  <a:schemeClr val="tx2"/>
+                </a:solidFill>
+              </a:rPr>
+              <a:t>Every time the draw loop is called, the “</a:t>
+            </a:r>
+            <a:r>
+              <a:rPr lang="en-US" dirty="0" err="1">
+                <a:solidFill>
+                  <a:schemeClr val="tx2"/>
+                </a:solidFill>
+              </a:rPr>
+              <a:t>DrawScene</a:t>
+            </a:r>
+            <a:r>
+              <a:rPr lang="en-US" dirty="0">
+                <a:solidFill>
+                  <a:schemeClr val="tx2"/>
+                </a:solidFill>
+              </a:rPr>
+              <a:t>” function is called. This draws all of the health and energy bars, the characters, as well as the runes.</a:t>
+            </a:r>
+          </a:p>
+          <a:p>
+            <a:r>
+              <a:rPr lang="en-US" dirty="0">
+                <a:solidFill>
+                  <a:schemeClr val="tx2"/>
+                </a:solidFill>
+              </a:rPr>
+              <a:t>Eventually the game scene will have its own subclasses for different levels. Currently have 2 game scenes – one for the regular levels, and one for the Boss level.  </a:t>
+            </a:r>
+          </a:p>
+        </p:txBody>
+      </p:sp>
+      <p:pic>
+        <p:nvPicPr>
+          <p:cNvPr id="4" name="Picture 3" descr="A close up of a logo&#10;&#10;Description generated with high confidence">
+            <a:extLst>
+              <a:ext uri="{FF2B5EF4-FFF2-40B4-BE49-F238E27FC236}">
+                <a16:creationId xmlns:a16="http://schemas.microsoft.com/office/drawing/2014/main" id="{D4076493-1B27-4B7E-83D5-265C2EA1A2D5}"/>
+              </a:ext>
+            </a:extLst>
+          </p:cNvPr>
+          <p:cNvPicPr>
+            <a:picLocks noChangeAspect="1"/>
+          </p:cNvPicPr>
+          <p:nvPr/>
+        </p:nvPicPr>
+        <p:blipFill>
+          <a:blip r:embed="rId2"/>
+          <a:stretch>
+            <a:fillRect/>
+          </a:stretch>
+        </p:blipFill>
+        <p:spPr>
+          <a:xfrm>
+            <a:off x="10413210" y="5153324"/>
+            <a:ext cx="1447532" cy="1447532"/>
+          </a:xfrm>
+          <a:prstGeom prst="rect">
+            <a:avLst/>
+          </a:prstGeom>
+        </p:spPr>
+      </p:pic>
     </p:spTree>
     <p:extLst>
       <p:ext uri="{BB962C8B-B14F-4D97-AF65-F5344CB8AC3E}">
-        <p14:creationId xmlns:p14="http://schemas.microsoft.com/office/powerpoint/2010/main" val="3719081118"/>
+        <p14:creationId xmlns:p14="http://schemas.microsoft.com/office/powerpoint/2010/main" val="4259955254"/>
       </p:ext>
     </p:extLst>
   </p:cSld>
@@ -6017,7 +6226,7 @@
           <p:cNvPr id="2" name="Title 1">
             <a:extLst>
               <a:ext uri="{FF2B5EF4-FFF2-40B4-BE49-F238E27FC236}">
-                <a16:creationId xmlns:a16="http://schemas.microsoft.com/office/drawing/2014/main" id="{8668D29D-A504-4B15-B106-812E5E9295C0}"/>
+                <a16:creationId xmlns:a16="http://schemas.microsoft.com/office/drawing/2014/main" id="{7ADC7478-32C1-42C1-A0A2-FB3F92697DF0}"/>
               </a:ext>
             </a:extLst>
           </p:cNvPr>
@@ -6034,8 +6243,12 @@
           <a:lstStyle/>
           <a:p>
             <a:r>
-              <a:rPr lang="en-US" dirty="0"/>
-              <a:t>Other Scenes </a:t>
+              <a:rPr lang="en-US" dirty="0">
+                <a:solidFill>
+                  <a:schemeClr val="accent2"/>
+                </a:solidFill>
+              </a:rPr>
+              <a:t>Animations</a:t>
             </a:r>
           </a:p>
         </p:txBody>
@@ -6045,7 +6258,7 @@
           <p:cNvPr id="3" name="Content Placeholder 2">
             <a:extLst>
               <a:ext uri="{FF2B5EF4-FFF2-40B4-BE49-F238E27FC236}">
-                <a16:creationId xmlns:a16="http://schemas.microsoft.com/office/drawing/2014/main" id="{47E4D91E-8BAC-4A59-ABDF-D007E0ABEECF}"/>
+                <a16:creationId xmlns:a16="http://schemas.microsoft.com/office/drawing/2014/main" id="{65F3EF80-0B27-4FAB-9559-79A7A16578A3}"/>
               </a:ext>
             </a:extLst>
           </p:cNvPr>
@@ -6058,34 +6271,106 @@
         </p:nvSpPr>
         <p:spPr/>
         <p:txBody>
-          <a:bodyPr>
-            <a:normAutofit/>
-          </a:bodyPr>
-          <a:lstStyle/>
-          <a:p>
-            <a:r>
-              <a:rPr lang="en-US" sz="2400" dirty="0"/>
-              <a:t>New Character Scene – allows players to name a new character, and then choose what class is should be (Wizard or Knight)</a:t>
-            </a:r>
-          </a:p>
-          <a:p>
-            <a:r>
-              <a:rPr lang="en-US" sz="2400" dirty="0"/>
-              <a:t>Map Scene – player moves around the map to different levels. Completing levels unlocks new ones. </a:t>
-            </a:r>
-          </a:p>
-          <a:p>
-            <a:r>
-              <a:rPr lang="en-US" sz="2400" dirty="0"/>
-              <a:t>Load Game Scene – lists saved characters, and loads the selected character</a:t>
-            </a:r>
-          </a:p>
-        </p:txBody>
-      </p:sp>
+          <a:bodyPr/>
+          <a:lstStyle/>
+          <a:p>
+            <a:r>
+              <a:rPr lang="en-US" dirty="0">
+                <a:solidFill>
+                  <a:schemeClr val="tx2"/>
+                </a:solidFill>
+              </a:rPr>
+              <a:t>Animating using a sprite sheet </a:t>
+            </a:r>
+          </a:p>
+          <a:p>
+            <a:pPr lvl="1"/>
+            <a:r>
+              <a:rPr lang="en-US" dirty="0">
+                <a:solidFill>
+                  <a:schemeClr val="tx2"/>
+                </a:solidFill>
+              </a:rPr>
+              <a:t>All images of a single animation cycle are in a single file</a:t>
+            </a:r>
+          </a:p>
+          <a:p>
+            <a:pPr lvl="1"/>
+            <a:r>
+              <a:rPr lang="en-US" dirty="0">
+                <a:solidFill>
+                  <a:schemeClr val="tx2"/>
+                </a:solidFill>
+              </a:rPr>
+              <a:t> less memory, faster load times</a:t>
+            </a:r>
+          </a:p>
+          <a:p>
+            <a:r>
+              <a:rPr lang="en-US" dirty="0">
+                <a:solidFill>
+                  <a:schemeClr val="tx2"/>
+                </a:solidFill>
+              </a:rPr>
+              <a:t>Load the complete sprite sheet image file, then keep track of which part you want to load for any given frame. </a:t>
+            </a:r>
+          </a:p>
+          <a:p>
+            <a:r>
+              <a:rPr lang="en-US" dirty="0">
+                <a:solidFill>
+                  <a:schemeClr val="tx2"/>
+                </a:solidFill>
+              </a:rPr>
+              <a:t>Every sprite animated separately, gives fine control over the scene </a:t>
+            </a:r>
+          </a:p>
+          <a:p>
+            <a:r>
+              <a:rPr lang="en-US" dirty="0">
+                <a:solidFill>
+                  <a:schemeClr val="tx2"/>
+                </a:solidFill>
+              </a:rPr>
+              <a:t>Animation code currently implemented, but not widely used in the program</a:t>
+            </a:r>
+          </a:p>
+        </p:txBody>
+      </p:sp>
+      <p:pic>
+        <p:nvPicPr>
+          <p:cNvPr id="4" name="Picture 3" descr="A close up of a logo&#10;&#10;Description generated with high confidence">
+            <a:extLst>
+              <a:ext uri="{FF2B5EF4-FFF2-40B4-BE49-F238E27FC236}">
+                <a16:creationId xmlns:a16="http://schemas.microsoft.com/office/drawing/2014/main" id="{75E117D8-8177-4F50-961B-6A792BDC1B49}"/>
+              </a:ext>
+            </a:extLst>
+          </p:cNvPr>
+          <p:cNvPicPr>
+            <a:picLocks noChangeAspect="1"/>
+          </p:cNvPicPr>
+          <p:nvPr/>
+        </p:nvPicPr>
+        <p:blipFill>
+          <a:blip r:embed="rId2"/>
+          <a:stretch>
+            <a:fillRect/>
+          </a:stretch>
+        </p:blipFill>
+        <p:spPr>
+          <a:xfrm>
+            <a:off x="10413210" y="5153324"/>
+            <a:ext cx="1447532" cy="1447532"/>
+          </a:xfrm>
+          <a:prstGeom prst="rect">
+            <a:avLst/>
+          </a:prstGeom>
+        </p:spPr>
+      </p:pic>
     </p:spTree>
     <p:extLst>
       <p:ext uri="{BB962C8B-B14F-4D97-AF65-F5344CB8AC3E}">
-        <p14:creationId xmlns:p14="http://schemas.microsoft.com/office/powerpoint/2010/main" val="1301204735"/>
+        <p14:creationId xmlns:p14="http://schemas.microsoft.com/office/powerpoint/2010/main" val="3719081118"/>
       </p:ext>
     </p:extLst>
   </p:cSld>
@@ -6117,7 +6402,7 @@
           <p:cNvPr id="2" name="Title 1">
             <a:extLst>
               <a:ext uri="{FF2B5EF4-FFF2-40B4-BE49-F238E27FC236}">
-                <a16:creationId xmlns:a16="http://schemas.microsoft.com/office/drawing/2014/main" id="{569D1BDF-0624-4E69-A833-D0DA5887BB3B}"/>
+                <a16:creationId xmlns:a16="http://schemas.microsoft.com/office/drawing/2014/main" id="{8668D29D-A504-4B15-B106-812E5E9295C0}"/>
               </a:ext>
             </a:extLst>
           </p:cNvPr>
@@ -6134,8 +6419,12 @@
           <a:lstStyle/>
           <a:p>
             <a:r>
-              <a:rPr lang="en-US" dirty="0"/>
-              <a:t>Player Class</a:t>
+              <a:rPr lang="en-US" dirty="0">
+                <a:solidFill>
+                  <a:schemeClr val="accent2"/>
+                </a:solidFill>
+              </a:rPr>
+              <a:t>Other Scenes </a:t>
             </a:r>
           </a:p>
         </p:txBody>
@@ -6145,7 +6434,7 @@
           <p:cNvPr id="3" name="Content Placeholder 2">
             <a:extLst>
               <a:ext uri="{FF2B5EF4-FFF2-40B4-BE49-F238E27FC236}">
-                <a16:creationId xmlns:a16="http://schemas.microsoft.com/office/drawing/2014/main" id="{54E1803E-62E7-477D-A1B6-E2DD20D587F6}"/>
+                <a16:creationId xmlns:a16="http://schemas.microsoft.com/office/drawing/2014/main" id="{47E4D91E-8BAC-4A59-ABDF-D007E0ABEECF}"/>
               </a:ext>
             </a:extLst>
           </p:cNvPr>
@@ -6164,22 +6453,86 @@
           <a:lstStyle/>
           <a:p>
             <a:r>
-              <a:rPr lang="en-US" sz="2400" dirty="0"/>
-              <a:t>Keeps track of stats such as health and energy, as well as what runes and levels have been unlocked</a:t>
-            </a:r>
-          </a:p>
-          <a:p>
-            <a:r>
-              <a:rPr lang="en-US" sz="2400" dirty="0"/>
-              <a:t>Gets saved as a JSON file, and then gets reloaded from that file when the player is selected</a:t>
-            </a:r>
-          </a:p>
-        </p:txBody>
-      </p:sp>
+              <a:rPr lang="en-US" sz="2400" dirty="0">
+                <a:solidFill>
+                  <a:schemeClr val="tx2"/>
+                </a:solidFill>
+              </a:rPr>
+              <a:t>New Character Scene – allows players to name a new character, and then choose what </a:t>
+            </a:r>
+            <a:r>
+              <a:rPr lang="en-US" sz="2400">
+                <a:solidFill>
+                  <a:schemeClr val="tx2"/>
+                </a:solidFill>
+              </a:rPr>
+              <a:t>class it </a:t>
+            </a:r>
+            <a:r>
+              <a:rPr lang="en-US" sz="2400" dirty="0">
+                <a:solidFill>
+                  <a:schemeClr val="tx2"/>
+                </a:solidFill>
+              </a:rPr>
+              <a:t>should be (Wizard or Knight)</a:t>
+            </a:r>
+          </a:p>
+          <a:p>
+            <a:r>
+              <a:rPr lang="en-US" sz="2400" dirty="0">
+                <a:solidFill>
+                  <a:schemeClr val="tx2"/>
+                </a:solidFill>
+              </a:rPr>
+              <a:t>Map Scene – player moves around the map to different levels. Completing levels unlocks new ones. </a:t>
+            </a:r>
+          </a:p>
+          <a:p>
+            <a:r>
+              <a:rPr lang="en-US" sz="2400" dirty="0">
+                <a:solidFill>
+                  <a:schemeClr val="tx2"/>
+                </a:solidFill>
+              </a:rPr>
+              <a:t>Load Game Scene – lists saved characters, and loads the selected character</a:t>
+            </a:r>
+          </a:p>
+        </p:txBody>
+      </p:sp>
+      <p:pic>
+        <p:nvPicPr>
+          <p:cNvPr id="4" name="Picture 3" descr="A close up of a logo&#10;&#10;Description generated with high confidence">
+            <a:extLst>
+              <a:ext uri="{FF2B5EF4-FFF2-40B4-BE49-F238E27FC236}">
+                <a16:creationId xmlns:a16="http://schemas.microsoft.com/office/drawing/2014/main" id="{E3D1516E-2C1D-4F68-8E14-E175C63139E5}"/>
+              </a:ext>
+            </a:extLst>
+          </p:cNvPr>
+          <p:cNvPicPr>
+            <a:picLocks noChangeAspect="1"/>
+          </p:cNvPicPr>
+          <p:nvPr/>
+        </p:nvPicPr>
+        <p:blipFill>
+          <a:blip r:embed="rId2"/>
+          <a:stretch>
+            <a:fillRect/>
+          </a:stretch>
+        </p:blipFill>
+        <p:spPr>
+          <a:xfrm>
+            <a:off x="10413210" y="5153324"/>
+            <a:ext cx="1447532" cy="1447532"/>
+          </a:xfrm>
+          <a:prstGeom prst="rect">
+            <a:avLst/>
+          </a:prstGeom>
+        </p:spPr>
+      </p:pic>
     </p:spTree>
     <p:extLst>
       <p:ext uri="{BB962C8B-B14F-4D97-AF65-F5344CB8AC3E}">
-        <p14:creationId xmlns:p14="http://schemas.microsoft.com/office/powerpoint/2010/main" val="1255191214"/>
+        <p14:creationId xmlns:p14="http://schemas.microsoft.com/office/powerpoint/2010/main" val="1301204735"/>
       </p:ext>
     </p:extLst>
   </p:cSld>
@@ -6211,7 +6564,7 @@
           <p:cNvPr id="2" name="Title 1">
             <a:extLst>
               <a:ext uri="{FF2B5EF4-FFF2-40B4-BE49-F238E27FC236}">
-                <a16:creationId xmlns:a16="http://schemas.microsoft.com/office/drawing/2014/main" id="{B75FB288-5941-4629-847C-B78AAAC05C20}"/>
+                <a16:creationId xmlns:a16="http://schemas.microsoft.com/office/drawing/2014/main" id="{569D1BDF-0624-4E69-A833-D0DA5887BB3B}"/>
               </a:ext>
             </a:extLst>
           </p:cNvPr>
@@ -6228,8 +6581,12 @@
           <a:lstStyle/>
           <a:p>
             <a:r>
-              <a:rPr lang="en-US" dirty="0"/>
-              <a:t>Gameplay</a:t>
+              <a:rPr lang="en-US" dirty="0">
+                <a:solidFill>
+                  <a:schemeClr val="accent2"/>
+                </a:solidFill>
+              </a:rPr>
+              <a:t>Player Class</a:t>
             </a:r>
           </a:p>
         </p:txBody>
@@ -6239,7 +6596,7 @@
           <p:cNvPr id="3" name="Content Placeholder 2">
             <a:extLst>
               <a:ext uri="{FF2B5EF4-FFF2-40B4-BE49-F238E27FC236}">
-                <a16:creationId xmlns:a16="http://schemas.microsoft.com/office/drawing/2014/main" id="{DA1953C6-E441-43CF-98DA-F23ABBA82B04}"/>
+                <a16:creationId xmlns:a16="http://schemas.microsoft.com/office/drawing/2014/main" id="{54E1803E-62E7-477D-A1B6-E2DD20D587F6}"/>
               </a:ext>
             </a:extLst>
           </p:cNvPr>
@@ -6252,60 +6609,66 @@
         </p:nvSpPr>
         <p:spPr/>
         <p:txBody>
-          <a:bodyPr/>
-          <a:lstStyle/>
-          <a:p>
-            <a:r>
-              <a:rPr lang="en-US" dirty="0"/>
-              <a:t>Various colored circles (called “Runes”) fall from the top of the screen </a:t>
-            </a:r>
-          </a:p>
-          <a:p>
-            <a:r>
-              <a:rPr lang="en-US" dirty="0"/>
-              <a:t>Player has two options: </a:t>
-            </a:r>
-          </a:p>
-          <a:p>
-            <a:pPr lvl="1"/>
-            <a:r>
-              <a:rPr lang="en-US" dirty="0"/>
-              <a:t>Placing similar runes in the “</a:t>
-            </a:r>
-            <a:r>
-              <a:rPr lang="en-US" dirty="0" err="1"/>
-              <a:t>spellbox</a:t>
-            </a:r>
-            <a:r>
-              <a:rPr lang="en-US" dirty="0"/>
-              <a:t>” will allow the player to cast spells. This uses energy </a:t>
-            </a:r>
-          </a:p>
-          <a:p>
-            <a:pPr lvl="1"/>
-            <a:r>
-              <a:rPr lang="en-US" dirty="0"/>
-              <a:t>Connecting three of the same runes in a row will refill some of their energy bar </a:t>
-            </a:r>
-          </a:p>
-          <a:p>
-            <a:r>
-              <a:rPr lang="en-US" dirty="0"/>
-              <a:t>Player must cast spells to defeat the enemy before they lose all of their health</a:t>
-            </a:r>
-          </a:p>
-          <a:p>
-            <a:r>
-              <a:rPr lang="en-US" dirty="0"/>
-              <a:t>Player can face challenging bosses that significantly alter the standard rules of the game. </a:t>
-            </a:r>
-          </a:p>
-        </p:txBody>
-      </p:sp>
+          <a:bodyPr>
+            <a:normAutofit/>
+          </a:bodyPr>
+          <a:lstStyle/>
+          <a:p>
+            <a:r>
+              <a:rPr lang="en-US" sz="2400" dirty="0">
+                <a:solidFill>
+                  <a:schemeClr val="accent1"/>
+                </a:solidFill>
+              </a:rPr>
+              <a:t>Keeps track of stats such as health and energy, as well as what runes and levels have been unlocked</a:t>
+            </a:r>
+          </a:p>
+          <a:p>
+            <a:r>
+              <a:rPr lang="en-US" sz="2400" dirty="0">
+                <a:solidFill>
+                  <a:schemeClr val="accent1"/>
+                </a:solidFill>
+              </a:rPr>
+              <a:t>Gets saved as a JSON file, and then gets reloaded from that file when the player is selected</a:t>
+            </a:r>
+          </a:p>
+        </p:txBody>
+      </p:sp>
+      <p:pic>
+        <p:nvPicPr>
+          <p:cNvPr id="4" name="Picture 3" descr="A close up of a logo&#10;&#10;Description generated with high confidence">
+            <a:extLst>
+              <a:ext uri="{FF2B5EF4-FFF2-40B4-BE49-F238E27FC236}">
+                <a16:creationId xmlns:a16="http://schemas.microsoft.com/office/drawing/2014/main" id="{2F53179C-65D8-4B25-8479-D04701ACB129}"/>
+              </a:ext>
+            </a:extLst>
+          </p:cNvPr>
+          <p:cNvPicPr>
+            <a:picLocks noChangeAspect="1"/>
+          </p:cNvPicPr>
+          <p:nvPr/>
+        </p:nvPicPr>
+        <p:blipFill>
+          <a:blip r:embed="rId2"/>
+          <a:stretch>
+            <a:fillRect/>
+          </a:stretch>
+        </p:blipFill>
+        <p:spPr>
+          <a:xfrm>
+            <a:off x="10413210" y="5153324"/>
+            <a:ext cx="1447532" cy="1447532"/>
+          </a:xfrm>
+          <a:prstGeom prst="rect">
+            <a:avLst/>
+          </a:prstGeom>
+        </p:spPr>
+      </p:pic>
     </p:spTree>
     <p:extLst>
       <p:ext uri="{BB962C8B-B14F-4D97-AF65-F5344CB8AC3E}">
-        <p14:creationId xmlns:p14="http://schemas.microsoft.com/office/powerpoint/2010/main" val="3854225857"/>
+        <p14:creationId xmlns:p14="http://schemas.microsoft.com/office/powerpoint/2010/main" val="1255191214"/>
       </p:ext>
     </p:extLst>
   </p:cSld>
@@ -6337,7 +6700,7 @@
           <p:cNvPr id="2" name="Title 1">
             <a:extLst>
               <a:ext uri="{FF2B5EF4-FFF2-40B4-BE49-F238E27FC236}">
-                <a16:creationId xmlns:a16="http://schemas.microsoft.com/office/drawing/2014/main" id="{8BA3F8E6-841C-4855-972F-F238036EE6F7}"/>
+                <a16:creationId xmlns:a16="http://schemas.microsoft.com/office/drawing/2014/main" id="{B75FB288-5941-4629-847C-B78AAAC05C20}"/>
               </a:ext>
             </a:extLst>
           </p:cNvPr>
@@ -6354,8 +6717,12 @@
           <a:lstStyle/>
           <a:p>
             <a:r>
-              <a:rPr lang="en-US" dirty="0"/>
-              <a:t>Demo </a:t>
+              <a:rPr lang="en-US" dirty="0">
+                <a:solidFill>
+                  <a:schemeClr val="accent2"/>
+                </a:solidFill>
+              </a:rPr>
+              <a:t>Gameplay</a:t>
             </a:r>
           </a:p>
         </p:txBody>
@@ -6365,7 +6732,7 @@
           <p:cNvPr id="3" name="Content Placeholder 2">
             <a:extLst>
               <a:ext uri="{FF2B5EF4-FFF2-40B4-BE49-F238E27FC236}">
-                <a16:creationId xmlns:a16="http://schemas.microsoft.com/office/drawing/2014/main" id="{1395AD4C-E6B9-46B3-9FD3-98304FBF19DA}"/>
+                <a16:creationId xmlns:a16="http://schemas.microsoft.com/office/drawing/2014/main" id="{DA1953C6-E441-43CF-98DA-F23ABBA82B04}"/>
               </a:ext>
             </a:extLst>
           </p:cNvPr>
@@ -6381,14 +6748,119 @@
           <a:bodyPr/>
           <a:lstStyle/>
           <a:p>
-            <a:endParaRPr lang="en-US"/>
-          </a:p>
-        </p:txBody>
-      </p:sp>
+            <a:r>
+              <a:rPr lang="en-US" dirty="0">
+                <a:solidFill>
+                  <a:schemeClr val="accent1"/>
+                </a:solidFill>
+              </a:rPr>
+              <a:t>Various colored circles (called “Runes”) fall from the top of the screen </a:t>
+            </a:r>
+          </a:p>
+          <a:p>
+            <a:r>
+              <a:rPr lang="en-US" dirty="0">
+                <a:solidFill>
+                  <a:schemeClr val="accent1"/>
+                </a:solidFill>
+              </a:rPr>
+              <a:t>Player has two options: </a:t>
+            </a:r>
+          </a:p>
+          <a:p>
+            <a:pPr lvl="1"/>
+            <a:r>
+              <a:rPr lang="en-US" dirty="0">
+                <a:solidFill>
+                  <a:schemeClr val="accent1"/>
+                </a:solidFill>
+              </a:rPr>
+              <a:t>Placing similar runes in the “</a:t>
+            </a:r>
+            <a:r>
+              <a:rPr lang="en-US" dirty="0" err="1">
+                <a:solidFill>
+                  <a:schemeClr val="accent1"/>
+                </a:solidFill>
+              </a:rPr>
+              <a:t>spellbox</a:t>
+            </a:r>
+            <a:r>
+              <a:rPr lang="en-US" dirty="0">
+                <a:solidFill>
+                  <a:schemeClr val="accent1"/>
+                </a:solidFill>
+              </a:rPr>
+              <a:t>” will allow the player to cast spells. This uses energy </a:t>
+            </a:r>
+          </a:p>
+          <a:p>
+            <a:pPr lvl="1"/>
+            <a:r>
+              <a:rPr lang="en-US" dirty="0">
+                <a:solidFill>
+                  <a:schemeClr val="accent1"/>
+                </a:solidFill>
+              </a:rPr>
+              <a:t>Connecting three of the same runes in a row will refill some of their energy bar </a:t>
+            </a:r>
+          </a:p>
+          <a:p>
+            <a:r>
+              <a:rPr lang="en-US" dirty="0">
+                <a:solidFill>
+                  <a:schemeClr val="accent1"/>
+                </a:solidFill>
+              </a:rPr>
+              <a:t>Player must cast spells to defeat the enemy before they lose all of their health</a:t>
+            </a:r>
+          </a:p>
+          <a:p>
+            <a:r>
+              <a:rPr lang="en-US" dirty="0">
+                <a:solidFill>
+                  <a:schemeClr val="accent1"/>
+                </a:solidFill>
+              </a:rPr>
+              <a:t>Player can face challenging bosses that significantly alter the standard rules of the game. </a:t>
+            </a:r>
+          </a:p>
+        </p:txBody>
+      </p:sp>
+      <p:pic>
+        <p:nvPicPr>
+          <p:cNvPr id="4" name="Picture 3" descr="A close up of a logo&#10;&#10;Description generated with high confidence">
+            <a:extLst>
+              <a:ext uri="{FF2B5EF4-FFF2-40B4-BE49-F238E27FC236}">
+                <a16:creationId xmlns:a16="http://schemas.microsoft.com/office/drawing/2014/main" id="{42A1AB75-5A33-42B5-931F-682F4084FD7E}"/>
+              </a:ext>
+            </a:extLst>
+          </p:cNvPr>
+          <p:cNvPicPr>
+            <a:picLocks noChangeAspect="1"/>
+          </p:cNvPicPr>
+          <p:nvPr/>
+        </p:nvPicPr>
+        <p:blipFill>
+          <a:blip r:embed="rId2"/>
+          <a:stretch>
+            <a:fillRect/>
+          </a:stretch>
+        </p:blipFill>
+        <p:spPr>
+          <a:xfrm>
+            <a:off x="10413210" y="5153324"/>
+            <a:ext cx="1447532" cy="1447532"/>
+          </a:xfrm>
+          <a:prstGeom prst="rect">
+            <a:avLst/>
+          </a:prstGeom>
+        </p:spPr>
+      </p:pic>
     </p:spTree>
     <p:extLst>
       <p:ext uri="{BB962C8B-B14F-4D97-AF65-F5344CB8AC3E}">
-        <p14:creationId xmlns:p14="http://schemas.microsoft.com/office/powerpoint/2010/main" val="872691335"/>
+        <p14:creationId xmlns:p14="http://schemas.microsoft.com/office/powerpoint/2010/main" val="3854225857"/>
       </p:ext>
     </p:extLst>
   </p:cSld>
@@ -6420,7 +6892,7 @@
           <p:cNvPr id="2" name="Title 1">
             <a:extLst>
               <a:ext uri="{FF2B5EF4-FFF2-40B4-BE49-F238E27FC236}">
-                <a16:creationId xmlns:a16="http://schemas.microsoft.com/office/drawing/2014/main" id="{A4D5EE3B-1080-4F64-BEED-695281AE4AFB}"/>
+                <a16:creationId xmlns:a16="http://schemas.microsoft.com/office/drawing/2014/main" id="{8BA3F8E6-841C-4855-972F-F238036EE6F7}"/>
               </a:ext>
             </a:extLst>
           </p:cNvPr>
@@ -6437,8 +6909,12 @@
           <a:lstStyle/>
           <a:p>
             <a:r>
-              <a:rPr lang="en-US" dirty="0"/>
-              <a:t>Future Work </a:t>
+              <a:rPr lang="en-US" dirty="0">
+                <a:solidFill>
+                  <a:schemeClr val="accent2"/>
+                </a:solidFill>
+              </a:rPr>
+              <a:t>Demo </a:t>
             </a:r>
           </a:p>
         </p:txBody>
@@ -6448,7 +6924,7 @@
           <p:cNvPr id="3" name="Content Placeholder 2">
             <a:extLst>
               <a:ext uri="{FF2B5EF4-FFF2-40B4-BE49-F238E27FC236}">
-                <a16:creationId xmlns:a16="http://schemas.microsoft.com/office/drawing/2014/main" id="{F2DD3725-A513-4E76-B0B2-E4657C97DCCA}"/>
+                <a16:creationId xmlns:a16="http://schemas.microsoft.com/office/drawing/2014/main" id="{1395AD4C-E6B9-46B3-9FD3-98304FBF19DA}"/>
               </a:ext>
             </a:extLst>
           </p:cNvPr>
@@ -6461,140 +6937,47 @@
         </p:nvSpPr>
         <p:spPr/>
         <p:txBody>
-          <a:bodyPr>
-            <a:normAutofit lnSpcReduction="10000"/>
-          </a:bodyPr>
-          <a:lstStyle/>
-          <a:p>
-            <a:r>
-              <a:rPr lang="en-US" dirty="0">
-                <a:solidFill>
-                  <a:schemeClr val="tx1"/>
-                </a:solidFill>
-              </a:rPr>
-              <a:t>Improve visuals </a:t>
-            </a:r>
-          </a:p>
-          <a:p>
-            <a:r>
-              <a:rPr lang="en-US" dirty="0">
-                <a:solidFill>
-                  <a:schemeClr val="tx1"/>
-                </a:solidFill>
-              </a:rPr>
-              <a:t>Adjust gameplay to encourage different styles of play </a:t>
-            </a:r>
-          </a:p>
-          <a:p>
-            <a:pPr lvl="1"/>
-            <a:r>
-              <a:rPr lang="en-US" dirty="0">
-                <a:solidFill>
-                  <a:schemeClr val="tx1"/>
-                </a:solidFill>
-              </a:rPr>
-              <a:t>Different enemy types have different weaknesses/strengths, which must be adapted to </a:t>
-            </a:r>
-          </a:p>
-          <a:p>
-            <a:pPr lvl="1"/>
-            <a:r>
-              <a:rPr lang="en-US" dirty="0">
-                <a:solidFill>
-                  <a:schemeClr val="tx1"/>
-                </a:solidFill>
-              </a:rPr>
-              <a:t>Unlocking new runes and abilities over time encourage exploration </a:t>
-            </a:r>
-          </a:p>
-          <a:p>
-            <a:pPr lvl="1"/>
-            <a:r>
-              <a:rPr lang="en-US" dirty="0">
-                <a:solidFill>
-                  <a:schemeClr val="tx1"/>
-                </a:solidFill>
-              </a:rPr>
-              <a:t>Adding combos will encourage players to be more strategic with their runes </a:t>
-            </a:r>
-          </a:p>
-          <a:p>
-            <a:pPr lvl="1"/>
-            <a:r>
-              <a:rPr lang="en-US" dirty="0">
-                <a:solidFill>
-                  <a:schemeClr val="tx1"/>
-                </a:solidFill>
-              </a:rPr>
-              <a:t>Combining runes of different types will add new possibilities</a:t>
-            </a:r>
-          </a:p>
-          <a:p>
-            <a:pPr lvl="1"/>
-            <a:r>
-              <a:rPr lang="en-US" dirty="0">
-                <a:solidFill>
-                  <a:schemeClr val="tx1"/>
-                </a:solidFill>
-              </a:rPr>
-              <a:t>Expand the scope of animations, allowing players to anticipate and react to enemy actions </a:t>
-            </a:r>
-          </a:p>
-          <a:p>
-            <a:r>
-              <a:rPr lang="en-US" dirty="0">
-                <a:solidFill>
-                  <a:schemeClr val="tx1"/>
-                </a:solidFill>
-              </a:rPr>
-              <a:t>Higher levels of player customization </a:t>
-            </a:r>
-          </a:p>
-          <a:p>
-            <a:r>
-              <a:rPr lang="en-US" dirty="0">
-                <a:solidFill>
-                  <a:schemeClr val="tx1"/>
-                </a:solidFill>
-              </a:rPr>
-              <a:t>Add additional RPG elements (more characters, more customization, items, </a:t>
-            </a:r>
-            <a:r>
-              <a:rPr lang="en-US" dirty="0" err="1">
-                <a:solidFill>
-                  <a:schemeClr val="tx1"/>
-                </a:solidFill>
-              </a:rPr>
-              <a:t>etc</a:t>
-            </a:r>
-            <a:r>
-              <a:rPr lang="en-US" dirty="0">
-                <a:solidFill>
-                  <a:schemeClr val="tx1"/>
-                </a:solidFill>
-              </a:rPr>
-              <a:t>). </a:t>
-            </a:r>
-          </a:p>
-          <a:p>
-            <a:endParaRPr lang="en-US" dirty="0">
-              <a:solidFill>
-                <a:schemeClr val="tx1"/>
-              </a:solidFill>
-            </a:endParaRPr>
-          </a:p>
-          <a:p>
-            <a:pPr marL="0" indent="0">
-              <a:buNone/>
-            </a:pPr>
-            <a:endParaRPr lang="en-US" dirty="0"/>
-          </a:p>
-        </p:txBody>
-      </p:sp>
+          <a:bodyPr/>
+          <a:lstStyle/>
+          <a:p>
+            <a:endParaRPr lang="en-US"/>
+          </a:p>
+        </p:txBody>
+      </p:sp>
+      <p:pic>
+        <p:nvPicPr>
+          <p:cNvPr id="4" name="Picture 3" descr="A close up of a logo&#10;&#10;Description generated with high confidence">
+            <a:extLst>
+              <a:ext uri="{FF2B5EF4-FFF2-40B4-BE49-F238E27FC236}">
+                <a16:creationId xmlns:a16="http://schemas.microsoft.com/office/drawing/2014/main" id="{1E58B061-8667-4B4F-A9EE-2AB4609C4930}"/>
+              </a:ext>
+            </a:extLst>
+          </p:cNvPr>
+          <p:cNvPicPr>
+            <a:picLocks noChangeAspect="1"/>
+          </p:cNvPicPr>
+          <p:nvPr/>
+        </p:nvPicPr>
+        <p:blipFill>
+          <a:blip r:embed="rId2"/>
+          <a:stretch>
+            <a:fillRect/>
+          </a:stretch>
+        </p:blipFill>
+        <p:spPr>
+          <a:xfrm>
+            <a:off x="10413210" y="5153324"/>
+            <a:ext cx="1447532" cy="1447532"/>
+          </a:xfrm>
+          <a:prstGeom prst="rect">
+            <a:avLst/>
+          </a:prstGeom>
+        </p:spPr>
+      </p:pic>
     </p:spTree>
     <p:extLst>
       <p:ext uri="{BB962C8B-B14F-4D97-AF65-F5344CB8AC3E}">
-        <p14:creationId xmlns:p14="http://schemas.microsoft.com/office/powerpoint/2010/main" val="2969183844"/>
+        <p14:creationId xmlns:p14="http://schemas.microsoft.com/office/powerpoint/2010/main" val="872691335"/>
       </p:ext>
     </p:extLst>
   </p:cSld>
@@ -6626,6 +7009,404 @@
           <p:cNvPr id="2" name="Title 1">
             <a:extLst>
               <a:ext uri="{FF2B5EF4-FFF2-40B4-BE49-F238E27FC236}">
+                <a16:creationId xmlns:a16="http://schemas.microsoft.com/office/drawing/2014/main" id="{2333718F-E2E9-4094-B3FF-89ED50F22CE9}"/>
+              </a:ext>
+            </a:extLst>
+          </p:cNvPr>
+          <p:cNvSpPr>
+            <a:spLocks noGrp="1"/>
+          </p:cNvSpPr>
+          <p:nvPr>
+            <p:ph type="title"/>
+          </p:nvPr>
+        </p:nvSpPr>
+        <p:spPr/>
+        <p:txBody>
+          <a:bodyPr/>
+          <a:lstStyle/>
+          <a:p>
+            <a:r>
+              <a:rPr lang="en-US" dirty="0">
+                <a:solidFill>
+                  <a:schemeClr val="accent2"/>
+                </a:solidFill>
+              </a:rPr>
+              <a:t>Challenges </a:t>
+            </a:r>
+          </a:p>
+        </p:txBody>
+      </p:sp>
+      <p:sp>
+        <p:nvSpPr>
+          <p:cNvPr id="3" name="Content Placeholder 2">
+            <a:extLst>
+              <a:ext uri="{FF2B5EF4-FFF2-40B4-BE49-F238E27FC236}">
+                <a16:creationId xmlns:a16="http://schemas.microsoft.com/office/drawing/2014/main" id="{CC24B83A-F527-48AD-9E97-301509BA00CE}"/>
+              </a:ext>
+            </a:extLst>
+          </p:cNvPr>
+          <p:cNvSpPr>
+            <a:spLocks noGrp="1"/>
+          </p:cNvSpPr>
+          <p:nvPr>
+            <p:ph idx="1"/>
+          </p:nvPr>
+        </p:nvSpPr>
+        <p:spPr/>
+        <p:txBody>
+          <a:bodyPr>
+            <a:normAutofit/>
+          </a:bodyPr>
+          <a:lstStyle/>
+          <a:p>
+            <a:r>
+              <a:rPr lang="en-US" sz="2400" dirty="0">
+                <a:solidFill>
+                  <a:schemeClr val="accent1"/>
+                </a:solidFill>
+              </a:rPr>
+              <a:t>Working with the Processing environment </a:t>
+            </a:r>
+          </a:p>
+          <a:p>
+            <a:pPr lvl="1"/>
+            <a:r>
+              <a:rPr lang="en-US" sz="2400" dirty="0">
+                <a:solidFill>
+                  <a:schemeClr val="accent1"/>
+                </a:solidFill>
+              </a:rPr>
+              <a:t>Tabbed structure made it difficult to work with many files </a:t>
+            </a:r>
+          </a:p>
+          <a:p>
+            <a:pPr lvl="1"/>
+            <a:r>
+              <a:rPr lang="en-US" sz="2400" dirty="0">
+                <a:solidFill>
+                  <a:schemeClr val="accent1"/>
+                </a:solidFill>
+              </a:rPr>
+              <a:t>Very limited IDE made development slow </a:t>
+            </a:r>
+          </a:p>
+          <a:p>
+            <a:r>
+              <a:rPr lang="en-US" sz="2400" dirty="0">
+                <a:solidFill>
+                  <a:schemeClr val="accent1"/>
+                </a:solidFill>
+              </a:rPr>
+              <a:t>Converting from Processing to Java </a:t>
+            </a:r>
+          </a:p>
+        </p:txBody>
+      </p:sp>
+      <p:pic>
+        <p:nvPicPr>
+          <p:cNvPr id="4" name="Picture 3" descr="A close up of a logo&#10;&#10;Description generated with high confidence">
+            <a:extLst>
+              <a:ext uri="{FF2B5EF4-FFF2-40B4-BE49-F238E27FC236}">
+                <a16:creationId xmlns:a16="http://schemas.microsoft.com/office/drawing/2014/main" id="{223CCD8D-D872-4199-BFA0-E0C1049CEF1C}"/>
+              </a:ext>
+            </a:extLst>
+          </p:cNvPr>
+          <p:cNvPicPr>
+            <a:picLocks noChangeAspect="1"/>
+          </p:cNvPicPr>
+          <p:nvPr/>
+        </p:nvPicPr>
+        <p:blipFill>
+          <a:blip r:embed="rId2"/>
+          <a:stretch>
+            <a:fillRect/>
+          </a:stretch>
+        </p:blipFill>
+        <p:spPr>
+          <a:xfrm>
+            <a:off x="10413210" y="5153324"/>
+            <a:ext cx="1447532" cy="1447532"/>
+          </a:xfrm>
+          <a:prstGeom prst="rect">
+            <a:avLst/>
+          </a:prstGeom>
+        </p:spPr>
+      </p:pic>
+    </p:spTree>
+    <p:extLst>
+      <p:ext uri="{BB962C8B-B14F-4D97-AF65-F5344CB8AC3E}">
+        <p14:creationId xmlns:p14="http://schemas.microsoft.com/office/powerpoint/2010/main" val="184836384"/>
+      </p:ext>
+    </p:extLst>
+  </p:cSld>
+  <p:clrMapOvr>
+    <a:masterClrMapping/>
+  </p:clrMapOvr>
+</p:sld>
+</file>
+
+<file path=ppt/slides/slide17.xml><?xml version="1.0" encoding="utf-8"?>
+<p:sld xmlns:a="http://schemas.openxmlformats.org/drawingml/2006/main" xmlns:r="http://schemas.openxmlformats.org/officeDocument/2006/relationships" xmlns:p="http://schemas.openxmlformats.org/presentationml/2006/main">
+  <p:cSld>
+    <p:spTree>
+      <p:nvGrpSpPr>
+        <p:cNvPr id="1" name=""/>
+        <p:cNvGrpSpPr/>
+        <p:nvPr/>
+      </p:nvGrpSpPr>
+      <p:grpSpPr>
+        <a:xfrm>
+          <a:off x="0" y="0"/>
+          <a:ext cx="0" cy="0"/>
+          <a:chOff x="0" y="0"/>
+          <a:chExt cx="0" cy="0"/>
+        </a:xfrm>
+      </p:grpSpPr>
+      <p:sp>
+        <p:nvSpPr>
+          <p:cNvPr id="2" name="Title 1">
+            <a:extLst>
+              <a:ext uri="{FF2B5EF4-FFF2-40B4-BE49-F238E27FC236}">
+                <a16:creationId xmlns:a16="http://schemas.microsoft.com/office/drawing/2014/main" id="{A4D5EE3B-1080-4F64-BEED-695281AE4AFB}"/>
+              </a:ext>
+            </a:extLst>
+          </p:cNvPr>
+          <p:cNvSpPr>
+            <a:spLocks noGrp="1"/>
+          </p:cNvSpPr>
+          <p:nvPr>
+            <p:ph type="title"/>
+          </p:nvPr>
+        </p:nvSpPr>
+        <p:spPr/>
+        <p:txBody>
+          <a:bodyPr/>
+          <a:lstStyle/>
+          <a:p>
+            <a:r>
+              <a:rPr lang="en-US" dirty="0">
+                <a:solidFill>
+                  <a:schemeClr val="accent2"/>
+                </a:solidFill>
+              </a:rPr>
+              <a:t>Future Work </a:t>
+            </a:r>
+          </a:p>
+        </p:txBody>
+      </p:sp>
+      <p:sp>
+        <p:nvSpPr>
+          <p:cNvPr id="3" name="Content Placeholder 2">
+            <a:extLst>
+              <a:ext uri="{FF2B5EF4-FFF2-40B4-BE49-F238E27FC236}">
+                <a16:creationId xmlns:a16="http://schemas.microsoft.com/office/drawing/2014/main" id="{F2DD3725-A513-4E76-B0B2-E4657C97DCCA}"/>
+              </a:ext>
+            </a:extLst>
+          </p:cNvPr>
+          <p:cNvSpPr>
+            <a:spLocks noGrp="1"/>
+          </p:cNvSpPr>
+          <p:nvPr>
+            <p:ph idx="1"/>
+          </p:nvPr>
+        </p:nvSpPr>
+        <p:spPr/>
+        <p:txBody>
+          <a:bodyPr>
+            <a:normAutofit lnSpcReduction="10000"/>
+          </a:bodyPr>
+          <a:lstStyle/>
+          <a:p>
+            <a:r>
+              <a:rPr lang="en-US" dirty="0">
+                <a:solidFill>
+                  <a:schemeClr val="accent1"/>
+                </a:solidFill>
+              </a:rPr>
+              <a:t>Improve visuals </a:t>
+            </a:r>
+          </a:p>
+          <a:p>
+            <a:r>
+              <a:rPr lang="en-US" dirty="0">
+                <a:solidFill>
+                  <a:schemeClr val="accent1"/>
+                </a:solidFill>
+              </a:rPr>
+              <a:t>Adjust gameplay to encourage different styles of play </a:t>
+            </a:r>
+          </a:p>
+          <a:p>
+            <a:pPr lvl="1"/>
+            <a:r>
+              <a:rPr lang="en-US" dirty="0">
+                <a:solidFill>
+                  <a:schemeClr val="accent1"/>
+                </a:solidFill>
+              </a:rPr>
+              <a:t>Different enemy types have different weaknesses/strengths, which must be adapted to </a:t>
+            </a:r>
+          </a:p>
+          <a:p>
+            <a:pPr lvl="1"/>
+            <a:r>
+              <a:rPr lang="en-US" dirty="0">
+                <a:solidFill>
+                  <a:schemeClr val="accent1"/>
+                </a:solidFill>
+              </a:rPr>
+              <a:t>Unlocking new runes and abilities over time encourage exploration </a:t>
+            </a:r>
+          </a:p>
+          <a:p>
+            <a:pPr lvl="1"/>
+            <a:r>
+              <a:rPr lang="en-US" dirty="0">
+                <a:solidFill>
+                  <a:schemeClr val="accent1"/>
+                </a:solidFill>
+              </a:rPr>
+              <a:t>Adding combos will encourage players to be more strategic with their runes </a:t>
+            </a:r>
+          </a:p>
+          <a:p>
+            <a:pPr lvl="1"/>
+            <a:r>
+              <a:rPr lang="en-US" dirty="0">
+                <a:solidFill>
+                  <a:schemeClr val="accent1"/>
+                </a:solidFill>
+              </a:rPr>
+              <a:t>Combining runes of different types will add new possibilities</a:t>
+            </a:r>
+          </a:p>
+          <a:p>
+            <a:pPr lvl="1"/>
+            <a:r>
+              <a:rPr lang="en-US" dirty="0">
+                <a:solidFill>
+                  <a:schemeClr val="accent1"/>
+                </a:solidFill>
+              </a:rPr>
+              <a:t>Expand the scope of animations, allowing players to anticipate and react to enemy actions </a:t>
+            </a:r>
+          </a:p>
+          <a:p>
+            <a:r>
+              <a:rPr lang="en-US" dirty="0">
+                <a:solidFill>
+                  <a:schemeClr val="accent1"/>
+                </a:solidFill>
+              </a:rPr>
+              <a:t>Higher levels of player customization </a:t>
+            </a:r>
+          </a:p>
+          <a:p>
+            <a:r>
+              <a:rPr lang="en-US" dirty="0">
+                <a:solidFill>
+                  <a:schemeClr val="accent1"/>
+                </a:solidFill>
+              </a:rPr>
+              <a:t>Add additional RPG elements (more characters, more customization, items, </a:t>
+            </a:r>
+            <a:r>
+              <a:rPr lang="en-US" dirty="0" err="1">
+                <a:solidFill>
+                  <a:schemeClr val="accent1"/>
+                </a:solidFill>
+              </a:rPr>
+              <a:t>etc</a:t>
+            </a:r>
+            <a:r>
+              <a:rPr lang="en-US" dirty="0">
+                <a:solidFill>
+                  <a:schemeClr val="accent1"/>
+                </a:solidFill>
+              </a:rPr>
+              <a:t>). </a:t>
+            </a:r>
+          </a:p>
+          <a:p>
+            <a:endParaRPr lang="en-US" dirty="0">
+              <a:solidFill>
+                <a:schemeClr val="accent1"/>
+              </a:solidFill>
+            </a:endParaRPr>
+          </a:p>
+          <a:p>
+            <a:pPr marL="0" indent="0">
+              <a:buNone/>
+            </a:pPr>
+            <a:endParaRPr lang="en-US" dirty="0"/>
+          </a:p>
+        </p:txBody>
+      </p:sp>
+      <p:pic>
+        <p:nvPicPr>
+          <p:cNvPr id="4" name="Picture 3" descr="A close up of a logo&#10;&#10;Description generated with high confidence">
+            <a:extLst>
+              <a:ext uri="{FF2B5EF4-FFF2-40B4-BE49-F238E27FC236}">
+                <a16:creationId xmlns:a16="http://schemas.microsoft.com/office/drawing/2014/main" id="{67719883-22CE-4499-A2E2-A0840CCA9CCD}"/>
+              </a:ext>
+            </a:extLst>
+          </p:cNvPr>
+          <p:cNvPicPr>
+            <a:picLocks noChangeAspect="1"/>
+          </p:cNvPicPr>
+          <p:nvPr/>
+        </p:nvPicPr>
+        <p:blipFill>
+          <a:blip r:embed="rId2"/>
+          <a:stretch>
+            <a:fillRect/>
+          </a:stretch>
+        </p:blipFill>
+        <p:spPr>
+          <a:xfrm>
+            <a:off x="10413210" y="5153324"/>
+            <a:ext cx="1447532" cy="1447532"/>
+          </a:xfrm>
+          <a:prstGeom prst="rect">
+            <a:avLst/>
+          </a:prstGeom>
+        </p:spPr>
+      </p:pic>
+    </p:spTree>
+    <p:extLst>
+      <p:ext uri="{BB962C8B-B14F-4D97-AF65-F5344CB8AC3E}">
+        <p14:creationId xmlns:p14="http://schemas.microsoft.com/office/powerpoint/2010/main" val="2969183844"/>
+      </p:ext>
+    </p:extLst>
+  </p:cSld>
+  <p:clrMapOvr>
+    <a:masterClrMapping/>
+  </p:clrMapOvr>
+</p:sld>
+</file>
+
+<file path=ppt/slides/slide18.xml><?xml version="1.0" encoding="utf-8"?>
+<p:sld xmlns:a="http://schemas.openxmlformats.org/drawingml/2006/main" xmlns:r="http://schemas.openxmlformats.org/officeDocument/2006/relationships" xmlns:p="http://schemas.openxmlformats.org/presentationml/2006/main">
+  <p:cSld>
+    <p:spTree>
+      <p:nvGrpSpPr>
+        <p:cNvPr id="1" name=""/>
+        <p:cNvGrpSpPr/>
+        <p:nvPr/>
+      </p:nvGrpSpPr>
+      <p:grpSpPr>
+        <a:xfrm>
+          <a:off x="0" y="0"/>
+          <a:ext cx="0" cy="0"/>
+          <a:chOff x="0" y="0"/>
+          <a:chExt cx="0" cy="0"/>
+        </a:xfrm>
+      </p:grpSpPr>
+      <p:sp>
+        <p:nvSpPr>
+          <p:cNvPr id="2" name="Title 1">
+            <a:extLst>
+              <a:ext uri="{FF2B5EF4-FFF2-40B4-BE49-F238E27FC236}">
                 <a16:creationId xmlns:a16="http://schemas.microsoft.com/office/drawing/2014/main" id="{C9D51AB2-939D-471A-82D5-E1978652FA4F}"/>
               </a:ext>
             </a:extLst>
@@ -6637,13 +7418,22 @@
             <p:ph type="title"/>
           </p:nvPr>
         </p:nvSpPr>
-        <p:spPr/>
+        <p:spPr>
+          <a:xfrm>
+            <a:off x="606995" y="618392"/>
+            <a:ext cx="8596668" cy="1320800"/>
+          </a:xfrm>
+        </p:spPr>
         <p:txBody>
           <a:bodyPr/>
           <a:lstStyle/>
           <a:p>
             <a:r>
-              <a:rPr lang="en-US" dirty="0"/>
+              <a:rPr lang="en-US" dirty="0">
+                <a:solidFill>
+                  <a:schemeClr val="accent2"/>
+                </a:solidFill>
+              </a:rPr>
               <a:t>Any Questions? </a:t>
             </a:r>
           </a:p>
@@ -6674,6 +7464,36 @@
           </a:p>
         </p:txBody>
       </p:sp>
+      <p:pic>
+        <p:nvPicPr>
+          <p:cNvPr id="4" name="Picture 3" descr="A close up of a logo&#10;&#10;Description generated with high confidence">
+            <a:extLst>
+              <a:ext uri="{FF2B5EF4-FFF2-40B4-BE49-F238E27FC236}">
+                <a16:creationId xmlns:a16="http://schemas.microsoft.com/office/drawing/2014/main" id="{1E10D7E1-6BB3-4B93-B324-57BEAE3C73EA}"/>
+              </a:ext>
+            </a:extLst>
+          </p:cNvPr>
+          <p:cNvPicPr>
+            <a:picLocks noChangeAspect="1"/>
+          </p:cNvPicPr>
+          <p:nvPr/>
+        </p:nvPicPr>
+        <p:blipFill>
+          <a:blip r:embed="rId2"/>
+          <a:stretch>
+            <a:fillRect/>
+          </a:stretch>
+        </p:blipFill>
+        <p:spPr>
+          <a:xfrm>
+            <a:off x="10413210" y="5153324"/>
+            <a:ext cx="1447532" cy="1447532"/>
+          </a:xfrm>
+          <a:prstGeom prst="rect">
+            <a:avLst/>
+          </a:prstGeom>
+        </p:spPr>
+      </p:pic>
     </p:spTree>
     <p:extLst>
       <p:ext uri="{BB962C8B-B14F-4D97-AF65-F5344CB8AC3E}">
@@ -6734,10 +7554,13 @@
           <a:p>
             <a:pPr algn="r"/>
             <a:r>
-              <a:rPr lang="en-US"/>
+              <a:rPr lang="en-US" dirty="0">
+                <a:solidFill>
+                  <a:schemeClr val="accent2"/>
+                </a:solidFill>
+              </a:rPr>
               <a:t>Original Project Goal </a:t>
             </a:r>
-            <a:endParaRPr lang="en-US" dirty="0"/>
           </a:p>
         </p:txBody>
       </p:sp>
@@ -6805,6 +7628,36 @@
           </a:p>
         </p:txBody>
       </p:sp>
+      <p:pic>
+        <p:nvPicPr>
+          <p:cNvPr id="5" name="Picture 4" descr="A close up of a logo&#10;&#10;Description generated with high confidence">
+            <a:extLst>
+              <a:ext uri="{FF2B5EF4-FFF2-40B4-BE49-F238E27FC236}">
+                <a16:creationId xmlns:a16="http://schemas.microsoft.com/office/drawing/2014/main" id="{58711999-8B35-4146-9F88-479EB6FC1169}"/>
+              </a:ext>
+            </a:extLst>
+          </p:cNvPr>
+          <p:cNvPicPr>
+            <a:picLocks noChangeAspect="1"/>
+          </p:cNvPicPr>
+          <p:nvPr/>
+        </p:nvPicPr>
+        <p:blipFill>
+          <a:blip r:embed="rId2"/>
+          <a:stretch>
+            <a:fillRect/>
+          </a:stretch>
+        </p:blipFill>
+        <p:spPr>
+          <a:xfrm>
+            <a:off x="10413210" y="5153324"/>
+            <a:ext cx="1447532" cy="1447532"/>
+          </a:xfrm>
+          <a:prstGeom prst="rect">
+            <a:avLst/>
+          </a:prstGeom>
+        </p:spPr>
+      </p:pic>
     </p:spTree>
     <p:extLst>
       <p:ext uri="{BB962C8B-B14F-4D97-AF65-F5344CB8AC3E}">
@@ -6862,8 +7715,16 @@
           <a:lstStyle/>
           <a:p>
             <a:r>
+              <a:rPr lang="en-US" dirty="0">
+                <a:solidFill>
+                  <a:schemeClr val="accent2"/>
+                </a:solidFill>
+              </a:rPr>
+              <a:t>Requirements</a:t>
+            </a:r>
+            <a:r>
               <a:rPr lang="en-US" dirty="0"/>
-              <a:t>Requirements </a:t>
+              <a:t> </a:t>
             </a:r>
           </a:p>
         </p:txBody>
@@ -6927,6 +7788,36 @@
           </a:p>
         </p:txBody>
       </p:sp>
+      <p:pic>
+        <p:nvPicPr>
+          <p:cNvPr id="5" name="Picture 4" descr="A close up of a logo&#10;&#10;Description generated with high confidence">
+            <a:extLst>
+              <a:ext uri="{FF2B5EF4-FFF2-40B4-BE49-F238E27FC236}">
+                <a16:creationId xmlns:a16="http://schemas.microsoft.com/office/drawing/2014/main" id="{5F2E04FC-950C-4060-9B3A-8FA0CFBD1877}"/>
+              </a:ext>
+            </a:extLst>
+          </p:cNvPr>
+          <p:cNvPicPr>
+            <a:picLocks noChangeAspect="1"/>
+          </p:cNvPicPr>
+          <p:nvPr/>
+        </p:nvPicPr>
+        <p:blipFill>
+          <a:blip r:embed="rId2"/>
+          <a:stretch>
+            <a:fillRect/>
+          </a:stretch>
+        </p:blipFill>
+        <p:spPr>
+          <a:xfrm>
+            <a:off x="10413210" y="5153324"/>
+            <a:ext cx="1447532" cy="1447532"/>
+          </a:xfrm>
+          <a:prstGeom prst="rect">
+            <a:avLst/>
+          </a:prstGeom>
+        </p:spPr>
+      </p:pic>
     </p:spTree>
     <p:extLst>
       <p:ext uri="{BB962C8B-B14F-4D97-AF65-F5344CB8AC3E}">
@@ -6987,7 +7878,11 @@
           <a:p>
             <a:pPr algn="r"/>
             <a:r>
-              <a:rPr lang="en-US" sz="5200" dirty="0"/>
+              <a:rPr lang="en-US" sz="5200" dirty="0">
+                <a:solidFill>
+                  <a:schemeClr val="accent2"/>
+                </a:solidFill>
+              </a:rPr>
               <a:t>Timeline</a:t>
             </a:r>
           </a:p>
@@ -7271,7 +8166,11 @@
           <a:p>
             <a:pPr algn="r"/>
             <a:r>
-              <a:rPr lang="en-US" sz="2400" dirty="0"/>
+              <a:rPr lang="en-US" sz="2400" dirty="0">
+                <a:solidFill>
+                  <a:schemeClr val="accent2"/>
+                </a:solidFill>
+              </a:rPr>
               <a:t>Planned</a:t>
             </a:r>
           </a:p>
@@ -7379,7 +8278,11 @@
           <a:p>
             <a:pPr algn="r"/>
             <a:r>
-              <a:rPr lang="en-US" sz="2400" dirty="0"/>
+              <a:rPr lang="en-US" sz="2400" dirty="0">
+                <a:solidFill>
+                  <a:schemeClr val="accent2"/>
+                </a:solidFill>
+              </a:rPr>
               <a:t>Actual</a:t>
             </a:r>
           </a:p>
@@ -7769,6 +8672,36 @@
           </a:p>
         </p:txBody>
       </p:sp>
+      <p:pic>
+        <p:nvPicPr>
+          <p:cNvPr id="10" name="Picture 9" descr="A close up of a logo&#10;&#10;Description generated with high confidence">
+            <a:extLst>
+              <a:ext uri="{FF2B5EF4-FFF2-40B4-BE49-F238E27FC236}">
+                <a16:creationId xmlns:a16="http://schemas.microsoft.com/office/drawing/2014/main" id="{4D0F9E77-FA1D-45B2-BAF2-92BC565E9B4D}"/>
+              </a:ext>
+            </a:extLst>
+          </p:cNvPr>
+          <p:cNvPicPr>
+            <a:picLocks noChangeAspect="1"/>
+          </p:cNvPicPr>
+          <p:nvPr/>
+        </p:nvPicPr>
+        <p:blipFill>
+          <a:blip r:embed="rId2"/>
+          <a:stretch>
+            <a:fillRect/>
+          </a:stretch>
+        </p:blipFill>
+        <p:spPr>
+          <a:xfrm>
+            <a:off x="10413210" y="5153324"/>
+            <a:ext cx="1447532" cy="1447532"/>
+          </a:xfrm>
+          <a:prstGeom prst="rect">
+            <a:avLst/>
+          </a:prstGeom>
+        </p:spPr>
+      </p:pic>
     </p:spTree>
     <p:extLst>
       <p:ext uri="{BB962C8B-B14F-4D97-AF65-F5344CB8AC3E}">
@@ -7821,7 +8754,11 @@
           <a:lstStyle/>
           <a:p>
             <a:r>
-              <a:rPr lang="en-US" dirty="0"/>
+              <a:rPr lang="en-US" dirty="0">
+                <a:solidFill>
+                  <a:schemeClr val="accent2"/>
+                </a:solidFill>
+              </a:rPr>
               <a:t>Technologies Used</a:t>
             </a:r>
           </a:p>
@@ -7892,6 +8829,36 @@
           <a:xfrm>
             <a:off x="9446601" y="1457325"/>
             <a:ext cx="1971675" cy="1971675"/>
+          </a:xfrm>
+          <a:prstGeom prst="rect">
+            <a:avLst/>
+          </a:prstGeom>
+        </p:spPr>
+      </p:pic>
+      <p:pic>
+        <p:nvPicPr>
+          <p:cNvPr id="6" name="Picture 5" descr="A close up of a logo&#10;&#10;Description generated with high confidence">
+            <a:extLst>
+              <a:ext uri="{FF2B5EF4-FFF2-40B4-BE49-F238E27FC236}">
+                <a16:creationId xmlns:a16="http://schemas.microsoft.com/office/drawing/2014/main" id="{C0560E88-D5FE-488E-94D5-790F07525AC1}"/>
+              </a:ext>
+            </a:extLst>
+          </p:cNvPr>
+          <p:cNvPicPr>
+            <a:picLocks noChangeAspect="1"/>
+          </p:cNvPicPr>
+          <p:nvPr/>
+        </p:nvPicPr>
+        <p:blipFill>
+          <a:blip r:embed="rId3"/>
+          <a:stretch>
+            <a:fillRect/>
+          </a:stretch>
+        </p:blipFill>
+        <p:spPr>
+          <a:xfrm>
+            <a:off x="10413210" y="5162849"/>
+            <a:ext cx="1447532" cy="1447532"/>
           </a:xfrm>
           <a:prstGeom prst="rect">
             <a:avLst/>
@@ -7944,21 +8911,19 @@
             <p:ph type="title"/>
           </p:nvPr>
         </p:nvSpPr>
-        <p:spPr>
-          <a:xfrm>
-            <a:off x="677334" y="609600"/>
-            <a:ext cx="8596668" cy="1320800"/>
-          </a:xfrm>
-        </p:spPr>
+        <p:spPr/>
         <p:txBody>
           <a:bodyPr/>
           <a:lstStyle/>
           <a:p>
             <a:r>
-              <a:rPr lang="en-US"/>
+              <a:rPr lang="en-US" dirty="0">
+                <a:solidFill>
+                  <a:schemeClr val="accent2"/>
+                </a:solidFill>
+              </a:rPr>
               <a:t>Overall Structure </a:t>
             </a:r>
-            <a:endParaRPr lang="en-US" dirty="0"/>
           </a:p>
         </p:txBody>
       </p:sp>
@@ -7986,6 +8951,36 @@
           <a:xfrm>
             <a:off x="795337" y="1270000"/>
             <a:ext cx="7510463" cy="4787900"/>
+          </a:xfrm>
+          <a:prstGeom prst="rect">
+            <a:avLst/>
+          </a:prstGeom>
+        </p:spPr>
+      </p:pic>
+      <p:pic>
+        <p:nvPicPr>
+          <p:cNvPr id="6" name="Picture 5" descr="A close up of a logo&#10;&#10;Description generated with high confidence">
+            <a:extLst>
+              <a:ext uri="{FF2B5EF4-FFF2-40B4-BE49-F238E27FC236}">
+                <a16:creationId xmlns:a16="http://schemas.microsoft.com/office/drawing/2014/main" id="{7B7C04BC-B0FF-47E4-9BF3-0F16611C2652}"/>
+              </a:ext>
+            </a:extLst>
+          </p:cNvPr>
+          <p:cNvPicPr>
+            <a:picLocks noChangeAspect="1"/>
+          </p:cNvPicPr>
+          <p:nvPr/>
+        </p:nvPicPr>
+        <p:blipFill>
+          <a:blip r:embed="rId3"/>
+          <a:stretch>
+            <a:fillRect/>
+          </a:stretch>
+        </p:blipFill>
+        <p:spPr>
+          <a:xfrm>
+            <a:off x="10413210" y="5153324"/>
+            <a:ext cx="1447532" cy="1447532"/>
           </a:xfrm>
           <a:prstGeom prst="rect">
             <a:avLst/>
@@ -8027,7 +9022,7 @@
           <p:cNvPr id="2" name="Title 1">
             <a:extLst>
               <a:ext uri="{FF2B5EF4-FFF2-40B4-BE49-F238E27FC236}">
-                <a16:creationId xmlns:a16="http://schemas.microsoft.com/office/drawing/2014/main" id="{2D3EF30E-CF36-485C-8A6B-2D0EAF9D90EA}"/>
+                <a16:creationId xmlns:a16="http://schemas.microsoft.com/office/drawing/2014/main" id="{639B60AD-DC66-47DF-93F4-6AF9118EC38F}"/>
               </a:ext>
             </a:extLst>
           </p:cNvPr>
@@ -8038,116 +9033,616 @@
             <p:ph type="title"/>
           </p:nvPr>
         </p:nvSpPr>
-        <p:spPr/>
-        <p:txBody>
-          <a:bodyPr/>
-          <a:lstStyle/>
-          <a:p>
-            <a:r>
-              <a:rPr lang="en-US" dirty="0"/>
-              <a:t>The Main Class</a:t>
-            </a:r>
-          </a:p>
-        </p:txBody>
-      </p:sp>
-      <p:sp>
-        <p:nvSpPr>
-          <p:cNvPr id="3" name="Content Placeholder 2">
+        <p:spPr>
+          <a:xfrm>
+            <a:off x="677334" y="609600"/>
+            <a:ext cx="8596668" cy="621323"/>
+          </a:xfrm>
+        </p:spPr>
+        <p:txBody>
+          <a:bodyPr>
+            <a:normAutofit fontScale="90000"/>
+          </a:bodyPr>
+          <a:lstStyle/>
+          <a:p>
+            <a:r>
+              <a:rPr lang="en-US" dirty="0">
+                <a:solidFill>
+                  <a:schemeClr val="accent2"/>
+                </a:solidFill>
+              </a:rPr>
+              <a:t>Control Flow </a:t>
+            </a:r>
+          </a:p>
+        </p:txBody>
+      </p:sp>
+      <p:sp>
+        <p:nvSpPr>
+          <p:cNvPr id="5" name="Rectangle: Rounded Corners 4">
             <a:extLst>
               <a:ext uri="{FF2B5EF4-FFF2-40B4-BE49-F238E27FC236}">
-                <a16:creationId xmlns:a16="http://schemas.microsoft.com/office/drawing/2014/main" id="{7120DB0F-FB77-4342-B627-FDB5CEB938F2}"/>
+                <a16:creationId xmlns:a16="http://schemas.microsoft.com/office/drawing/2014/main" id="{43070586-0056-492A-A989-7ECE7CAF86C3}"/>
               </a:ext>
             </a:extLst>
           </p:cNvPr>
-          <p:cNvSpPr>
-            <a:spLocks noGrp="1"/>
-          </p:cNvSpPr>
-          <p:nvPr>
-            <p:ph idx="1"/>
-          </p:nvPr>
+          <p:cNvSpPr/>
+          <p:nvPr/>
         </p:nvSpPr>
         <p:spPr>
           <a:xfrm>
-            <a:off x="677334" y="1411551"/>
-            <a:ext cx="8596668" cy="5446450"/>
+            <a:off x="228601" y="2154115"/>
+            <a:ext cx="1899138" cy="782516"/>
           </a:xfrm>
+          <a:prstGeom prst="roundRect">
+            <a:avLst/>
+          </a:prstGeom>
         </p:spPr>
-        <p:txBody>
-          <a:bodyPr/>
-          <a:lstStyle/>
-          <a:p>
+        <p:style>
+          <a:lnRef idx="2">
+            <a:schemeClr val="accent1">
+              <a:shade val="50000"/>
+            </a:schemeClr>
+          </a:lnRef>
+          <a:fillRef idx="1">
+            <a:schemeClr val="accent1"/>
+          </a:fillRef>
+          <a:effectRef idx="0">
+            <a:schemeClr val="accent1"/>
+          </a:effectRef>
+          <a:fontRef idx="minor">
+            <a:schemeClr val="lt1"/>
+          </a:fontRef>
+        </p:style>
+        <p:txBody>
+          <a:bodyPr rtlCol="0" anchor="ctr"/>
+          <a:lstStyle/>
+          <a:p>
+            <a:pPr algn="ctr"/>
             <a:r>
               <a:rPr lang="en-US" dirty="0"/>
-              <a:t>Processing has 2 required functions in the main class – Setup and Draw</a:t>
-            </a:r>
-          </a:p>
-          <a:p>
-            <a:pPr lvl="1"/>
+              <a:t>Start Menu</a:t>
+            </a:r>
+          </a:p>
+        </p:txBody>
+      </p:sp>
+      <p:sp>
+        <p:nvSpPr>
+          <p:cNvPr id="6" name="Rectangle: Rounded Corners 5">
+            <a:extLst>
+              <a:ext uri="{FF2B5EF4-FFF2-40B4-BE49-F238E27FC236}">
+                <a16:creationId xmlns:a16="http://schemas.microsoft.com/office/drawing/2014/main" id="{C78DBE98-3CD8-428F-AAD2-C60239BE8F60}"/>
+              </a:ext>
+            </a:extLst>
+          </p:cNvPr>
+          <p:cNvSpPr/>
+          <p:nvPr/>
+        </p:nvSpPr>
+        <p:spPr>
+          <a:xfrm>
+            <a:off x="2514600" y="3244362"/>
+            <a:ext cx="1899138" cy="782516"/>
+          </a:xfrm>
+          <a:prstGeom prst="roundRect">
+            <a:avLst/>
+          </a:prstGeom>
+        </p:spPr>
+        <p:style>
+          <a:lnRef idx="2">
+            <a:schemeClr val="accent1">
+              <a:shade val="50000"/>
+            </a:schemeClr>
+          </a:lnRef>
+          <a:fillRef idx="1">
+            <a:schemeClr val="accent1"/>
+          </a:fillRef>
+          <a:effectRef idx="0">
+            <a:schemeClr val="accent1"/>
+          </a:effectRef>
+          <a:fontRef idx="minor">
+            <a:schemeClr val="lt1"/>
+          </a:fontRef>
+        </p:style>
+        <p:txBody>
+          <a:bodyPr rtlCol="0" anchor="ctr"/>
+          <a:lstStyle/>
+          <a:p>
+            <a:pPr algn="ctr"/>
             <a:r>
               <a:rPr lang="en-US" dirty="0"/>
-              <a:t>Setup initializes all of the global variables and sets the screen dimensions. Gets called once, before anything else happens </a:t>
-            </a:r>
-          </a:p>
-          <a:p>
-            <a:pPr lvl="1"/>
+              <a:t>New Character</a:t>
+            </a:r>
+          </a:p>
+        </p:txBody>
+      </p:sp>
+      <p:sp>
+        <p:nvSpPr>
+          <p:cNvPr id="7" name="Rectangle: Rounded Corners 6">
+            <a:extLst>
+              <a:ext uri="{FF2B5EF4-FFF2-40B4-BE49-F238E27FC236}">
+                <a16:creationId xmlns:a16="http://schemas.microsoft.com/office/drawing/2014/main" id="{E27504EF-DA94-423F-8EB7-DF6421F75D84}"/>
+              </a:ext>
+            </a:extLst>
+          </p:cNvPr>
+          <p:cNvSpPr/>
+          <p:nvPr/>
+        </p:nvSpPr>
+        <p:spPr>
+          <a:xfrm>
+            <a:off x="2514600" y="1477107"/>
+            <a:ext cx="1899138" cy="782516"/>
+          </a:xfrm>
+          <a:prstGeom prst="roundRect">
+            <a:avLst/>
+          </a:prstGeom>
+        </p:spPr>
+        <p:style>
+          <a:lnRef idx="2">
+            <a:schemeClr val="accent1">
+              <a:shade val="50000"/>
+            </a:schemeClr>
+          </a:lnRef>
+          <a:fillRef idx="1">
+            <a:schemeClr val="accent1"/>
+          </a:fillRef>
+          <a:effectRef idx="0">
+            <a:schemeClr val="accent1"/>
+          </a:effectRef>
+          <a:fontRef idx="minor">
+            <a:schemeClr val="lt1"/>
+          </a:fontRef>
+        </p:style>
+        <p:txBody>
+          <a:bodyPr rtlCol="0" anchor="ctr"/>
+          <a:lstStyle/>
+          <a:p>
+            <a:pPr algn="ctr"/>
             <a:r>
               <a:rPr lang="en-US" dirty="0"/>
-              <a:t>The Draw function is the primary game loop. Gets called repeatedly until program is closed</a:t>
-            </a:r>
-          </a:p>
-          <a:p>
-            <a:pPr lvl="2"/>
+              <a:t>Load Character</a:t>
+            </a:r>
+          </a:p>
+        </p:txBody>
+      </p:sp>
+      <p:sp>
+        <p:nvSpPr>
+          <p:cNvPr id="8" name="Rectangle: Rounded Corners 7">
+            <a:extLst>
+              <a:ext uri="{FF2B5EF4-FFF2-40B4-BE49-F238E27FC236}">
+                <a16:creationId xmlns:a16="http://schemas.microsoft.com/office/drawing/2014/main" id="{29C837EB-973F-4DE5-B377-E7EECE3A6854}"/>
+              </a:ext>
+            </a:extLst>
+          </p:cNvPr>
+          <p:cNvSpPr/>
+          <p:nvPr/>
+        </p:nvSpPr>
+        <p:spPr>
+          <a:xfrm>
+            <a:off x="5073162" y="2373923"/>
+            <a:ext cx="1899138" cy="782516"/>
+          </a:xfrm>
+          <a:prstGeom prst="roundRect">
+            <a:avLst/>
+          </a:prstGeom>
+        </p:spPr>
+        <p:style>
+          <a:lnRef idx="2">
+            <a:schemeClr val="accent1">
+              <a:shade val="50000"/>
+            </a:schemeClr>
+          </a:lnRef>
+          <a:fillRef idx="1">
+            <a:schemeClr val="accent1"/>
+          </a:fillRef>
+          <a:effectRef idx="0">
+            <a:schemeClr val="accent1"/>
+          </a:effectRef>
+          <a:fontRef idx="minor">
+            <a:schemeClr val="lt1"/>
+          </a:fontRef>
+        </p:style>
+        <p:txBody>
+          <a:bodyPr rtlCol="0" anchor="ctr"/>
+          <a:lstStyle/>
+          <a:p>
+            <a:pPr algn="ctr"/>
             <a:r>
               <a:rPr lang="en-US" dirty="0"/>
-              <a:t>Everything that happens in the game gets called from the Draw function</a:t>
-            </a:r>
-          </a:p>
-          <a:p>
+              <a:t>Map Scene </a:t>
+            </a:r>
+          </a:p>
+        </p:txBody>
+      </p:sp>
+      <p:sp>
+        <p:nvSpPr>
+          <p:cNvPr id="9" name="Rectangle: Rounded Corners 8">
+            <a:extLst>
+              <a:ext uri="{FF2B5EF4-FFF2-40B4-BE49-F238E27FC236}">
+                <a16:creationId xmlns:a16="http://schemas.microsoft.com/office/drawing/2014/main" id="{F7D846A1-3116-4F1B-A49C-3B1F73A54362}"/>
+              </a:ext>
+            </a:extLst>
+          </p:cNvPr>
+          <p:cNvSpPr/>
+          <p:nvPr/>
+        </p:nvSpPr>
+        <p:spPr>
+          <a:xfrm>
+            <a:off x="8018585" y="2373923"/>
+            <a:ext cx="1899138" cy="782516"/>
+          </a:xfrm>
+          <a:prstGeom prst="roundRect">
+            <a:avLst/>
+          </a:prstGeom>
+        </p:spPr>
+        <p:style>
+          <a:lnRef idx="2">
+            <a:schemeClr val="accent1">
+              <a:shade val="50000"/>
+            </a:schemeClr>
+          </a:lnRef>
+          <a:fillRef idx="1">
+            <a:schemeClr val="accent1"/>
+          </a:fillRef>
+          <a:effectRef idx="0">
+            <a:schemeClr val="accent1"/>
+          </a:effectRef>
+          <a:fontRef idx="minor">
+            <a:schemeClr val="lt1"/>
+          </a:fontRef>
+        </p:style>
+        <p:txBody>
+          <a:bodyPr rtlCol="0" anchor="ctr"/>
+          <a:lstStyle/>
+          <a:p>
+            <a:pPr algn="ctr"/>
             <a:r>
               <a:rPr lang="en-US" dirty="0"/>
-              <a:t>Has a number of variables to keep track of the passage of time, framerate, screen size, etc. </a:t>
-            </a:r>
-          </a:p>
-          <a:p>
-            <a:r>
-              <a:rPr lang="en-US" dirty="0"/>
-              <a:t>All global information is kept in the Main class. Anything else in the program can reference these variables. </a:t>
-            </a:r>
-          </a:p>
-          <a:p>
-            <a:r>
-              <a:rPr lang="en-US" dirty="0"/>
-              <a:t>Most important variables are the Player and the current Scene. </a:t>
-            </a:r>
-          </a:p>
-          <a:p>
-            <a:r>
-              <a:rPr lang="en-US" dirty="0"/>
-              <a:t>Main class also has a number of input functions (such as </a:t>
-            </a:r>
-            <a:r>
-              <a:rPr lang="en-US" dirty="0" err="1"/>
-              <a:t>KeyPressed</a:t>
-            </a:r>
-            <a:r>
-              <a:rPr lang="en-US" dirty="0"/>
-              <a:t> or </a:t>
-            </a:r>
-            <a:r>
-              <a:rPr lang="en-US" dirty="0" err="1"/>
-              <a:t>MouseClicked</a:t>
-            </a:r>
-            <a:r>
-              <a:rPr lang="en-US" dirty="0"/>
-              <a:t>). These functions automatically call the corresponding function in the current scene </a:t>
-            </a:r>
-          </a:p>
-        </p:txBody>
-      </p:sp>
+              <a:t>Game Level </a:t>
+            </a:r>
+          </a:p>
+        </p:txBody>
+      </p:sp>
+      <p:cxnSp>
+        <p:nvCxnSpPr>
+          <p:cNvPr id="11" name="Straight Arrow Connector 10">
+            <a:extLst>
+              <a:ext uri="{FF2B5EF4-FFF2-40B4-BE49-F238E27FC236}">
+                <a16:creationId xmlns:a16="http://schemas.microsoft.com/office/drawing/2014/main" id="{84CF75FD-06AB-48BB-AE15-E1EC09137594}"/>
+              </a:ext>
+            </a:extLst>
+          </p:cNvPr>
+          <p:cNvCxnSpPr>
+            <a:endCxn id="7" idx="1"/>
+          </p:cNvCxnSpPr>
+          <p:nvPr/>
+        </p:nvCxnSpPr>
+        <p:spPr>
+          <a:xfrm flipV="1">
+            <a:off x="1037492" y="1868365"/>
+            <a:ext cx="1477108" cy="285750"/>
+          </a:xfrm>
+          <a:prstGeom prst="straightConnector1">
+            <a:avLst/>
+          </a:prstGeom>
+          <a:ln>
+            <a:tailEnd type="triangle"/>
+          </a:ln>
+        </p:spPr>
+        <p:style>
+          <a:lnRef idx="1">
+            <a:schemeClr val="dk1"/>
+          </a:lnRef>
+          <a:fillRef idx="0">
+            <a:schemeClr val="dk1"/>
+          </a:fillRef>
+          <a:effectRef idx="0">
+            <a:schemeClr val="dk1"/>
+          </a:effectRef>
+          <a:fontRef idx="minor">
+            <a:schemeClr val="tx1"/>
+          </a:fontRef>
+        </p:style>
+      </p:cxnSp>
+      <p:cxnSp>
+        <p:nvCxnSpPr>
+          <p:cNvPr id="12" name="Straight Arrow Connector 11">
+            <a:extLst>
+              <a:ext uri="{FF2B5EF4-FFF2-40B4-BE49-F238E27FC236}">
+                <a16:creationId xmlns:a16="http://schemas.microsoft.com/office/drawing/2014/main" id="{60BA827B-A1AC-401D-9FF9-13E7CDF7A4CB}"/>
+              </a:ext>
+            </a:extLst>
+          </p:cNvPr>
+          <p:cNvCxnSpPr>
+            <a:cxnSpLocks/>
+            <a:stCxn id="5" idx="2"/>
+            <a:endCxn id="6" idx="1"/>
+          </p:cNvCxnSpPr>
+          <p:nvPr/>
+        </p:nvCxnSpPr>
+        <p:spPr>
+          <a:xfrm>
+            <a:off x="1178170" y="2936631"/>
+            <a:ext cx="1336430" cy="698989"/>
+          </a:xfrm>
+          <a:prstGeom prst="straightConnector1">
+            <a:avLst/>
+          </a:prstGeom>
+          <a:ln>
+            <a:tailEnd type="triangle"/>
+          </a:ln>
+        </p:spPr>
+        <p:style>
+          <a:lnRef idx="1">
+            <a:schemeClr val="dk1"/>
+          </a:lnRef>
+          <a:fillRef idx="0">
+            <a:schemeClr val="dk1"/>
+          </a:fillRef>
+          <a:effectRef idx="0">
+            <a:schemeClr val="dk1"/>
+          </a:effectRef>
+          <a:fontRef idx="minor">
+            <a:schemeClr val="tx1"/>
+          </a:fontRef>
+        </p:style>
+      </p:cxnSp>
+      <p:cxnSp>
+        <p:nvCxnSpPr>
+          <p:cNvPr id="15" name="Straight Arrow Connector 14">
+            <a:extLst>
+              <a:ext uri="{FF2B5EF4-FFF2-40B4-BE49-F238E27FC236}">
+                <a16:creationId xmlns:a16="http://schemas.microsoft.com/office/drawing/2014/main" id="{596039C5-A8A4-4688-A50C-DFB26AFBC0C8}"/>
+              </a:ext>
+            </a:extLst>
+          </p:cNvPr>
+          <p:cNvCxnSpPr>
+            <a:cxnSpLocks/>
+            <a:stCxn id="7" idx="3"/>
+          </p:cNvCxnSpPr>
+          <p:nvPr/>
+        </p:nvCxnSpPr>
+        <p:spPr>
+          <a:xfrm>
+            <a:off x="4413738" y="1868365"/>
+            <a:ext cx="1204547" cy="505558"/>
+          </a:xfrm>
+          <a:prstGeom prst="straightConnector1">
+            <a:avLst/>
+          </a:prstGeom>
+          <a:ln>
+            <a:tailEnd type="triangle"/>
+          </a:ln>
+        </p:spPr>
+        <p:style>
+          <a:lnRef idx="1">
+            <a:schemeClr val="dk1"/>
+          </a:lnRef>
+          <a:fillRef idx="0">
+            <a:schemeClr val="dk1"/>
+          </a:fillRef>
+          <a:effectRef idx="0">
+            <a:schemeClr val="dk1"/>
+          </a:effectRef>
+          <a:fontRef idx="minor">
+            <a:schemeClr val="tx1"/>
+          </a:fontRef>
+        </p:style>
+      </p:cxnSp>
+      <p:cxnSp>
+        <p:nvCxnSpPr>
+          <p:cNvPr id="18" name="Straight Arrow Connector 17">
+            <a:extLst>
+              <a:ext uri="{FF2B5EF4-FFF2-40B4-BE49-F238E27FC236}">
+                <a16:creationId xmlns:a16="http://schemas.microsoft.com/office/drawing/2014/main" id="{525CFD5B-EB93-4D2F-B378-4EB04DB453CF}"/>
+              </a:ext>
+            </a:extLst>
+          </p:cNvPr>
+          <p:cNvCxnSpPr>
+            <a:cxnSpLocks/>
+            <a:stCxn id="6" idx="3"/>
+          </p:cNvCxnSpPr>
+          <p:nvPr/>
+        </p:nvCxnSpPr>
+        <p:spPr>
+          <a:xfrm flipV="1">
+            <a:off x="4413738" y="3156439"/>
+            <a:ext cx="1204547" cy="479181"/>
+          </a:xfrm>
+          <a:prstGeom prst="straightConnector1">
+            <a:avLst/>
+          </a:prstGeom>
+          <a:ln>
+            <a:tailEnd type="triangle"/>
+          </a:ln>
+        </p:spPr>
+        <p:style>
+          <a:lnRef idx="1">
+            <a:schemeClr val="dk1"/>
+          </a:lnRef>
+          <a:fillRef idx="0">
+            <a:schemeClr val="dk1"/>
+          </a:fillRef>
+          <a:effectRef idx="0">
+            <a:schemeClr val="dk1"/>
+          </a:effectRef>
+          <a:fontRef idx="minor">
+            <a:schemeClr val="tx1"/>
+          </a:fontRef>
+        </p:style>
+      </p:cxnSp>
+      <p:cxnSp>
+        <p:nvCxnSpPr>
+          <p:cNvPr id="21" name="Straight Arrow Connector 20">
+            <a:extLst>
+              <a:ext uri="{FF2B5EF4-FFF2-40B4-BE49-F238E27FC236}">
+                <a16:creationId xmlns:a16="http://schemas.microsoft.com/office/drawing/2014/main" id="{962671C3-34F6-4C5B-9118-8455B212BC2D}"/>
+              </a:ext>
+            </a:extLst>
+          </p:cNvPr>
+          <p:cNvCxnSpPr>
+            <a:cxnSpLocks/>
+          </p:cNvCxnSpPr>
+          <p:nvPr/>
+        </p:nvCxnSpPr>
+        <p:spPr>
+          <a:xfrm flipV="1">
+            <a:off x="6972300" y="2545373"/>
+            <a:ext cx="1046285" cy="19050"/>
+          </a:xfrm>
+          <a:prstGeom prst="straightConnector1">
+            <a:avLst/>
+          </a:prstGeom>
+          <a:ln>
+            <a:tailEnd type="triangle"/>
+          </a:ln>
+        </p:spPr>
+        <p:style>
+          <a:lnRef idx="1">
+            <a:schemeClr val="dk1"/>
+          </a:lnRef>
+          <a:fillRef idx="0">
+            <a:schemeClr val="dk1"/>
+          </a:fillRef>
+          <a:effectRef idx="0">
+            <a:schemeClr val="dk1"/>
+          </a:effectRef>
+          <a:fontRef idx="minor">
+            <a:schemeClr val="tx1"/>
+          </a:fontRef>
+        </p:style>
+      </p:cxnSp>
+      <p:cxnSp>
+        <p:nvCxnSpPr>
+          <p:cNvPr id="24" name="Straight Arrow Connector 23">
+            <a:extLst>
+              <a:ext uri="{FF2B5EF4-FFF2-40B4-BE49-F238E27FC236}">
+                <a16:creationId xmlns:a16="http://schemas.microsoft.com/office/drawing/2014/main" id="{AD6A3A07-3C81-4583-B24A-F577BBCAEFAB}"/>
+              </a:ext>
+            </a:extLst>
+          </p:cNvPr>
+          <p:cNvCxnSpPr>
+            <a:cxnSpLocks/>
+            <a:stCxn id="9" idx="1"/>
+            <a:endCxn id="8" idx="3"/>
+          </p:cNvCxnSpPr>
+          <p:nvPr/>
+        </p:nvCxnSpPr>
+        <p:spPr>
+          <a:xfrm flipH="1">
+            <a:off x="6972300" y="2765181"/>
+            <a:ext cx="1046285" cy="0"/>
+          </a:xfrm>
+          <a:prstGeom prst="straightConnector1">
+            <a:avLst/>
+          </a:prstGeom>
+          <a:ln>
+            <a:tailEnd type="triangle"/>
+          </a:ln>
+        </p:spPr>
+        <p:style>
+          <a:lnRef idx="1">
+            <a:schemeClr val="dk1"/>
+          </a:lnRef>
+          <a:fillRef idx="0">
+            <a:schemeClr val="dk1"/>
+          </a:fillRef>
+          <a:effectRef idx="0">
+            <a:schemeClr val="dk1"/>
+          </a:effectRef>
+          <a:fontRef idx="minor">
+            <a:schemeClr val="tx1"/>
+          </a:fontRef>
+        </p:style>
+      </p:cxnSp>
+      <p:sp>
+        <p:nvSpPr>
+          <p:cNvPr id="27" name="Arrow: U-Turn 26">
+            <a:extLst>
+              <a:ext uri="{FF2B5EF4-FFF2-40B4-BE49-F238E27FC236}">
+                <a16:creationId xmlns:a16="http://schemas.microsoft.com/office/drawing/2014/main" id="{EAB51DCB-2030-488A-A9D4-7408C0BD58E3}"/>
+              </a:ext>
+            </a:extLst>
+          </p:cNvPr>
+          <p:cNvSpPr/>
+          <p:nvPr/>
+        </p:nvSpPr>
+        <p:spPr>
+          <a:xfrm rot="10800000">
+            <a:off x="465991" y="3241431"/>
+            <a:ext cx="8634045" cy="1176704"/>
+          </a:xfrm>
+          <a:prstGeom prst="uturnArrow">
+            <a:avLst>
+              <a:gd name="adj1" fmla="val 7041"/>
+              <a:gd name="adj2" fmla="val 25000"/>
+              <a:gd name="adj3" fmla="val 18469"/>
+              <a:gd name="adj4" fmla="val 43750"/>
+              <a:gd name="adj5" fmla="val 100000"/>
+            </a:avLst>
+          </a:prstGeom>
+        </p:spPr>
+        <p:style>
+          <a:lnRef idx="2">
+            <a:schemeClr val="accent1">
+              <a:shade val="50000"/>
+            </a:schemeClr>
+          </a:lnRef>
+          <a:fillRef idx="1">
+            <a:schemeClr val="accent1"/>
+          </a:fillRef>
+          <a:effectRef idx="0">
+            <a:schemeClr val="accent1"/>
+          </a:effectRef>
+          <a:fontRef idx="minor">
+            <a:schemeClr val="lt1"/>
+          </a:fontRef>
+        </p:style>
+        <p:txBody>
+          <a:bodyPr rtlCol="0" anchor="ctr"/>
+          <a:lstStyle/>
+          <a:p>
+            <a:pPr algn="ctr"/>
+            <a:endParaRPr lang="en-US">
+              <a:solidFill>
+                <a:schemeClr val="tx1"/>
+              </a:solidFill>
+            </a:endParaRPr>
+          </a:p>
+        </p:txBody>
+      </p:sp>
+      <p:pic>
+        <p:nvPicPr>
+          <p:cNvPr id="29" name="Picture 28" descr="A close up of a logo&#10;&#10;Description generated with high confidence">
+            <a:extLst>
+              <a:ext uri="{FF2B5EF4-FFF2-40B4-BE49-F238E27FC236}">
+                <a16:creationId xmlns:a16="http://schemas.microsoft.com/office/drawing/2014/main" id="{599399AF-69E9-45E4-B9DE-0FA4F2F6C892}"/>
+              </a:ext>
+            </a:extLst>
+          </p:cNvPr>
+          <p:cNvPicPr>
+            <a:picLocks noChangeAspect="1"/>
+          </p:cNvPicPr>
+          <p:nvPr/>
+        </p:nvPicPr>
+        <p:blipFill>
+          <a:blip r:embed="rId2"/>
+          <a:stretch>
+            <a:fillRect/>
+          </a:stretch>
+        </p:blipFill>
+        <p:spPr>
+          <a:xfrm>
+            <a:off x="10413210" y="5153324"/>
+            <a:ext cx="1447532" cy="1447532"/>
+          </a:xfrm>
+          <a:prstGeom prst="rect">
+            <a:avLst/>
+          </a:prstGeom>
+        </p:spPr>
+      </p:pic>
     </p:spTree>
     <p:extLst>
       <p:ext uri="{BB962C8B-B14F-4D97-AF65-F5344CB8AC3E}">
-        <p14:creationId xmlns:p14="http://schemas.microsoft.com/office/powerpoint/2010/main" val="405521532"/>
+        <p14:creationId xmlns:p14="http://schemas.microsoft.com/office/powerpoint/2010/main" val="14325577"/>
       </p:ext>
     </p:extLst>
   </p:cSld>
@@ -8179,7 +9674,7 @@
           <p:cNvPr id="2" name="Title 1">
             <a:extLst>
               <a:ext uri="{FF2B5EF4-FFF2-40B4-BE49-F238E27FC236}">
-                <a16:creationId xmlns:a16="http://schemas.microsoft.com/office/drawing/2014/main" id="{F24FA39B-E526-4521-AFA8-BD42A897257A}"/>
+                <a16:creationId xmlns:a16="http://schemas.microsoft.com/office/drawing/2014/main" id="{2D3EF30E-CF36-485C-8A6B-2D0EAF9D90EA}"/>
               </a:ext>
             </a:extLst>
           </p:cNvPr>
@@ -8196,8 +9691,12 @@
           <a:lstStyle/>
           <a:p>
             <a:r>
-              <a:rPr lang="en-US" dirty="0"/>
-              <a:t>The Scene Class </a:t>
+              <a:rPr lang="en-US" dirty="0">
+                <a:solidFill>
+                  <a:schemeClr val="accent2"/>
+                </a:solidFill>
+              </a:rPr>
+              <a:t>The Main Class</a:t>
             </a:r>
           </a:p>
         </p:txBody>
@@ -8207,7 +9706,7 @@
           <p:cNvPr id="3" name="Content Placeholder 2">
             <a:extLst>
               <a:ext uri="{FF2B5EF4-FFF2-40B4-BE49-F238E27FC236}">
-                <a16:creationId xmlns:a16="http://schemas.microsoft.com/office/drawing/2014/main" id="{DFE7D60F-31DB-4988-90E4-9D39903B6336}"/>
+                <a16:creationId xmlns:a16="http://schemas.microsoft.com/office/drawing/2014/main" id="{7120DB0F-FB77-4342-B627-FDB5CEB938F2}"/>
               </a:ext>
             </a:extLst>
           </p:cNvPr>
@@ -8218,46 +9717,166 @@
             <p:ph idx="1"/>
           </p:nvPr>
         </p:nvSpPr>
-        <p:spPr/>
+        <p:spPr>
+          <a:xfrm>
+            <a:off x="677334" y="1411551"/>
+            <a:ext cx="8596668" cy="5446450"/>
+          </a:xfrm>
+        </p:spPr>
         <p:txBody>
           <a:bodyPr/>
           <a:lstStyle/>
           <a:p>
             <a:r>
-              <a:rPr lang="en-US" dirty="0"/>
-              <a:t>The scene class does the majority of the actual drawing, as well as input and output</a:t>
-            </a:r>
-          </a:p>
-          <a:p>
-            <a:r>
-              <a:rPr lang="en-US" dirty="0"/>
-              <a:t>All input actions automatically trigger in the Main class, which call this class to actually handle the input </a:t>
-            </a:r>
-          </a:p>
-          <a:p>
-            <a:r>
-              <a:rPr lang="en-US" dirty="0"/>
-              <a:t>Various different scenes for different purposes – Map scene for moving across map, menu scenes, skill tree scene, and the actual primary gameplay scenes.</a:t>
-            </a:r>
-          </a:p>
-          <a:p>
-            <a:r>
-              <a:rPr lang="en-US" dirty="0"/>
-              <a:t>Only one scene is active at a time, when a new action takes place a new scene is loaded. </a:t>
-            </a:r>
-          </a:p>
-          <a:p>
-            <a:r>
-              <a:rPr lang="en-US" dirty="0"/>
-              <a:t>All information in a given scene is local and temporary, and gets lost when a new scene is loaded </a:t>
-            </a:r>
-          </a:p>
-        </p:txBody>
-      </p:sp>
+              <a:rPr lang="en-US" dirty="0">
+                <a:solidFill>
+                  <a:schemeClr val="tx2"/>
+                </a:solidFill>
+              </a:rPr>
+              <a:t>Processing has 2 required functions in the main class – Setup and Draw</a:t>
+            </a:r>
+          </a:p>
+          <a:p>
+            <a:pPr lvl="1"/>
+            <a:r>
+              <a:rPr lang="en-US" dirty="0">
+                <a:solidFill>
+                  <a:schemeClr val="tx2"/>
+                </a:solidFill>
+              </a:rPr>
+              <a:t>Setup initializes all of the global variables and sets the screen dimensions. Gets called once, before anything else happens </a:t>
+            </a:r>
+          </a:p>
+          <a:p>
+            <a:pPr lvl="1"/>
+            <a:r>
+              <a:rPr lang="en-US" dirty="0">
+                <a:solidFill>
+                  <a:schemeClr val="tx2"/>
+                </a:solidFill>
+              </a:rPr>
+              <a:t>The Draw function is the primary game loop. Gets called repeatedly until program is closed</a:t>
+            </a:r>
+          </a:p>
+          <a:p>
+            <a:pPr lvl="2"/>
+            <a:r>
+              <a:rPr lang="en-US" dirty="0">
+                <a:solidFill>
+                  <a:schemeClr val="tx2"/>
+                </a:solidFill>
+              </a:rPr>
+              <a:t>Everything that happens in the game gets called from the Draw function</a:t>
+            </a:r>
+          </a:p>
+          <a:p>
+            <a:r>
+              <a:rPr lang="en-US" dirty="0">
+                <a:solidFill>
+                  <a:schemeClr val="tx2"/>
+                </a:solidFill>
+              </a:rPr>
+              <a:t>Has a number of variables to keep track of the passage of time, framerate, screen size, etc. </a:t>
+            </a:r>
+          </a:p>
+          <a:p>
+            <a:r>
+              <a:rPr lang="en-US" dirty="0">
+                <a:solidFill>
+                  <a:schemeClr val="tx2"/>
+                </a:solidFill>
+              </a:rPr>
+              <a:t>All global information is kept in the Main class. Anything else in the program can reference these variables. </a:t>
+            </a:r>
+          </a:p>
+          <a:p>
+            <a:r>
+              <a:rPr lang="en-US" dirty="0">
+                <a:solidFill>
+                  <a:schemeClr val="tx2"/>
+                </a:solidFill>
+              </a:rPr>
+              <a:t>Most important variables are the Player and the current Scene. </a:t>
+            </a:r>
+          </a:p>
+          <a:p>
+            <a:r>
+              <a:rPr lang="en-US" dirty="0">
+                <a:solidFill>
+                  <a:schemeClr val="tx2"/>
+                </a:solidFill>
+              </a:rPr>
+              <a:t>Main class also has a number of input functions (such as </a:t>
+            </a:r>
+            <a:r>
+              <a:rPr lang="en-US" dirty="0" err="1">
+                <a:solidFill>
+                  <a:schemeClr val="tx2"/>
+                </a:solidFill>
+              </a:rPr>
+              <a:t>KeyPressed</a:t>
+            </a:r>
+            <a:r>
+              <a:rPr lang="en-US" dirty="0">
+                <a:solidFill>
+                  <a:schemeClr val="tx2"/>
+                </a:solidFill>
+              </a:rPr>
+              <a:t> or </a:t>
+            </a:r>
+            <a:r>
+              <a:rPr lang="en-US" dirty="0" err="1">
+                <a:solidFill>
+                  <a:schemeClr val="tx2"/>
+                </a:solidFill>
+              </a:rPr>
+              <a:t>MouseClicked</a:t>
+            </a:r>
+            <a:r>
+              <a:rPr lang="en-US" dirty="0">
+                <a:solidFill>
+                  <a:schemeClr val="tx2"/>
+                </a:solidFill>
+              </a:rPr>
+              <a:t>). These functions automatically call the corresponding function in the current scene </a:t>
+            </a:r>
+          </a:p>
+        </p:txBody>
+      </p:sp>
+      <p:pic>
+        <p:nvPicPr>
+          <p:cNvPr id="5" name="Picture 4" descr="A close up of a logo&#10;&#10;Description generated with high confidence">
+            <a:extLst>
+              <a:ext uri="{FF2B5EF4-FFF2-40B4-BE49-F238E27FC236}">
+                <a16:creationId xmlns:a16="http://schemas.microsoft.com/office/drawing/2014/main" id="{48E3845E-346C-483B-A96D-D71DC06C9CF5}"/>
+              </a:ext>
+            </a:extLst>
+          </p:cNvPr>
+          <p:cNvPicPr>
+            <a:picLocks noChangeAspect="1"/>
+          </p:cNvPicPr>
+          <p:nvPr/>
+        </p:nvPicPr>
+        <p:blipFill>
+          <a:blip r:embed="rId2"/>
+          <a:stretch>
+            <a:fillRect/>
+          </a:stretch>
+        </p:blipFill>
+        <p:spPr>
+          <a:xfrm>
+            <a:off x="10413210" y="5153324"/>
+            <a:ext cx="1447532" cy="1447532"/>
+          </a:xfrm>
+          <a:prstGeom prst="rect">
+            <a:avLst/>
+          </a:prstGeom>
+        </p:spPr>
+      </p:pic>
     </p:spTree>
     <p:extLst>
       <p:ext uri="{BB962C8B-B14F-4D97-AF65-F5344CB8AC3E}">
-        <p14:creationId xmlns:p14="http://schemas.microsoft.com/office/powerpoint/2010/main" val="2133012138"/>
+        <p14:creationId xmlns:p14="http://schemas.microsoft.com/office/powerpoint/2010/main" val="405521532"/>
       </p:ext>
     </p:extLst>
   </p:cSld>
@@ -8289,7 +9908,7 @@
           <p:cNvPr id="2" name="Title 1">
             <a:extLst>
               <a:ext uri="{FF2B5EF4-FFF2-40B4-BE49-F238E27FC236}">
-                <a16:creationId xmlns:a16="http://schemas.microsoft.com/office/drawing/2014/main" id="{8CF1AC6D-2DFE-4F7C-900D-B6C36DDC4536}"/>
+                <a16:creationId xmlns:a16="http://schemas.microsoft.com/office/drawing/2014/main" id="{F24FA39B-E526-4521-AFA8-BD42A897257A}"/>
               </a:ext>
             </a:extLst>
           </p:cNvPr>
@@ -8306,8 +9925,12 @@
           <a:lstStyle/>
           <a:p>
             <a:r>
-              <a:rPr lang="en-US" dirty="0"/>
-              <a:t>The Game Scene</a:t>
+              <a:rPr lang="en-US" dirty="0">
+                <a:solidFill>
+                  <a:schemeClr val="accent2"/>
+                </a:solidFill>
+              </a:rPr>
+              <a:t>The Scene Class </a:t>
             </a:r>
           </a:p>
         </p:txBody>
@@ -8317,7 +9940,7 @@
           <p:cNvPr id="3" name="Content Placeholder 2">
             <a:extLst>
               <a:ext uri="{FF2B5EF4-FFF2-40B4-BE49-F238E27FC236}">
-                <a16:creationId xmlns:a16="http://schemas.microsoft.com/office/drawing/2014/main" id="{4172CAE2-EEE6-440B-8946-66F777D23A32}"/>
+                <a16:creationId xmlns:a16="http://schemas.microsoft.com/office/drawing/2014/main" id="{DFE7D60F-31DB-4988-90E4-9D39903B6336}"/>
               </a:ext>
             </a:extLst>
           </p:cNvPr>
@@ -8334,48 +9957,90 @@
           <a:lstStyle/>
           <a:p>
             <a:r>
-              <a:rPr lang="en-US" dirty="0"/>
-              <a:t>The majority of the actual gameplay takes place in this scene. </a:t>
-            </a:r>
-          </a:p>
-          <a:p>
-            <a:r>
-              <a:rPr lang="en-US" dirty="0"/>
-              <a:t>The top of the screen is reserved for drawing the characters and enemies. Players should be able to watch the battle happen, reflecting their actions on the bottom of the screen. </a:t>
-            </a:r>
-          </a:p>
-          <a:p>
-            <a:r>
-              <a:rPr lang="en-US" dirty="0"/>
-              <a:t>The bottom half of the screen is where gameplay takes place</a:t>
-            </a:r>
-          </a:p>
-          <a:p>
-            <a:r>
-              <a:rPr lang="en-US" dirty="0"/>
-              <a:t>Every time the draw loop is called, the “</a:t>
-            </a:r>
-            <a:r>
-              <a:rPr lang="en-US" dirty="0" err="1"/>
-              <a:t>DrawScene</a:t>
-            </a:r>
-            <a:r>
-              <a:rPr lang="en-US" dirty="0"/>
-              <a:t>” function is called. This draws all of the health and energy bars, the characters, as well as the runes.</a:t>
-            </a:r>
-          </a:p>
-          <a:p>
-            <a:r>
-              <a:rPr lang="en-US" dirty="0"/>
-              <a:t>Eventually the game scene will have its own subclasses for different levels. Currently have 2 game scenes – one for the regular levels, and one for the Boss level.  </a:t>
-            </a:r>
-          </a:p>
-        </p:txBody>
-      </p:sp>
+              <a:rPr lang="en-US" dirty="0">
+                <a:solidFill>
+                  <a:schemeClr val="tx2"/>
+                </a:solidFill>
+              </a:rPr>
+              <a:t>The scene class does the majority of the actual drawing, as well as input and output</a:t>
+            </a:r>
+          </a:p>
+          <a:p>
+            <a:r>
+              <a:rPr lang="en-US" dirty="0">
+                <a:solidFill>
+                  <a:schemeClr val="tx2"/>
+                </a:solidFill>
+              </a:rPr>
+              <a:t>All input actions automatically trigger in the Main class, which call this class to actually handle the input </a:t>
+            </a:r>
+          </a:p>
+          <a:p>
+            <a:r>
+              <a:rPr lang="en-US" dirty="0">
+                <a:solidFill>
+                  <a:schemeClr val="tx2"/>
+                </a:solidFill>
+              </a:rPr>
+              <a:t>Various different scenes for different purposes – Map scene for moving across map, menu scenes, and the actual primary gameplay scenes.</a:t>
+            </a:r>
+          </a:p>
+          <a:p>
+            <a:r>
+              <a:rPr lang="en-US" dirty="0">
+                <a:solidFill>
+                  <a:schemeClr val="tx2"/>
+                </a:solidFill>
+              </a:rPr>
+              <a:t>Only one scene is active at a time, when a new action takes place a new scene is loaded. </a:t>
+            </a:r>
+          </a:p>
+          <a:p>
+            <a:r>
+              <a:rPr lang="en-US" dirty="0">
+                <a:solidFill>
+                  <a:schemeClr val="tx2"/>
+                </a:solidFill>
+              </a:rPr>
+              <a:t>All information in a given scene is local and temporary, and gets lost when a new scene is loaded </a:t>
+            </a:r>
+          </a:p>
+        </p:txBody>
+      </p:sp>
+      <p:pic>
+        <p:nvPicPr>
+          <p:cNvPr id="4" name="Picture 3" descr="A close up of a logo&#10;&#10;Description generated with high confidence">
+            <a:extLst>
+              <a:ext uri="{FF2B5EF4-FFF2-40B4-BE49-F238E27FC236}">
+                <a16:creationId xmlns:a16="http://schemas.microsoft.com/office/drawing/2014/main" id="{D65F6FFF-FFDA-46D8-B40E-EDA4CF53DB4D}"/>
+              </a:ext>
+            </a:extLst>
+          </p:cNvPr>
+          <p:cNvPicPr>
+            <a:picLocks noChangeAspect="1"/>
+          </p:cNvPicPr>
+          <p:nvPr/>
+        </p:nvPicPr>
+        <p:blipFill>
+          <a:blip r:embed="rId2"/>
+          <a:stretch>
+            <a:fillRect/>
+          </a:stretch>
+        </p:blipFill>
+        <p:spPr>
+          <a:xfrm>
+            <a:off x="10413210" y="5153324"/>
+            <a:ext cx="1447532" cy="1447532"/>
+          </a:xfrm>
+          <a:prstGeom prst="rect">
+            <a:avLst/>
+          </a:prstGeom>
+        </p:spPr>
+      </p:pic>
     </p:spTree>
     <p:extLst>
       <p:ext uri="{BB962C8B-B14F-4D97-AF65-F5344CB8AC3E}">
-        <p14:creationId xmlns:p14="http://schemas.microsoft.com/office/powerpoint/2010/main" val="4259955254"/>
+        <p14:creationId xmlns:p14="http://schemas.microsoft.com/office/powerpoint/2010/main" val="2133012138"/>
       </p:ext>
     </p:extLst>
   </p:cSld>
@@ -8388,42 +10053,42 @@
 <file path=ppt/theme/theme1.xml><?xml version="1.0" encoding="utf-8"?>
 <a:theme xmlns:a="http://schemas.openxmlformats.org/drawingml/2006/main" name="Facet">
   <a:themeElements>
-    <a:clrScheme name="Facet">
+    <a:clrScheme name="Custom 2">
       <a:dk1>
-        <a:sysClr val="windowText" lastClr="000000"/>
+        <a:srgbClr val="28A47C"/>
       </a:dk1>
       <a:lt1>
-        <a:sysClr val="window" lastClr="FFFFFF"/>
+        <a:srgbClr val="EDF6F9"/>
       </a:lt1>
       <a:dk2>
-        <a:srgbClr val="2C3C43"/>
+        <a:srgbClr val="2E946B"/>
       </a:dk2>
       <a:lt2>
-        <a:srgbClr val="EBEBEB"/>
+        <a:srgbClr val="D8F5FA"/>
       </a:lt2>
       <a:accent1>
-        <a:srgbClr val="90C226"/>
+        <a:srgbClr val="28A47C"/>
       </a:accent1>
       <a:accent2>
-        <a:srgbClr val="54A021"/>
+        <a:srgbClr val="F7A511"/>
       </a:accent2>
       <a:accent3>
-        <a:srgbClr val="E6B91E"/>
+        <a:srgbClr val="2E946B"/>
       </a:accent3>
       <a:accent4>
-        <a:srgbClr val="E76618"/>
+        <a:srgbClr val="42D0A2"/>
       </a:accent4>
       <a:accent5>
-        <a:srgbClr val="C42F1A"/>
+        <a:srgbClr val="3FCDE7"/>
       </a:accent5>
       <a:accent6>
-        <a:srgbClr val="918655"/>
+        <a:srgbClr val="A9D3E1"/>
       </a:accent6>
       <a:hlink>
-        <a:srgbClr val="99CA3C"/>
+        <a:srgbClr val="EDF6F9"/>
       </a:hlink>
       <a:folHlink>
-        <a:srgbClr val="B9D181"/>
+        <a:srgbClr val="A9D3E1"/>
       </a:folHlink>
     </a:clrScheme>
     <a:fontScheme name="Facet">
@@ -8636,7 +10301,7 @@
   <a:extraClrSchemeLst/>
   <a:extLst>
     <a:ext uri="{05A4C25C-085E-4340-85A3-A5531E510DB2}">
-      <thm15:themeFamily xmlns:thm15="http://schemas.microsoft.com/office/thememl/2012/main" name="Facet" id="{C0C680CD-088A-49FC-A102-D699147F32B2}" vid="{CFBC31BA-B70F-4F30-BCAA-4F3011E16C4D}"/>
+      <thm15:themeFamily xmlns:thm15="http://schemas.microsoft.com/office/thememl/2012/main" name="Facet" id="{C0C680CD-088A-49FC-A102-D699147F32B2}" vid="{0B5AB586-D108-4FC1-8368-649FE654B894}"/>
     </a:ext>
   </a:extLst>
 </a:theme>

</xml_diff>

<commit_message>
Revert "started working on adding game tree"
This reverts commit e054c397df398c361f64ec3ec3d294345513a123.
</commit_message>
<xml_diff>
--- a/Presentations/FinalPresentation.pptx
+++ b/Presentations/FinalPresentation.pptx
@@ -2,7 +2,7 @@
 <file path=ppt/presentation.xml><?xml version="1.0" encoding="utf-8"?>
 <p:presentation xmlns:a="http://schemas.openxmlformats.org/drawingml/2006/main" xmlns:r="http://schemas.openxmlformats.org/officeDocument/2006/relationships" xmlns:p="http://schemas.openxmlformats.org/presentationml/2006/main" autoCompressPictures="0">
   <p:sldMasterIdLst>
-    <p:sldMasterId id="2147483736" r:id="rId1"/>
+    <p:sldMasterId id="2147483648" r:id="rId1"/>
   </p:sldMasterIdLst>
   <p:sldIdLst>
     <p:sldId id="256" r:id="rId2"/>
@@ -11,18 +11,16 @@
     <p:sldId id="268" r:id="rId5"/>
     <p:sldId id="269" r:id="rId6"/>
     <p:sldId id="257" r:id="rId7"/>
-    <p:sldId id="274" r:id="rId8"/>
-    <p:sldId id="258" r:id="rId9"/>
-    <p:sldId id="259" r:id="rId10"/>
-    <p:sldId id="261" r:id="rId11"/>
-    <p:sldId id="265" r:id="rId12"/>
-    <p:sldId id="270" r:id="rId13"/>
-    <p:sldId id="271" r:id="rId14"/>
-    <p:sldId id="272" r:id="rId15"/>
-    <p:sldId id="262" r:id="rId16"/>
-    <p:sldId id="273" r:id="rId17"/>
-    <p:sldId id="263" r:id="rId18"/>
-    <p:sldId id="264" r:id="rId19"/>
+    <p:sldId id="258" r:id="rId8"/>
+    <p:sldId id="259" r:id="rId9"/>
+    <p:sldId id="261" r:id="rId10"/>
+    <p:sldId id="265" r:id="rId11"/>
+    <p:sldId id="270" r:id="rId12"/>
+    <p:sldId id="271" r:id="rId13"/>
+    <p:sldId id="272" r:id="rId14"/>
+    <p:sldId id="262" r:id="rId15"/>
+    <p:sldId id="263" r:id="rId16"/>
+    <p:sldId id="264" r:id="rId17"/>
   </p:sldIdLst>
   <p:sldSz cx="12192000" cy="6858000"/>
   <p:notesSz cx="6858000" cy="9144000"/>
@@ -148,7 +146,7 @@
       </p:grpSpPr>
       <p:grpSp>
         <p:nvGrpSpPr>
-          <p:cNvPr id="16" name="Group 15"/>
+          <p:cNvPr id="7" name="Group 6"/>
           <p:cNvGrpSpPr/>
           <p:nvPr/>
         </p:nvGrpSpPr>
@@ -160,72 +158,9 @@
             <a:chExt cx="12192000" cy="6866467"/>
           </a:xfrm>
         </p:grpSpPr>
-        <p:sp>
-          <p:nvSpPr>
-            <p:cNvPr id="15" name="Freeform 14"/>
-            <p:cNvSpPr/>
-            <p:nvPr/>
-          </p:nvSpPr>
-          <p:spPr>
-            <a:xfrm>
-              <a:off x="0" y="-7862"/>
-              <a:ext cx="863600" cy="5698067"/>
-            </a:xfrm>
-            <a:custGeom>
-              <a:avLst/>
-              <a:gdLst/>
-              <a:ahLst/>
-              <a:cxnLst/>
-              <a:rect l="l" t="t" r="r" b="b"/>
-              <a:pathLst>
-                <a:path w="863600" h="5698067">
-                  <a:moveTo>
-                    <a:pt x="0" y="8467"/>
-                  </a:moveTo>
-                  <a:lnTo>
-                    <a:pt x="863600" y="0"/>
-                  </a:lnTo>
-                  <a:lnTo>
-                    <a:pt x="863600" y="16934"/>
-                  </a:lnTo>
-                  <a:lnTo>
-                    <a:pt x="0" y="5698067"/>
-                  </a:lnTo>
-                  <a:lnTo>
-                    <a:pt x="0" y="8467"/>
-                  </a:lnTo>
-                  <a:close/>
-                </a:path>
-              </a:pathLst>
-            </a:custGeom>
-            <a:solidFill>
-              <a:schemeClr val="accent1">
-                <a:alpha val="70000"/>
-              </a:schemeClr>
-            </a:solidFill>
-            <a:ln>
-              <a:noFill/>
-            </a:ln>
-            <a:effectLst/>
-          </p:spPr>
-          <p:style>
-            <a:lnRef idx="1">
-              <a:schemeClr val="accent1"/>
-            </a:lnRef>
-            <a:fillRef idx="3">
-              <a:schemeClr val="accent1"/>
-            </a:fillRef>
-            <a:effectRef idx="2">
-              <a:schemeClr val="accent1"/>
-            </a:effectRef>
-            <a:fontRef idx="minor">
-              <a:schemeClr val="lt1"/>
-            </a:fontRef>
-          </p:style>
-        </p:sp>
         <p:cxnSp>
           <p:nvCxnSpPr>
-            <p:cNvPr id="19" name="Straight Connector 18"/>
+            <p:cNvPr id="32" name="Straight Connector 31"/>
             <p:cNvCxnSpPr/>
             <p:nvPr/>
           </p:nvCxnSpPr>
@@ -239,8 +174,8 @@
             </a:prstGeom>
             <a:ln w="9525">
               <a:solidFill>
-                <a:schemeClr val="accent1">
-                  <a:alpha val="70000"/>
+                <a:schemeClr val="bg1">
+                  <a:lumMod val="75000"/>
                 </a:schemeClr>
               </a:solidFill>
             </a:ln>
@@ -262,7 +197,7 @@
         </p:cxnSp>
         <p:cxnSp>
           <p:nvCxnSpPr>
-            <p:cNvPr id="20" name="Straight Connector 19"/>
+            <p:cNvPr id="21" name="Straight Connector 20"/>
             <p:cNvCxnSpPr/>
             <p:nvPr/>
           </p:nvCxnSpPr>
@@ -276,8 +211,8 @@
             </a:prstGeom>
             <a:ln w="9525">
               <a:solidFill>
-                <a:schemeClr val="accent1">
-                  <a:alpha val="70000"/>
+                <a:schemeClr val="bg1">
+                  <a:lumMod val="85000"/>
                 </a:schemeClr>
               </a:solidFill>
             </a:ln>
@@ -299,7 +234,7 @@
         </p:cxnSp>
         <p:sp>
           <p:nvSpPr>
-            <p:cNvPr id="21" name="Rectangle 23"/>
+            <p:cNvPr id="24" name="Rectangle 23"/>
             <p:cNvSpPr/>
             <p:nvPr/>
           </p:nvSpPr>
@@ -337,7 +272,7 @@
             </a:custGeom>
             <a:solidFill>
               <a:schemeClr val="accent1">
-                <a:alpha val="36000"/>
+                <a:alpha val="30000"/>
               </a:schemeClr>
             </a:solidFill>
             <a:ln>
@@ -362,7 +297,7 @@
         </p:sp>
         <p:sp>
           <p:nvSpPr>
-            <p:cNvPr id="22" name="Rectangle 25"/>
+            <p:cNvPr id="26" name="Rectangle 25"/>
             <p:cNvSpPr/>
             <p:nvPr/>
           </p:nvSpPr>
@@ -425,7 +360,7 @@
         </p:sp>
         <p:sp>
           <p:nvSpPr>
-            <p:cNvPr id="23" name="Isosceles Triangle 22"/>
+            <p:cNvPr id="27" name="Isosceles Triangle 26"/>
             <p:cNvSpPr/>
             <p:nvPr/>
           </p:nvSpPr>
@@ -440,9 +375,8 @@
               </a:avLst>
             </a:prstGeom>
             <a:solidFill>
-              <a:schemeClr val="accent1">
-                <a:lumMod val="75000"/>
-                <a:alpha val="66000"/>
+              <a:schemeClr val="accent2">
+                <a:alpha val="72000"/>
               </a:schemeClr>
             </a:solidFill>
             <a:ln>
@@ -467,7 +401,7 @@
         </p:sp>
         <p:sp>
           <p:nvSpPr>
-            <p:cNvPr id="24" name="Rectangle 27"/>
+            <p:cNvPr id="28" name="Rectangle 27"/>
             <p:cNvSpPr/>
             <p:nvPr/>
           </p:nvSpPr>
@@ -504,9 +438,9 @@
               </a:pathLst>
             </a:custGeom>
             <a:solidFill>
-              <a:schemeClr val="accent1">
+              <a:schemeClr val="accent2">
                 <a:lumMod val="75000"/>
-                <a:alpha val="50000"/>
+                <a:alpha val="70000"/>
               </a:schemeClr>
             </a:solidFill>
             <a:ln>
@@ -531,7 +465,7 @@
         </p:sp>
         <p:sp>
           <p:nvSpPr>
-            <p:cNvPr id="25" name="Rectangle 28"/>
+            <p:cNvPr id="29" name="Rectangle 28"/>
             <p:cNvSpPr/>
             <p:nvPr/>
           </p:nvSpPr>
@@ -568,7 +502,9 @@
               </a:pathLst>
             </a:custGeom>
             <a:solidFill>
-              <a:schemeClr val="accent2">
+              <a:schemeClr val="accent1">
+                <a:lumMod val="60000"/>
+                <a:lumOff val="40000"/>
                 <a:alpha val="70000"/>
               </a:schemeClr>
             </a:solidFill>
@@ -594,7 +530,7 @@
         </p:sp>
         <p:sp>
           <p:nvSpPr>
-            <p:cNvPr id="26" name="Rectangle 29"/>
+            <p:cNvPr id="30" name="Rectangle 29"/>
             <p:cNvSpPr/>
             <p:nvPr/>
           </p:nvSpPr>
@@ -631,8 +567,48 @@
               </a:pathLst>
             </a:custGeom>
             <a:solidFill>
-              <a:schemeClr val="accent2">
-                <a:lumMod val="75000"/>
+              <a:schemeClr val="accent1">
+                <a:alpha val="65000"/>
+              </a:schemeClr>
+            </a:solidFill>
+            <a:ln>
+              <a:noFill/>
+            </a:ln>
+            <a:effectLst/>
+          </p:spPr>
+          <p:style>
+            <a:lnRef idx="1">
+              <a:schemeClr val="accent1"/>
+            </a:lnRef>
+            <a:fillRef idx="3">
+              <a:schemeClr val="accent1"/>
+            </a:fillRef>
+            <a:effectRef idx="2">
+              <a:schemeClr val="accent1"/>
+            </a:effectRef>
+            <a:fontRef idx="minor">
+              <a:schemeClr val="lt1"/>
+            </a:fontRef>
+          </p:style>
+        </p:sp>
+        <p:sp>
+          <p:nvSpPr>
+            <p:cNvPr id="31" name="Isosceles Triangle 30"/>
+            <p:cNvSpPr/>
+            <p:nvPr/>
+          </p:nvSpPr>
+          <p:spPr>
+            <a:xfrm>
+              <a:off x="10371666" y="3589867"/>
+              <a:ext cx="1817159" cy="3268133"/>
+            </a:xfrm>
+            <a:prstGeom prst="triangle">
+              <a:avLst>
+                <a:gd name="adj" fmla="val 100000"/>
+              </a:avLst>
+            </a:prstGeom>
+            <a:solidFill>
+              <a:schemeClr val="accent1">
                 <a:alpha val="80000"/>
               </a:schemeClr>
             </a:solidFill>
@@ -658,14 +634,14 @@
         </p:sp>
         <p:sp>
           <p:nvSpPr>
-            <p:cNvPr id="27" name="Isosceles Triangle 26"/>
+            <p:cNvPr id="19" name="Isosceles Triangle 18"/>
             <p:cNvSpPr/>
             <p:nvPr/>
           </p:nvSpPr>
           <p:spPr>
-            <a:xfrm>
-              <a:off x="10371666" y="3589867"/>
-              <a:ext cx="1817159" cy="3268133"/>
+            <a:xfrm rot="10800000">
+              <a:off x="0" y="0"/>
+              <a:ext cx="842596" cy="5666154"/>
             </a:xfrm>
             <a:prstGeom prst="triangle">
               <a:avLst>
@@ -674,8 +650,7 @@
             </a:prstGeom>
             <a:solidFill>
               <a:schemeClr val="accent1">
-                <a:lumMod val="75000"/>
-                <a:alpha val="66000"/>
+                <a:alpha val="85000"/>
               </a:schemeClr>
             </a:solidFill>
             <a:ln>
@@ -873,9 +848,9 @@
           <a:lstStyle/>
           <a:p>
             <a:fld id="{B61BEF0D-F0BB-DE4B-95CE-6DB70DBA9567}" type="datetimeFigureOut">
-              <a:rPr lang="en-US" smtClean="0"/>
+              <a:rPr lang="en-US" dirty="0"/>
               <a:pPr/>
-              <a:t>5/1/2018</a:t>
+              <a:t>4/30/2018</a:t>
             </a:fld>
             <a:endParaRPr lang="en-US" dirty="0"/>
           </a:p>
@@ -916,7 +891,7 @@
           <a:lstStyle/>
           <a:p>
             <a:fld id="{D57F1E4F-1CFF-5643-939E-217C01CDF565}" type="slidenum">
-              <a:rPr lang="en-US" smtClean="0"/>
+              <a:rPr lang="en-US" dirty="0"/>
               <a:pPr/>
               <a:t>‹#›</a:t>
             </a:fld>
@@ -925,11 +900,6 @@
         </p:txBody>
       </p:sp>
     </p:spTree>
-    <p:extLst>
-      <p:ext uri="{BB962C8B-B14F-4D97-AF65-F5344CB8AC3E}">
-        <p14:creationId xmlns:p14="http://schemas.microsoft.com/office/powerpoint/2010/main" val="617533385"/>
-      </p:ext>
-    </p:extLst>
   </p:cSld>
   <p:clrMapOvr>
     <a:masterClrMapping/>
@@ -1126,9 +1096,9 @@
           <a:lstStyle/>
           <a:p>
             <a:fld id="{B61BEF0D-F0BB-DE4B-95CE-6DB70DBA9567}" type="datetimeFigureOut">
-              <a:rPr lang="en-US" smtClean="0"/>
+              <a:rPr lang="en-US" dirty="0"/>
               <a:pPr/>
-              <a:t>5/1/2018</a:t>
+              <a:t>4/30/2018</a:t>
             </a:fld>
             <a:endParaRPr lang="en-US" dirty="0"/>
           </a:p>
@@ -1169,7 +1139,7 @@
           <a:lstStyle/>
           <a:p>
             <a:fld id="{D57F1E4F-1CFF-5643-939E-217C01CDF565}" type="slidenum">
-              <a:rPr lang="en-US" smtClean="0"/>
+              <a:rPr lang="en-US" dirty="0"/>
               <a:pPr/>
               <a:t>‹#›</a:t>
             </a:fld>
@@ -1178,11 +1148,6 @@
         </p:txBody>
       </p:sp>
     </p:spTree>
-    <p:extLst>
-      <p:ext uri="{BB962C8B-B14F-4D97-AF65-F5344CB8AC3E}">
-        <p14:creationId xmlns:p14="http://schemas.microsoft.com/office/powerpoint/2010/main" val="2761649848"/>
-      </p:ext>
-    </p:extLst>
   </p:cSld>
   <p:clrMapOvr>
     <a:masterClrMapping/>
@@ -1442,9 +1407,9 @@
           <a:lstStyle/>
           <a:p>
             <a:fld id="{B61BEF0D-F0BB-DE4B-95CE-6DB70DBA9567}" type="datetimeFigureOut">
-              <a:rPr lang="en-US" smtClean="0"/>
+              <a:rPr lang="en-US" dirty="0"/>
               <a:pPr/>
-              <a:t>5/1/2018</a:t>
+              <a:t>4/30/2018</a:t>
             </a:fld>
             <a:endParaRPr lang="en-US" dirty="0"/>
           </a:p>
@@ -1485,7 +1450,7 @@
           <a:lstStyle/>
           <a:p>
             <a:fld id="{D57F1E4F-1CFF-5643-939E-217C01CDF565}" type="slidenum">
-              <a:rPr lang="en-US" smtClean="0"/>
+              <a:rPr lang="en-US" dirty="0"/>
               <a:pPr/>
               <a:t>‹#›</a:t>
             </a:fld>
@@ -1495,7 +1460,7 @@
       </p:sp>
       <p:sp>
         <p:nvSpPr>
-          <p:cNvPr id="24" name="TextBox 23"/>
+          <p:cNvPr id="20" name="TextBox 19"/>
           <p:cNvSpPr txBox="1"/>
           <p:nvPr/>
         </p:nvSpPr>
@@ -1536,7 +1501,7 @@
       </p:sp>
       <p:sp>
         <p:nvSpPr>
-          <p:cNvPr id="25" name="TextBox 24"/>
+          <p:cNvPr id="22" name="TextBox 21"/>
           <p:cNvSpPr txBox="1"/>
           <p:nvPr/>
         </p:nvSpPr>
@@ -1567,20 +1532,23 @@
                     <a:lumOff val="40000"/>
                   </a:schemeClr>
                 </a:solidFill>
-                <a:effectLst/>
                 <a:latin typeface="Arial"/>
               </a:rPr>
               <a:t>”</a:t>
             </a:r>
+            <a:endParaRPr lang="en-US" dirty="0">
+              <a:solidFill>
+                <a:schemeClr val="accent1">
+                  <a:lumMod val="60000"/>
+                  <a:lumOff val="40000"/>
+                </a:schemeClr>
+              </a:solidFill>
+              <a:latin typeface="Arial"/>
+            </a:endParaRPr>
           </a:p>
         </p:txBody>
       </p:sp>
     </p:spTree>
-    <p:extLst>
-      <p:ext uri="{BB962C8B-B14F-4D97-AF65-F5344CB8AC3E}">
-        <p14:creationId xmlns:p14="http://schemas.microsoft.com/office/powerpoint/2010/main" val="1788211959"/>
-      </p:ext>
-    </p:extLst>
   </p:cSld>
   <p:clrMapOvr>
     <a:masterClrMapping/>
@@ -1777,9 +1745,9 @@
           <a:lstStyle/>
           <a:p>
             <a:fld id="{B61BEF0D-F0BB-DE4B-95CE-6DB70DBA9567}" type="datetimeFigureOut">
-              <a:rPr lang="en-US" smtClean="0"/>
+              <a:rPr lang="en-US" dirty="0"/>
               <a:pPr/>
-              <a:t>5/1/2018</a:t>
+              <a:t>4/30/2018</a:t>
             </a:fld>
             <a:endParaRPr lang="en-US" dirty="0"/>
           </a:p>
@@ -1820,7 +1788,7 @@
           <a:lstStyle/>
           <a:p>
             <a:fld id="{D57F1E4F-1CFF-5643-939E-217C01CDF565}" type="slidenum">
-              <a:rPr lang="en-US" smtClean="0"/>
+              <a:rPr lang="en-US" dirty="0"/>
               <a:pPr/>
               <a:t>‹#›</a:t>
             </a:fld>
@@ -1829,11 +1797,6 @@
         </p:txBody>
       </p:sp>
     </p:spTree>
-    <p:extLst>
-      <p:ext uri="{BB962C8B-B14F-4D97-AF65-F5344CB8AC3E}">
-        <p14:creationId xmlns:p14="http://schemas.microsoft.com/office/powerpoint/2010/main" val="2838606903"/>
-      </p:ext>
-    </p:extLst>
   </p:cSld>
   <p:clrMapOvr>
     <a:masterClrMapping/>
@@ -2093,9 +2056,9 @@
           <a:lstStyle/>
           <a:p>
             <a:fld id="{B61BEF0D-F0BB-DE4B-95CE-6DB70DBA9567}" type="datetimeFigureOut">
-              <a:rPr lang="en-US" smtClean="0"/>
+              <a:rPr lang="en-US" dirty="0"/>
               <a:pPr/>
-              <a:t>5/1/2018</a:t>
+              <a:t>4/30/2018</a:t>
             </a:fld>
             <a:endParaRPr lang="en-US" dirty="0"/>
           </a:p>
@@ -2136,7 +2099,7 @@
           <a:lstStyle/>
           <a:p>
             <a:fld id="{D57F1E4F-1CFF-5643-939E-217C01CDF565}" type="slidenum">
-              <a:rPr lang="en-US" smtClean="0"/>
+              <a:rPr lang="en-US" dirty="0"/>
               <a:pPr/>
               <a:t>‹#›</a:t>
             </a:fld>
@@ -2227,11 +2190,6 @@
         </p:txBody>
       </p:sp>
     </p:spTree>
-    <p:extLst>
-      <p:ext uri="{BB962C8B-B14F-4D97-AF65-F5344CB8AC3E}">
-        <p14:creationId xmlns:p14="http://schemas.microsoft.com/office/powerpoint/2010/main" val="3786734375"/>
-      </p:ext>
-    </p:extLst>
   </p:cSld>
   <p:clrMapOvr>
     <a:masterClrMapping/>
@@ -2488,9 +2446,9 @@
           <a:lstStyle/>
           <a:p>
             <a:fld id="{B61BEF0D-F0BB-DE4B-95CE-6DB70DBA9567}" type="datetimeFigureOut">
-              <a:rPr lang="en-US" smtClean="0"/>
+              <a:rPr lang="en-US" dirty="0"/>
               <a:pPr/>
-              <a:t>5/1/2018</a:t>
+              <a:t>4/30/2018</a:t>
             </a:fld>
             <a:endParaRPr lang="en-US" dirty="0"/>
           </a:p>
@@ -2531,7 +2489,7 @@
           <a:lstStyle/>
           <a:p>
             <a:fld id="{D57F1E4F-1CFF-5643-939E-217C01CDF565}" type="slidenum">
-              <a:rPr lang="en-US" smtClean="0"/>
+              <a:rPr lang="en-US" dirty="0"/>
               <a:pPr/>
               <a:t>‹#›</a:t>
             </a:fld>
@@ -2540,11 +2498,6 @@
         </p:txBody>
       </p:sp>
     </p:spTree>
-    <p:extLst>
-      <p:ext uri="{BB962C8B-B14F-4D97-AF65-F5344CB8AC3E}">
-        <p14:creationId xmlns:p14="http://schemas.microsoft.com/office/powerpoint/2010/main" val="2544664954"/>
-      </p:ext>
-    </p:extLst>
   </p:cSld>
   <p:clrMapOvr>
     <a:masterClrMapping/>
@@ -2660,8 +2613,8 @@
           <a:lstStyle/>
           <a:p>
             <a:fld id="{55C6B4A9-1611-4792-9094-5F34BCA07E0B}" type="datetimeFigureOut">
-              <a:rPr lang="en-US" smtClean="0"/>
-              <a:t>5/1/2018</a:t>
+              <a:rPr lang="en-US" dirty="0"/>
+              <a:t>4/30/2018</a:t>
             </a:fld>
             <a:endParaRPr lang="en-US" dirty="0"/>
           </a:p>
@@ -2702,7 +2655,7 @@
           <a:lstStyle/>
           <a:p>
             <a:fld id="{89333C77-0158-454C-844F-B7AB9BD7DAD4}" type="slidenum">
-              <a:rPr lang="en-US" smtClean="0"/>
+              <a:rPr lang="en-US" dirty="0"/>
               <a:t>‹#›</a:t>
             </a:fld>
             <a:endParaRPr lang="en-US" dirty="0"/>
@@ -2710,11 +2663,6 @@
         </p:txBody>
       </p:sp>
     </p:spTree>
-    <p:extLst>
-      <p:ext uri="{BB962C8B-B14F-4D97-AF65-F5344CB8AC3E}">
-        <p14:creationId xmlns:p14="http://schemas.microsoft.com/office/powerpoint/2010/main" val="2446212456"/>
-      </p:ext>
-    </p:extLst>
   </p:cSld>
   <p:clrMapOvr>
     <a:masterClrMapping/>
@@ -2840,9 +2788,9 @@
           <a:lstStyle/>
           <a:p>
             <a:fld id="{B61BEF0D-F0BB-DE4B-95CE-6DB70DBA9567}" type="datetimeFigureOut">
-              <a:rPr lang="en-US" smtClean="0"/>
+              <a:rPr lang="en-US" dirty="0"/>
               <a:pPr/>
-              <a:t>5/1/2018</a:t>
+              <a:t>4/30/2018</a:t>
             </a:fld>
             <a:endParaRPr lang="en-US" dirty="0"/>
           </a:p>
@@ -2883,7 +2831,7 @@
           <a:lstStyle/>
           <a:p>
             <a:fld id="{D57F1E4F-1CFF-5643-939E-217C01CDF565}" type="slidenum">
-              <a:rPr lang="en-US" smtClean="0"/>
+              <a:rPr lang="en-US" dirty="0"/>
               <a:pPr/>
               <a:t>‹#›</a:t>
             </a:fld>
@@ -2892,11 +2840,6 @@
         </p:txBody>
       </p:sp>
     </p:spTree>
-    <p:extLst>
-      <p:ext uri="{BB962C8B-B14F-4D97-AF65-F5344CB8AC3E}">
-        <p14:creationId xmlns:p14="http://schemas.microsoft.com/office/powerpoint/2010/main" val="1650758145"/>
-      </p:ext>
-    </p:extLst>
   </p:cSld>
   <p:clrMapOvr>
     <a:masterClrMapping/>
@@ -2933,8 +2876,14 @@
         </p:nvSpPr>
         <p:spPr/>
         <p:txBody>
-          <a:bodyPr/>
-          <a:lstStyle/>
+          <a:bodyPr>
+            <a:normAutofit/>
+          </a:bodyPr>
+          <a:lstStyle>
+            <a:lvl1pPr>
+              <a:defRPr sz="3600"/>
+            </a:lvl1pPr>
+          </a:lstStyle>
           <a:p>
             <a:r>
               <a:rPr lang="en-US"/>
@@ -3012,9 +2961,9 @@
           <a:lstStyle/>
           <a:p>
             <a:fld id="{B61BEF0D-F0BB-DE4B-95CE-6DB70DBA9567}" type="datetimeFigureOut">
-              <a:rPr lang="en-US" smtClean="0"/>
+              <a:rPr lang="en-US" dirty="0"/>
               <a:pPr/>
-              <a:t>5/1/2018</a:t>
+              <a:t>4/30/2018</a:t>
             </a:fld>
             <a:endParaRPr lang="en-US" dirty="0"/>
           </a:p>
@@ -3055,7 +3004,7 @@
           <a:lstStyle/>
           <a:p>
             <a:fld id="{D57F1E4F-1CFF-5643-939E-217C01CDF565}" type="slidenum">
-              <a:rPr lang="en-US" smtClean="0"/>
+              <a:rPr lang="en-US" dirty="0"/>
               <a:pPr/>
               <a:t>‹#›</a:t>
             </a:fld>
@@ -3064,11 +3013,6 @@
         </p:txBody>
       </p:sp>
     </p:spTree>
-    <p:extLst>
-      <p:ext uri="{BB962C8B-B14F-4D97-AF65-F5344CB8AC3E}">
-        <p14:creationId xmlns:p14="http://schemas.microsoft.com/office/powerpoint/2010/main" val="3659215301"/>
-      </p:ext>
-    </p:extLst>
   </p:cSld>
   <p:clrMapOvr>
     <a:masterClrMapping/>
@@ -3261,9 +3205,9 @@
           <a:lstStyle/>
           <a:p>
             <a:fld id="{B61BEF0D-F0BB-DE4B-95CE-6DB70DBA9567}" type="datetimeFigureOut">
-              <a:rPr lang="en-US" smtClean="0"/>
+              <a:rPr lang="en-US" dirty="0"/>
               <a:pPr/>
-              <a:t>5/1/2018</a:t>
+              <a:t>4/30/2018</a:t>
             </a:fld>
             <a:endParaRPr lang="en-US" dirty="0"/>
           </a:p>
@@ -3304,7 +3248,7 @@
           <a:lstStyle/>
           <a:p>
             <a:fld id="{D57F1E4F-1CFF-5643-939E-217C01CDF565}" type="slidenum">
-              <a:rPr lang="en-US" smtClean="0"/>
+              <a:rPr lang="en-US" dirty="0"/>
               <a:pPr/>
               <a:t>‹#›</a:t>
             </a:fld>
@@ -3313,11 +3257,6 @@
         </p:txBody>
       </p:sp>
     </p:spTree>
-    <p:extLst>
-      <p:ext uri="{BB962C8B-B14F-4D97-AF65-F5344CB8AC3E}">
-        <p14:creationId xmlns:p14="http://schemas.microsoft.com/office/powerpoint/2010/main" val="100978691"/>
-      </p:ext>
-    </p:extLst>
   </p:cSld>
   <p:clrMapOvr>
     <a:masterClrMapping/>
@@ -3495,8 +3434,8 @@
           <a:lstStyle/>
           <a:p>
             <a:fld id="{EB712588-04B1-427B-82EE-E8DB90309F08}" type="datetimeFigureOut">
-              <a:rPr lang="en-US" smtClean="0"/>
-              <a:t>5/1/2018</a:t>
+              <a:rPr lang="en-US" dirty="0"/>
+              <a:t>4/30/2018</a:t>
             </a:fld>
             <a:endParaRPr lang="en-US" dirty="0"/>
           </a:p>
@@ -3537,7 +3476,7 @@
           <a:lstStyle/>
           <a:p>
             <a:fld id="{6FF9F0C5-380F-41C2-899A-BAC0F0927E16}" type="slidenum">
-              <a:rPr lang="en-US" smtClean="0"/>
+              <a:rPr lang="en-US" dirty="0"/>
               <a:t>‹#›</a:t>
             </a:fld>
             <a:endParaRPr lang="en-US" dirty="0"/>
@@ -3545,11 +3484,6 @@
         </p:txBody>
       </p:sp>
     </p:spTree>
-    <p:extLst>
-      <p:ext uri="{BB962C8B-B14F-4D97-AF65-F5344CB8AC3E}">
-        <p14:creationId xmlns:p14="http://schemas.microsoft.com/office/powerpoint/2010/main" val="2509540489"/>
-      </p:ext>
-    </p:extLst>
   </p:cSld>
   <p:clrMapOvr>
     <a:masterClrMapping/>
@@ -3869,9 +3803,9 @@
           <a:lstStyle/>
           <a:p>
             <a:fld id="{B61BEF0D-F0BB-DE4B-95CE-6DB70DBA9567}" type="datetimeFigureOut">
-              <a:rPr lang="en-US" smtClean="0"/>
+              <a:rPr lang="en-US" dirty="0"/>
               <a:pPr/>
-              <a:t>5/1/2018</a:t>
+              <a:t>4/30/2018</a:t>
             </a:fld>
             <a:endParaRPr lang="en-US" dirty="0"/>
           </a:p>
@@ -3912,7 +3846,7 @@
           <a:lstStyle/>
           <a:p>
             <a:fld id="{D57F1E4F-1CFF-5643-939E-217C01CDF565}" type="slidenum">
-              <a:rPr lang="en-US" smtClean="0"/>
+              <a:rPr lang="en-US" dirty="0"/>
               <a:pPr/>
               <a:t>‹#›</a:t>
             </a:fld>
@@ -3921,11 +3855,6 @@
         </p:txBody>
       </p:sp>
     </p:spTree>
-    <p:extLst>
-      <p:ext uri="{BB962C8B-B14F-4D97-AF65-F5344CB8AC3E}">
-        <p14:creationId xmlns:p14="http://schemas.microsoft.com/office/powerpoint/2010/main" val="2780999317"/>
-      </p:ext>
-    </p:extLst>
   </p:cSld>
   <p:clrMapOvr>
     <a:masterClrMapping/>
@@ -3994,9 +3923,9 @@
           <a:lstStyle/>
           <a:p>
             <a:fld id="{B61BEF0D-F0BB-DE4B-95CE-6DB70DBA9567}" type="datetimeFigureOut">
-              <a:rPr lang="en-US" smtClean="0"/>
+              <a:rPr lang="en-US" dirty="0"/>
               <a:pPr/>
-              <a:t>5/1/2018</a:t>
+              <a:t>4/30/2018</a:t>
             </a:fld>
             <a:endParaRPr lang="en-US" dirty="0"/>
           </a:p>
@@ -4037,7 +3966,7 @@
           <a:lstStyle/>
           <a:p>
             <a:fld id="{D57F1E4F-1CFF-5643-939E-217C01CDF565}" type="slidenum">
-              <a:rPr lang="en-US" smtClean="0"/>
+              <a:rPr lang="en-US" dirty="0"/>
               <a:pPr/>
               <a:t>‹#›</a:t>
             </a:fld>
@@ -4046,11 +3975,6 @@
         </p:txBody>
       </p:sp>
     </p:spTree>
-    <p:extLst>
-      <p:ext uri="{BB962C8B-B14F-4D97-AF65-F5344CB8AC3E}">
-        <p14:creationId xmlns:p14="http://schemas.microsoft.com/office/powerpoint/2010/main" val="3980002600"/>
-      </p:ext>
-    </p:extLst>
   </p:cSld>
   <p:clrMapOvr>
     <a:masterClrMapping/>
@@ -4091,9 +4015,9 @@
           <a:lstStyle/>
           <a:p>
             <a:fld id="{B61BEF0D-F0BB-DE4B-95CE-6DB70DBA9567}" type="datetimeFigureOut">
-              <a:rPr lang="en-US" smtClean="0"/>
+              <a:rPr lang="en-US" dirty="0"/>
               <a:pPr/>
-              <a:t>5/1/2018</a:t>
+              <a:t>4/30/2018</a:t>
             </a:fld>
             <a:endParaRPr lang="en-US" dirty="0"/>
           </a:p>
@@ -4134,7 +4058,7 @@
           <a:lstStyle/>
           <a:p>
             <a:fld id="{D57F1E4F-1CFF-5643-939E-217C01CDF565}" type="slidenum">
-              <a:rPr lang="en-US" smtClean="0"/>
+              <a:rPr lang="en-US" dirty="0"/>
               <a:pPr/>
               <a:t>‹#›</a:t>
             </a:fld>
@@ -4143,11 +4067,6 @@
         </p:txBody>
       </p:sp>
     </p:spTree>
-    <p:extLst>
-      <p:ext uri="{BB962C8B-B14F-4D97-AF65-F5344CB8AC3E}">
-        <p14:creationId xmlns:p14="http://schemas.microsoft.com/office/powerpoint/2010/main" val="2836782358"/>
-      </p:ext>
-    </p:extLst>
   </p:cSld>
   <p:clrMapOvr>
     <a:masterClrMapping/>
@@ -4348,8 +4267,8 @@
           <a:lstStyle/>
           <a:p>
             <a:fld id="{42A54C80-263E-416B-A8E0-580EDEADCBDC}" type="datetimeFigureOut">
-              <a:rPr lang="en-US" smtClean="0"/>
-              <a:t>5/1/2018</a:t>
+              <a:rPr lang="en-US" dirty="0"/>
+              <a:t>4/30/2018</a:t>
             </a:fld>
             <a:endParaRPr lang="en-US" dirty="0"/>
           </a:p>
@@ -4390,7 +4309,7 @@
           <a:lstStyle/>
           <a:p>
             <a:fld id="{519954A3-9DFD-4C44-94BA-B95130A3BA1C}" type="slidenum">
-              <a:rPr lang="en-US" smtClean="0"/>
+              <a:rPr lang="en-US" dirty="0"/>
               <a:t>‹#›</a:t>
             </a:fld>
             <a:endParaRPr lang="en-US" dirty="0"/>
@@ -4398,11 +4317,6 @@
         </p:txBody>
       </p:sp>
     </p:spTree>
-    <p:extLst>
-      <p:ext uri="{BB962C8B-B14F-4D97-AF65-F5344CB8AC3E}">
-        <p14:creationId xmlns:p14="http://schemas.microsoft.com/office/powerpoint/2010/main" val="635946743"/>
-      </p:ext>
-    </p:extLst>
   </p:cSld>
   <p:clrMapOvr>
     <a:masterClrMapping/>
@@ -4597,6 +4511,30 @@
       </p:sp>
       <p:sp>
         <p:nvSpPr>
+          <p:cNvPr id="5" name="Date Placeholder 4"/>
+          <p:cNvSpPr>
+            <a:spLocks noGrp="1"/>
+          </p:cNvSpPr>
+          <p:nvPr>
+            <p:ph type="dt" sz="half" idx="10"/>
+          </p:nvPr>
+        </p:nvSpPr>
+        <p:spPr/>
+        <p:txBody>
+          <a:bodyPr/>
+          <a:lstStyle/>
+          <a:p>
+            <a:fld id="{B61BEF0D-F0BB-DE4B-95CE-6DB70DBA9567}" type="datetimeFigureOut">
+              <a:rPr lang="en-US" dirty="0"/>
+              <a:pPr/>
+              <a:t>4/30/2018</a:t>
+            </a:fld>
+            <a:endParaRPr lang="en-US" dirty="0"/>
+          </a:p>
+        </p:txBody>
+      </p:sp>
+      <p:sp>
+        <p:nvSpPr>
           <p:cNvPr id="6" name="Footer Placeholder 5"/>
           <p:cNvSpPr>
             <a:spLocks noGrp="1"/>
@@ -4630,7 +4568,7 @@
           <a:lstStyle/>
           <a:p>
             <a:fld id="{D57F1E4F-1CFF-5643-939E-217C01CDF565}" type="slidenum">
-              <a:rPr lang="en-US" smtClean="0"/>
+              <a:rPr lang="en-US" dirty="0"/>
               <a:pPr/>
               <a:t>‹#›</a:t>
             </a:fld>
@@ -4638,36 +4576,7 @@
           </a:p>
         </p:txBody>
       </p:sp>
-      <p:sp>
-        <p:nvSpPr>
-          <p:cNvPr id="5" name="Date Placeholder 4"/>
-          <p:cNvSpPr>
-            <a:spLocks noGrp="1"/>
-          </p:cNvSpPr>
-          <p:nvPr>
-            <p:ph type="dt" sz="half" idx="10"/>
-          </p:nvPr>
-        </p:nvSpPr>
-        <p:spPr/>
-        <p:txBody>
-          <a:bodyPr/>
-          <a:lstStyle/>
-          <a:p>
-            <a:fld id="{B61BEF0D-F0BB-DE4B-95CE-6DB70DBA9567}" type="datetimeFigureOut">
-              <a:rPr lang="en-US" smtClean="0"/>
-              <a:pPr/>
-              <a:t>5/1/2018</a:t>
-            </a:fld>
-            <a:endParaRPr lang="en-US" dirty="0"/>
-          </a:p>
-        </p:txBody>
-      </p:sp>
     </p:spTree>
-    <p:extLst>
-      <p:ext uri="{BB962C8B-B14F-4D97-AF65-F5344CB8AC3E}">
-        <p14:creationId xmlns:p14="http://schemas.microsoft.com/office/powerpoint/2010/main" val="1796794932"/>
-      </p:ext>
-    </p:extLst>
   </p:cSld>
   <p:clrMapOvr>
     <a:masterClrMapping/>
@@ -4699,7 +4608,7 @@
       </p:grpSpPr>
       <p:grpSp>
         <p:nvGrpSpPr>
-          <p:cNvPr id="44" name="Group 43"/>
+          <p:cNvPr id="7" name="Group 6"/>
           <p:cNvGrpSpPr/>
           <p:nvPr/>
         </p:nvGrpSpPr>
@@ -4727,8 +4636,8 @@
             </a:prstGeom>
             <a:ln w="9525">
               <a:solidFill>
-                <a:schemeClr val="accent1">
-                  <a:alpha val="70000"/>
+                <a:schemeClr val="bg1">
+                  <a:lumMod val="75000"/>
                 </a:schemeClr>
               </a:solidFill>
             </a:ln>
@@ -4764,8 +4673,8 @@
             </a:prstGeom>
             <a:ln w="9525">
               <a:solidFill>
-                <a:schemeClr val="accent1">
-                  <a:alpha val="70000"/>
+                <a:schemeClr val="bg1">
+                  <a:lumMod val="85000"/>
                 </a:schemeClr>
               </a:solidFill>
             </a:ln>
@@ -4825,7 +4734,7 @@
             </a:custGeom>
             <a:solidFill>
               <a:schemeClr val="accent1">
-                <a:alpha val="36000"/>
+                <a:alpha val="30000"/>
               </a:schemeClr>
             </a:solidFill>
             <a:ln>
@@ -4928,9 +4837,8 @@
               </a:avLst>
             </a:prstGeom>
             <a:solidFill>
-              <a:schemeClr val="accent1">
-                <a:lumMod val="75000"/>
-                <a:alpha val="66000"/>
+              <a:schemeClr val="accent2">
+                <a:alpha val="72000"/>
               </a:schemeClr>
             </a:solidFill>
             <a:ln>
@@ -4992,9 +4900,9 @@
               </a:pathLst>
             </a:custGeom>
             <a:solidFill>
-              <a:schemeClr val="accent1">
+              <a:schemeClr val="accent2">
                 <a:lumMod val="75000"/>
-                <a:alpha val="50000"/>
+                <a:alpha val="70000"/>
               </a:schemeClr>
             </a:solidFill>
             <a:ln>
@@ -5056,7 +4964,9 @@
               </a:pathLst>
             </a:custGeom>
             <a:solidFill>
-              <a:schemeClr val="accent2">
+              <a:schemeClr val="accent1">
+                <a:lumMod val="60000"/>
+                <a:lumOff val="40000"/>
                 <a:alpha val="70000"/>
               </a:schemeClr>
             </a:solidFill>
@@ -5119,9 +5029,8 @@
               </a:pathLst>
             </a:custGeom>
             <a:solidFill>
-              <a:schemeClr val="accent2">
-                <a:lumMod val="75000"/>
-                <a:alpha val="80000"/>
+              <a:schemeClr val="accent1">
+                <a:alpha val="65000"/>
               </a:schemeClr>
             </a:solidFill>
             <a:ln>
@@ -5162,8 +5071,7 @@
             </a:prstGeom>
             <a:solidFill>
               <a:schemeClr val="accent1">
-                <a:lumMod val="75000"/>
-                <a:alpha val="66000"/>
+                <a:alpha val="80000"/>
               </a:schemeClr>
             </a:solidFill>
             <a:ln>
@@ -5188,7 +5096,7 @@
         </p:sp>
         <p:sp>
           <p:nvSpPr>
-            <p:cNvPr id="19" name="Isosceles Triangle 18"/>
+            <p:cNvPr id="29" name="Isosceles Triangle 28"/>
             <p:cNvSpPr/>
             <p:nvPr/>
           </p:nvSpPr>
@@ -5204,7 +5112,7 @@
             </a:prstGeom>
             <a:solidFill>
               <a:schemeClr val="accent1">
-                <a:alpha val="70000"/>
+                <a:alpha val="85000"/>
               </a:schemeClr>
             </a:solidFill>
             <a:ln>
@@ -5357,9 +5265,9 @@
           </a:lstStyle>
           <a:p>
             <a:fld id="{B61BEF0D-F0BB-DE4B-95CE-6DB70DBA9567}" type="datetimeFigureOut">
-              <a:rPr lang="en-US" smtClean="0"/>
+              <a:rPr lang="en-US" dirty="0"/>
               <a:pPr/>
-              <a:t>5/1/2018</a:t>
+              <a:t>4/30/2018</a:t>
             </a:fld>
             <a:endParaRPr lang="en-US" dirty="0"/>
           </a:p>
@@ -5434,7 +5342,7 @@
           </a:lstStyle>
           <a:p>
             <a:fld id="{D57F1E4F-1CFF-5643-939E-217C01CDF565}" type="slidenum">
-              <a:rPr lang="en-US" smtClean="0"/>
+              <a:rPr lang="en-US" dirty="0"/>
               <a:pPr/>
               <a:t>‹#›</a:t>
             </a:fld>
@@ -5443,30 +5351,25 @@
         </p:txBody>
       </p:sp>
     </p:spTree>
-    <p:extLst>
-      <p:ext uri="{BB962C8B-B14F-4D97-AF65-F5344CB8AC3E}">
-        <p14:creationId xmlns:p14="http://schemas.microsoft.com/office/powerpoint/2010/main" val="1037246218"/>
-      </p:ext>
-    </p:extLst>
   </p:cSld>
   <p:clrMap bg1="lt1" tx1="dk1" bg2="lt2" tx2="dk2" accent1="accent1" accent2="accent2" accent3="accent3" accent4="accent4" accent5="accent5" accent6="accent6" hlink="hlink" folHlink="folHlink"/>
   <p:sldLayoutIdLst>
-    <p:sldLayoutId id="2147483737" r:id="rId1"/>
-    <p:sldLayoutId id="2147483738" r:id="rId2"/>
-    <p:sldLayoutId id="2147483739" r:id="rId3"/>
-    <p:sldLayoutId id="2147483740" r:id="rId4"/>
-    <p:sldLayoutId id="2147483741" r:id="rId5"/>
-    <p:sldLayoutId id="2147483742" r:id="rId6"/>
-    <p:sldLayoutId id="2147483743" r:id="rId7"/>
-    <p:sldLayoutId id="2147483744" r:id="rId8"/>
-    <p:sldLayoutId id="2147483745" r:id="rId9"/>
-    <p:sldLayoutId id="2147483746" r:id="rId10"/>
-    <p:sldLayoutId id="2147483747" r:id="rId11"/>
-    <p:sldLayoutId id="2147483748" r:id="rId12"/>
-    <p:sldLayoutId id="2147483749" r:id="rId13"/>
-    <p:sldLayoutId id="2147483750" r:id="rId14"/>
-    <p:sldLayoutId id="2147483751" r:id="rId15"/>
-    <p:sldLayoutId id="2147483752" r:id="rId16"/>
+    <p:sldLayoutId id="2147483649" r:id="rId1"/>
+    <p:sldLayoutId id="2147483650" r:id="rId2"/>
+    <p:sldLayoutId id="2147483651" r:id="rId3"/>
+    <p:sldLayoutId id="2147483665" r:id="rId4"/>
+    <p:sldLayoutId id="2147483653" r:id="rId5"/>
+    <p:sldLayoutId id="2147483654" r:id="rId6"/>
+    <p:sldLayoutId id="2147483655" r:id="rId7"/>
+    <p:sldLayoutId id="2147483666" r:id="rId8"/>
+    <p:sldLayoutId id="2147483657" r:id="rId9"/>
+    <p:sldLayoutId id="2147483660" r:id="rId10"/>
+    <p:sldLayoutId id="2147483661" r:id="rId11"/>
+    <p:sldLayoutId id="2147483662" r:id="rId12"/>
+    <p:sldLayoutId id="2147483663" r:id="rId13"/>
+    <p:sldLayoutId id="2147483664" r:id="rId14"/>
+    <p:sldLayoutId id="2147483667" r:id="rId15"/>
+    <p:sldLayoutId id="2147483659" r:id="rId16"/>
   </p:sldLayoutIdLst>
   <p:txStyles>
     <p:titleStyle>
@@ -5907,26 +5810,14 @@
           <a:p>
             <a:pPr algn="ctr"/>
             <a:r>
-              <a:rPr lang="en-US" dirty="0">
-                <a:solidFill>
-                  <a:schemeClr val="accent2"/>
-                </a:solidFill>
-              </a:rPr>
+              <a:rPr lang="en-US" dirty="0"/>
               <a:t>Puzzle-RPG Project </a:t>
             </a:r>
             <a:br>
-              <a:rPr lang="en-US" dirty="0">
-                <a:solidFill>
-                  <a:schemeClr val="accent2"/>
-                </a:solidFill>
-              </a:rPr>
+              <a:rPr lang="en-US" dirty="0"/>
             </a:br>
             <a:r>
-              <a:rPr lang="en-US" dirty="0">
-                <a:solidFill>
-                  <a:schemeClr val="accent2"/>
-                </a:solidFill>
-              </a:rPr>
+              <a:rPr lang="en-US" dirty="0"/>
               <a:t>“Rune Battle”</a:t>
             </a:r>
           </a:p>
@@ -5960,57 +5851,19 @@
           <a:p>
             <a:pPr algn="l"/>
             <a:r>
-              <a:rPr lang="en-US" dirty="0">
-                <a:solidFill>
-                  <a:schemeClr val="accent1"/>
-                </a:solidFill>
-              </a:rPr>
+              <a:rPr lang="en-US" dirty="0"/>
               <a:t>By Caleb Compton </a:t>
             </a:r>
           </a:p>
           <a:p>
             <a:pPr algn="l"/>
             <a:r>
-              <a:rPr lang="en-US" dirty="0">
-                <a:solidFill>
-                  <a:schemeClr val="accent1"/>
-                </a:solidFill>
-              </a:rPr>
+              <a:rPr lang="en-US" dirty="0"/>
               <a:t>Advised By Nathan Bean</a:t>
             </a:r>
           </a:p>
         </p:txBody>
       </p:sp>
-      <p:pic>
-        <p:nvPicPr>
-          <p:cNvPr id="5" name="Picture 4" descr="A close up of a logo&#10;&#10;Description generated with high confidence">
-            <a:extLst>
-              <a:ext uri="{FF2B5EF4-FFF2-40B4-BE49-F238E27FC236}">
-                <a16:creationId xmlns:a16="http://schemas.microsoft.com/office/drawing/2014/main" id="{82B261DE-08D0-4E06-8A41-399ED8402C09}"/>
-              </a:ext>
-            </a:extLst>
-          </p:cNvPr>
-          <p:cNvPicPr>
-            <a:picLocks noChangeAspect="1"/>
-          </p:cNvPicPr>
-          <p:nvPr/>
-        </p:nvPicPr>
-        <p:blipFill>
-          <a:blip r:embed="rId2"/>
-          <a:stretch>
-            <a:fillRect/>
-          </a:stretch>
-        </p:blipFill>
-        <p:spPr>
-          <a:xfrm>
-            <a:off x="59535" y="5276850"/>
-            <a:ext cx="1447532" cy="1447532"/>
-          </a:xfrm>
-          <a:prstGeom prst="rect">
-            <a:avLst/>
-          </a:prstGeom>
-        </p:spPr>
-      </p:pic>
     </p:spTree>
     <p:extLst>
       <p:ext uri="{BB962C8B-B14F-4D97-AF65-F5344CB8AC3E}">
@@ -6046,7 +5899,7 @@
           <p:cNvPr id="2" name="Title 1">
             <a:extLst>
               <a:ext uri="{FF2B5EF4-FFF2-40B4-BE49-F238E27FC236}">
-                <a16:creationId xmlns:a16="http://schemas.microsoft.com/office/drawing/2014/main" id="{8CF1AC6D-2DFE-4F7C-900D-B6C36DDC4536}"/>
+                <a16:creationId xmlns:a16="http://schemas.microsoft.com/office/drawing/2014/main" id="{7ADC7478-32C1-42C1-A0A2-FB3F92697DF0}"/>
               </a:ext>
             </a:extLst>
           </p:cNvPr>
@@ -6063,12 +5916,8 @@
           <a:lstStyle/>
           <a:p>
             <a:r>
-              <a:rPr lang="en-US" dirty="0">
-                <a:solidFill>
-                  <a:schemeClr val="accent2"/>
-                </a:solidFill>
-              </a:rPr>
-              <a:t>The Game Scene</a:t>
+              <a:rPr lang="en-US" dirty="0"/>
+              <a:t>Animations</a:t>
             </a:r>
           </a:p>
         </p:txBody>
@@ -6078,7 +5927,7 @@
           <p:cNvPr id="3" name="Content Placeholder 2">
             <a:extLst>
               <a:ext uri="{FF2B5EF4-FFF2-40B4-BE49-F238E27FC236}">
-                <a16:creationId xmlns:a16="http://schemas.microsoft.com/office/drawing/2014/main" id="{4172CAE2-EEE6-440B-8946-66F777D23A32}"/>
+                <a16:creationId xmlns:a16="http://schemas.microsoft.com/office/drawing/2014/main" id="{65F3EF80-0B27-4FAB-9559-79A7A16578A3}"/>
               </a:ext>
             </a:extLst>
           </p:cNvPr>
@@ -6095,106 +5944,48 @@
           <a:lstStyle/>
           <a:p>
             <a:r>
-              <a:rPr lang="en-US" dirty="0">
-                <a:solidFill>
-                  <a:schemeClr val="tx2"/>
-                </a:solidFill>
-              </a:rPr>
-              <a:t>The majority of the actual gameplay takes place in this scene. </a:t>
-            </a:r>
-          </a:p>
-          <a:p>
-            <a:r>
-              <a:rPr lang="en-US" dirty="0">
-                <a:solidFill>
-                  <a:schemeClr val="tx2"/>
-                </a:solidFill>
-              </a:rPr>
-              <a:t>The top of the screen is reserved for drawing the characters and enemies. Players should be able to watch the battle happen, reflecting their actions on the bottom of the screen. </a:t>
-            </a:r>
-          </a:p>
-          <a:p>
-            <a:r>
-              <a:rPr lang="en-US" dirty="0">
-                <a:solidFill>
-                  <a:schemeClr val="tx2"/>
-                </a:solidFill>
-              </a:rPr>
-              <a:t>The bottom half of the screen is where gameplay takes place</a:t>
-            </a:r>
-          </a:p>
-          <a:p>
-            <a:r>
-              <a:rPr lang="en-US" dirty="0">
-                <a:solidFill>
-                  <a:schemeClr val="tx2"/>
-                </a:solidFill>
-              </a:rPr>
-              <a:t>Every time the draw loop is called, the “</a:t>
-            </a:r>
-            <a:r>
-              <a:rPr lang="en-US" dirty="0" err="1">
-                <a:solidFill>
-                  <a:schemeClr val="tx2"/>
-                </a:solidFill>
-              </a:rPr>
-              <a:t>DrawScene</a:t>
-            </a:r>
-            <a:r>
-              <a:rPr lang="en-US" dirty="0">
-                <a:solidFill>
-                  <a:schemeClr val="tx2"/>
-                </a:solidFill>
-              </a:rPr>
-              <a:t>” function is called. This draws all of the health and energy bars, the characters, as well as the runes.</a:t>
-            </a:r>
-          </a:p>
-          <a:p>
-            <a:r>
-              <a:rPr lang="en-US" dirty="0">
-                <a:solidFill>
-                  <a:schemeClr val="tx2"/>
-                </a:solidFill>
-              </a:rPr>
-              <a:t>Eventually the game scene will have its own subclasses for different levels. Currently have 2 game scenes – one for the regular levels, and one for the Boss level.  </a:t>
-            </a:r>
-          </a:p>
-        </p:txBody>
-      </p:sp>
-      <p:pic>
-        <p:nvPicPr>
-          <p:cNvPr id="4" name="Picture 3" descr="A close up of a logo&#10;&#10;Description generated with high confidence">
-            <a:extLst>
-              <a:ext uri="{FF2B5EF4-FFF2-40B4-BE49-F238E27FC236}">
-                <a16:creationId xmlns:a16="http://schemas.microsoft.com/office/drawing/2014/main" id="{D4076493-1B27-4B7E-83D5-265C2EA1A2D5}"/>
-              </a:ext>
-            </a:extLst>
-          </p:cNvPr>
-          <p:cNvPicPr>
-            <a:picLocks noChangeAspect="1"/>
-          </p:cNvPicPr>
-          <p:nvPr/>
-        </p:nvPicPr>
-        <p:blipFill>
-          <a:blip r:embed="rId2"/>
-          <a:stretch>
-            <a:fillRect/>
-          </a:stretch>
-        </p:blipFill>
-        <p:spPr>
-          <a:xfrm>
-            <a:off x="10413210" y="5153324"/>
-            <a:ext cx="1447532" cy="1447532"/>
-          </a:xfrm>
-          <a:prstGeom prst="rect">
-            <a:avLst/>
-          </a:prstGeom>
-        </p:spPr>
-      </p:pic>
+              <a:rPr lang="en-US" dirty="0"/>
+              <a:t>Animating using a sprite sheet </a:t>
+            </a:r>
+          </a:p>
+          <a:p>
+            <a:pPr lvl="1"/>
+            <a:r>
+              <a:rPr lang="en-US" dirty="0"/>
+              <a:t>All images of a single animation cycle are in a single file</a:t>
+            </a:r>
+          </a:p>
+          <a:p>
+            <a:pPr lvl="1"/>
+            <a:r>
+              <a:rPr lang="en-US" dirty="0"/>
+              <a:t> less memory, faster load times</a:t>
+            </a:r>
+          </a:p>
+          <a:p>
+            <a:r>
+              <a:rPr lang="en-US" dirty="0"/>
+              <a:t>Load the complete sprite sheet image file, then keep track of which part you want to load for any given frame. </a:t>
+            </a:r>
+          </a:p>
+          <a:p>
+            <a:r>
+              <a:rPr lang="en-US" dirty="0"/>
+              <a:t>Every sprite animated separately, gives fine control over the scene </a:t>
+            </a:r>
+          </a:p>
+          <a:p>
+            <a:r>
+              <a:rPr lang="en-US" dirty="0"/>
+              <a:t>Animation code currently implemented, but not widely used in the program</a:t>
+            </a:r>
+          </a:p>
+        </p:txBody>
+      </p:sp>
     </p:spTree>
     <p:extLst>
       <p:ext uri="{BB962C8B-B14F-4D97-AF65-F5344CB8AC3E}">
-        <p14:creationId xmlns:p14="http://schemas.microsoft.com/office/powerpoint/2010/main" val="4259955254"/>
+        <p14:creationId xmlns:p14="http://schemas.microsoft.com/office/powerpoint/2010/main" val="3719081118"/>
       </p:ext>
     </p:extLst>
   </p:cSld>
@@ -6226,7 +6017,7 @@
           <p:cNvPr id="2" name="Title 1">
             <a:extLst>
               <a:ext uri="{FF2B5EF4-FFF2-40B4-BE49-F238E27FC236}">
-                <a16:creationId xmlns:a16="http://schemas.microsoft.com/office/drawing/2014/main" id="{7ADC7478-32C1-42C1-A0A2-FB3F92697DF0}"/>
+                <a16:creationId xmlns:a16="http://schemas.microsoft.com/office/drawing/2014/main" id="{8668D29D-A504-4B15-B106-812E5E9295C0}"/>
               </a:ext>
             </a:extLst>
           </p:cNvPr>
@@ -6243,12 +6034,8 @@
           <a:lstStyle/>
           <a:p>
             <a:r>
-              <a:rPr lang="en-US" dirty="0">
-                <a:solidFill>
-                  <a:schemeClr val="accent2"/>
-                </a:solidFill>
-              </a:rPr>
-              <a:t>Animations</a:t>
+              <a:rPr lang="en-US" dirty="0"/>
+              <a:t>Other Scenes </a:t>
             </a:r>
           </a:p>
         </p:txBody>
@@ -6258,7 +6045,7 @@
           <p:cNvPr id="3" name="Content Placeholder 2">
             <a:extLst>
               <a:ext uri="{FF2B5EF4-FFF2-40B4-BE49-F238E27FC236}">
-                <a16:creationId xmlns:a16="http://schemas.microsoft.com/office/drawing/2014/main" id="{65F3EF80-0B27-4FAB-9559-79A7A16578A3}"/>
+                <a16:creationId xmlns:a16="http://schemas.microsoft.com/office/drawing/2014/main" id="{47E4D91E-8BAC-4A59-ABDF-D007E0ABEECF}"/>
               </a:ext>
             </a:extLst>
           </p:cNvPr>
@@ -6271,106 +6058,34 @@
         </p:nvSpPr>
         <p:spPr/>
         <p:txBody>
-          <a:bodyPr/>
-          <a:lstStyle/>
-          <a:p>
-            <a:r>
-              <a:rPr lang="en-US" dirty="0">
-                <a:solidFill>
-                  <a:schemeClr val="tx2"/>
-                </a:solidFill>
-              </a:rPr>
-              <a:t>Animating using a sprite sheet </a:t>
-            </a:r>
-          </a:p>
-          <a:p>
-            <a:pPr lvl="1"/>
-            <a:r>
-              <a:rPr lang="en-US" dirty="0">
-                <a:solidFill>
-                  <a:schemeClr val="tx2"/>
-                </a:solidFill>
-              </a:rPr>
-              <a:t>All images of a single animation cycle are in a single file</a:t>
-            </a:r>
-          </a:p>
-          <a:p>
-            <a:pPr lvl="1"/>
-            <a:r>
-              <a:rPr lang="en-US" dirty="0">
-                <a:solidFill>
-                  <a:schemeClr val="tx2"/>
-                </a:solidFill>
-              </a:rPr>
-              <a:t> less memory, faster load times</a:t>
-            </a:r>
-          </a:p>
-          <a:p>
-            <a:r>
-              <a:rPr lang="en-US" dirty="0">
-                <a:solidFill>
-                  <a:schemeClr val="tx2"/>
-                </a:solidFill>
-              </a:rPr>
-              <a:t>Load the complete sprite sheet image file, then keep track of which part you want to load for any given frame. </a:t>
-            </a:r>
-          </a:p>
-          <a:p>
-            <a:r>
-              <a:rPr lang="en-US" dirty="0">
-                <a:solidFill>
-                  <a:schemeClr val="tx2"/>
-                </a:solidFill>
-              </a:rPr>
-              <a:t>Every sprite animated separately, gives fine control over the scene </a:t>
-            </a:r>
-          </a:p>
-          <a:p>
-            <a:r>
-              <a:rPr lang="en-US" dirty="0">
-                <a:solidFill>
-                  <a:schemeClr val="tx2"/>
-                </a:solidFill>
-              </a:rPr>
-              <a:t>Animation code currently implemented, but not widely used in the program</a:t>
-            </a:r>
-          </a:p>
-        </p:txBody>
-      </p:sp>
-      <p:pic>
-        <p:nvPicPr>
-          <p:cNvPr id="4" name="Picture 3" descr="A close up of a logo&#10;&#10;Description generated with high confidence">
-            <a:extLst>
-              <a:ext uri="{FF2B5EF4-FFF2-40B4-BE49-F238E27FC236}">
-                <a16:creationId xmlns:a16="http://schemas.microsoft.com/office/drawing/2014/main" id="{75E117D8-8177-4F50-961B-6A792BDC1B49}"/>
-              </a:ext>
-            </a:extLst>
-          </p:cNvPr>
-          <p:cNvPicPr>
-            <a:picLocks noChangeAspect="1"/>
-          </p:cNvPicPr>
-          <p:nvPr/>
-        </p:nvPicPr>
-        <p:blipFill>
-          <a:blip r:embed="rId2"/>
-          <a:stretch>
-            <a:fillRect/>
-          </a:stretch>
-        </p:blipFill>
-        <p:spPr>
-          <a:xfrm>
-            <a:off x="10413210" y="5153324"/>
-            <a:ext cx="1447532" cy="1447532"/>
-          </a:xfrm>
-          <a:prstGeom prst="rect">
-            <a:avLst/>
-          </a:prstGeom>
-        </p:spPr>
-      </p:pic>
+          <a:bodyPr>
+            <a:normAutofit/>
+          </a:bodyPr>
+          <a:lstStyle/>
+          <a:p>
+            <a:r>
+              <a:rPr lang="en-US" sz="2400" dirty="0"/>
+              <a:t>New Character Scene – allows players to name a new character, and then choose what class is should be (Wizard or Knight)</a:t>
+            </a:r>
+          </a:p>
+          <a:p>
+            <a:r>
+              <a:rPr lang="en-US" sz="2400" dirty="0"/>
+              <a:t>Map Scene – player moves around the map to different levels. Completing levels unlocks new ones. </a:t>
+            </a:r>
+          </a:p>
+          <a:p>
+            <a:r>
+              <a:rPr lang="en-US" sz="2400" dirty="0"/>
+              <a:t>Load Game Scene – lists saved characters, and loads the selected character</a:t>
+            </a:r>
+          </a:p>
+        </p:txBody>
+      </p:sp>
     </p:spTree>
     <p:extLst>
       <p:ext uri="{BB962C8B-B14F-4D97-AF65-F5344CB8AC3E}">
-        <p14:creationId xmlns:p14="http://schemas.microsoft.com/office/powerpoint/2010/main" val="3719081118"/>
+        <p14:creationId xmlns:p14="http://schemas.microsoft.com/office/powerpoint/2010/main" val="1301204735"/>
       </p:ext>
     </p:extLst>
   </p:cSld>
@@ -6402,7 +6117,7 @@
           <p:cNvPr id="2" name="Title 1">
             <a:extLst>
               <a:ext uri="{FF2B5EF4-FFF2-40B4-BE49-F238E27FC236}">
-                <a16:creationId xmlns:a16="http://schemas.microsoft.com/office/drawing/2014/main" id="{8668D29D-A504-4B15-B106-812E5E9295C0}"/>
+                <a16:creationId xmlns:a16="http://schemas.microsoft.com/office/drawing/2014/main" id="{569D1BDF-0624-4E69-A833-D0DA5887BB3B}"/>
               </a:ext>
             </a:extLst>
           </p:cNvPr>
@@ -6419,12 +6134,8 @@
           <a:lstStyle/>
           <a:p>
             <a:r>
-              <a:rPr lang="en-US" dirty="0">
-                <a:solidFill>
-                  <a:schemeClr val="accent2"/>
-                </a:solidFill>
-              </a:rPr>
-              <a:t>Other Scenes </a:t>
+              <a:rPr lang="en-US" dirty="0"/>
+              <a:t>Player Class</a:t>
             </a:r>
           </a:p>
         </p:txBody>
@@ -6434,7 +6145,7 @@
           <p:cNvPr id="3" name="Content Placeholder 2">
             <a:extLst>
               <a:ext uri="{FF2B5EF4-FFF2-40B4-BE49-F238E27FC236}">
-                <a16:creationId xmlns:a16="http://schemas.microsoft.com/office/drawing/2014/main" id="{47E4D91E-8BAC-4A59-ABDF-D007E0ABEECF}"/>
+                <a16:creationId xmlns:a16="http://schemas.microsoft.com/office/drawing/2014/main" id="{54E1803E-62E7-477D-A1B6-E2DD20D587F6}"/>
               </a:ext>
             </a:extLst>
           </p:cNvPr>
@@ -6453,86 +6164,22 @@
           <a:lstStyle/>
           <a:p>
             <a:r>
-              <a:rPr lang="en-US" sz="2400" dirty="0">
-                <a:solidFill>
-                  <a:schemeClr val="tx2"/>
-                </a:solidFill>
-              </a:rPr>
-              <a:t>New Character Scene – allows players to name a new character, and then choose what </a:t>
-            </a:r>
-            <a:r>
-              <a:rPr lang="en-US" sz="2400">
-                <a:solidFill>
-                  <a:schemeClr val="tx2"/>
-                </a:solidFill>
-              </a:rPr>
-              <a:t>class it </a:t>
-            </a:r>
-            <a:r>
-              <a:rPr lang="en-US" sz="2400" dirty="0">
-                <a:solidFill>
-                  <a:schemeClr val="tx2"/>
-                </a:solidFill>
-              </a:rPr>
-              <a:t>should be (Wizard or Knight)</a:t>
-            </a:r>
-          </a:p>
-          <a:p>
-            <a:r>
-              <a:rPr lang="en-US" sz="2400" dirty="0">
-                <a:solidFill>
-                  <a:schemeClr val="tx2"/>
-                </a:solidFill>
-              </a:rPr>
-              <a:t>Map Scene – player moves around the map to different levels. Completing levels unlocks new ones. </a:t>
-            </a:r>
-          </a:p>
-          <a:p>
-            <a:r>
-              <a:rPr lang="en-US" sz="2400" dirty="0">
-                <a:solidFill>
-                  <a:schemeClr val="tx2"/>
-                </a:solidFill>
-              </a:rPr>
-              <a:t>Load Game Scene – lists saved characters, and loads the selected character</a:t>
-            </a:r>
-          </a:p>
-        </p:txBody>
-      </p:sp>
-      <p:pic>
-        <p:nvPicPr>
-          <p:cNvPr id="4" name="Picture 3" descr="A close up of a logo&#10;&#10;Description generated with high confidence">
-            <a:extLst>
-              <a:ext uri="{FF2B5EF4-FFF2-40B4-BE49-F238E27FC236}">
-                <a16:creationId xmlns:a16="http://schemas.microsoft.com/office/drawing/2014/main" id="{E3D1516E-2C1D-4F68-8E14-E175C63139E5}"/>
-              </a:ext>
-            </a:extLst>
-          </p:cNvPr>
-          <p:cNvPicPr>
-            <a:picLocks noChangeAspect="1"/>
-          </p:cNvPicPr>
-          <p:nvPr/>
-        </p:nvPicPr>
-        <p:blipFill>
-          <a:blip r:embed="rId2"/>
-          <a:stretch>
-            <a:fillRect/>
-          </a:stretch>
-        </p:blipFill>
-        <p:spPr>
-          <a:xfrm>
-            <a:off x="10413210" y="5153324"/>
-            <a:ext cx="1447532" cy="1447532"/>
-          </a:xfrm>
-          <a:prstGeom prst="rect">
-            <a:avLst/>
-          </a:prstGeom>
-        </p:spPr>
-      </p:pic>
+              <a:rPr lang="en-US" sz="2400" dirty="0"/>
+              <a:t>Keeps track of stats such as health and energy, as well as what runes and levels have been unlocked</a:t>
+            </a:r>
+          </a:p>
+          <a:p>
+            <a:r>
+              <a:rPr lang="en-US" sz="2400" dirty="0"/>
+              <a:t>Gets saved as a JSON file, and then gets reloaded from that file when the player is selected</a:t>
+            </a:r>
+          </a:p>
+        </p:txBody>
+      </p:sp>
     </p:spTree>
     <p:extLst>
       <p:ext uri="{BB962C8B-B14F-4D97-AF65-F5344CB8AC3E}">
-        <p14:creationId xmlns:p14="http://schemas.microsoft.com/office/powerpoint/2010/main" val="1301204735"/>
+        <p14:creationId xmlns:p14="http://schemas.microsoft.com/office/powerpoint/2010/main" val="1255191214"/>
       </p:ext>
     </p:extLst>
   </p:cSld>
@@ -6564,7 +6211,7 @@
           <p:cNvPr id="2" name="Title 1">
             <a:extLst>
               <a:ext uri="{FF2B5EF4-FFF2-40B4-BE49-F238E27FC236}">
-                <a16:creationId xmlns:a16="http://schemas.microsoft.com/office/drawing/2014/main" id="{569D1BDF-0624-4E69-A833-D0DA5887BB3B}"/>
+                <a16:creationId xmlns:a16="http://schemas.microsoft.com/office/drawing/2014/main" id="{B75FB288-5941-4629-847C-B78AAAC05C20}"/>
               </a:ext>
             </a:extLst>
           </p:cNvPr>
@@ -6581,12 +6228,8 @@
           <a:lstStyle/>
           <a:p>
             <a:r>
-              <a:rPr lang="en-US" dirty="0">
-                <a:solidFill>
-                  <a:schemeClr val="accent2"/>
-                </a:solidFill>
-              </a:rPr>
-              <a:t>Player Class</a:t>
+              <a:rPr lang="en-US" dirty="0"/>
+              <a:t>Gameplay</a:t>
             </a:r>
           </a:p>
         </p:txBody>
@@ -6596,7 +6239,7 @@
           <p:cNvPr id="3" name="Content Placeholder 2">
             <a:extLst>
               <a:ext uri="{FF2B5EF4-FFF2-40B4-BE49-F238E27FC236}">
-                <a16:creationId xmlns:a16="http://schemas.microsoft.com/office/drawing/2014/main" id="{54E1803E-62E7-477D-A1B6-E2DD20D587F6}"/>
+                <a16:creationId xmlns:a16="http://schemas.microsoft.com/office/drawing/2014/main" id="{DA1953C6-E441-43CF-98DA-F23ABBA82B04}"/>
               </a:ext>
             </a:extLst>
           </p:cNvPr>
@@ -6609,66 +6252,60 @@
         </p:nvSpPr>
         <p:spPr/>
         <p:txBody>
-          <a:bodyPr>
-            <a:normAutofit/>
-          </a:bodyPr>
-          <a:lstStyle/>
-          <a:p>
-            <a:r>
-              <a:rPr lang="en-US" sz="2400" dirty="0">
-                <a:solidFill>
-                  <a:schemeClr val="accent1"/>
-                </a:solidFill>
-              </a:rPr>
-              <a:t>Keeps track of stats such as health and energy, as well as what runes and levels have been unlocked</a:t>
-            </a:r>
-          </a:p>
-          <a:p>
-            <a:r>
-              <a:rPr lang="en-US" sz="2400" dirty="0">
-                <a:solidFill>
-                  <a:schemeClr val="accent1"/>
-                </a:solidFill>
-              </a:rPr>
-              <a:t>Gets saved as a JSON file, and then gets reloaded from that file when the player is selected</a:t>
-            </a:r>
-          </a:p>
-        </p:txBody>
-      </p:sp>
-      <p:pic>
-        <p:nvPicPr>
-          <p:cNvPr id="4" name="Picture 3" descr="A close up of a logo&#10;&#10;Description generated with high confidence">
-            <a:extLst>
-              <a:ext uri="{FF2B5EF4-FFF2-40B4-BE49-F238E27FC236}">
-                <a16:creationId xmlns:a16="http://schemas.microsoft.com/office/drawing/2014/main" id="{2F53179C-65D8-4B25-8479-D04701ACB129}"/>
-              </a:ext>
-            </a:extLst>
-          </p:cNvPr>
-          <p:cNvPicPr>
-            <a:picLocks noChangeAspect="1"/>
-          </p:cNvPicPr>
-          <p:nvPr/>
-        </p:nvPicPr>
-        <p:blipFill>
-          <a:blip r:embed="rId2"/>
-          <a:stretch>
-            <a:fillRect/>
-          </a:stretch>
-        </p:blipFill>
-        <p:spPr>
-          <a:xfrm>
-            <a:off x="10413210" y="5153324"/>
-            <a:ext cx="1447532" cy="1447532"/>
-          </a:xfrm>
-          <a:prstGeom prst="rect">
-            <a:avLst/>
-          </a:prstGeom>
-        </p:spPr>
-      </p:pic>
+          <a:bodyPr/>
+          <a:lstStyle/>
+          <a:p>
+            <a:r>
+              <a:rPr lang="en-US" dirty="0"/>
+              <a:t>Various colored circles (called “Runes”) fall from the top of the screen </a:t>
+            </a:r>
+          </a:p>
+          <a:p>
+            <a:r>
+              <a:rPr lang="en-US" dirty="0"/>
+              <a:t>Player has two options: </a:t>
+            </a:r>
+          </a:p>
+          <a:p>
+            <a:pPr lvl="1"/>
+            <a:r>
+              <a:rPr lang="en-US" dirty="0"/>
+              <a:t>Placing similar runes in the “</a:t>
+            </a:r>
+            <a:r>
+              <a:rPr lang="en-US" dirty="0" err="1"/>
+              <a:t>spellbox</a:t>
+            </a:r>
+            <a:r>
+              <a:rPr lang="en-US" dirty="0"/>
+              <a:t>” will allow the player to cast spells. This uses energy </a:t>
+            </a:r>
+          </a:p>
+          <a:p>
+            <a:pPr lvl="1"/>
+            <a:r>
+              <a:rPr lang="en-US" dirty="0"/>
+              <a:t>Connecting three of the same runes in a row will refill some of their energy bar </a:t>
+            </a:r>
+          </a:p>
+          <a:p>
+            <a:r>
+              <a:rPr lang="en-US" dirty="0"/>
+              <a:t>Player must cast spells to defeat the enemy before they lose all of their health</a:t>
+            </a:r>
+          </a:p>
+          <a:p>
+            <a:r>
+              <a:rPr lang="en-US" dirty="0"/>
+              <a:t>Player can face challenging bosses that significantly alter the standard rules of the game. </a:t>
+            </a:r>
+          </a:p>
+        </p:txBody>
+      </p:sp>
     </p:spTree>
     <p:extLst>
       <p:ext uri="{BB962C8B-B14F-4D97-AF65-F5344CB8AC3E}">
-        <p14:creationId xmlns:p14="http://schemas.microsoft.com/office/powerpoint/2010/main" val="1255191214"/>
+        <p14:creationId xmlns:p14="http://schemas.microsoft.com/office/powerpoint/2010/main" val="3854225857"/>
       </p:ext>
     </p:extLst>
   </p:cSld>
@@ -6700,7 +6337,7 @@
           <p:cNvPr id="2" name="Title 1">
             <a:extLst>
               <a:ext uri="{FF2B5EF4-FFF2-40B4-BE49-F238E27FC236}">
-                <a16:creationId xmlns:a16="http://schemas.microsoft.com/office/drawing/2014/main" id="{B75FB288-5941-4629-847C-B78AAAC05C20}"/>
+                <a16:creationId xmlns:a16="http://schemas.microsoft.com/office/drawing/2014/main" id="{8BA3F8E6-841C-4855-972F-F238036EE6F7}"/>
               </a:ext>
             </a:extLst>
           </p:cNvPr>
@@ -6717,12 +6354,8 @@
           <a:lstStyle/>
           <a:p>
             <a:r>
-              <a:rPr lang="en-US" dirty="0">
-                <a:solidFill>
-                  <a:schemeClr val="accent2"/>
-                </a:solidFill>
-              </a:rPr>
-              <a:t>Gameplay</a:t>
+              <a:rPr lang="en-US" dirty="0"/>
+              <a:t>Demo </a:t>
             </a:r>
           </a:p>
         </p:txBody>
@@ -6732,7 +6365,7 @@
           <p:cNvPr id="3" name="Content Placeholder 2">
             <a:extLst>
               <a:ext uri="{FF2B5EF4-FFF2-40B4-BE49-F238E27FC236}">
-                <a16:creationId xmlns:a16="http://schemas.microsoft.com/office/drawing/2014/main" id="{DA1953C6-E441-43CF-98DA-F23ABBA82B04}"/>
+                <a16:creationId xmlns:a16="http://schemas.microsoft.com/office/drawing/2014/main" id="{1395AD4C-E6B9-46B3-9FD3-98304FBF19DA}"/>
               </a:ext>
             </a:extLst>
           </p:cNvPr>
@@ -6748,119 +6381,14 @@
           <a:bodyPr/>
           <a:lstStyle/>
           <a:p>
-            <a:r>
-              <a:rPr lang="en-US" dirty="0">
-                <a:solidFill>
-                  <a:schemeClr val="accent1"/>
-                </a:solidFill>
-              </a:rPr>
-              <a:t>Various colored circles (called “Runes”) fall from the top of the screen </a:t>
-            </a:r>
-          </a:p>
-          <a:p>
-            <a:r>
-              <a:rPr lang="en-US" dirty="0">
-                <a:solidFill>
-                  <a:schemeClr val="accent1"/>
-                </a:solidFill>
-              </a:rPr>
-              <a:t>Player has two options: </a:t>
-            </a:r>
-          </a:p>
-          <a:p>
-            <a:pPr lvl="1"/>
-            <a:r>
-              <a:rPr lang="en-US" dirty="0">
-                <a:solidFill>
-                  <a:schemeClr val="accent1"/>
-                </a:solidFill>
-              </a:rPr>
-              <a:t>Placing similar runes in the “</a:t>
-            </a:r>
-            <a:r>
-              <a:rPr lang="en-US" dirty="0" err="1">
-                <a:solidFill>
-                  <a:schemeClr val="accent1"/>
-                </a:solidFill>
-              </a:rPr>
-              <a:t>spellbox</a:t>
-            </a:r>
-            <a:r>
-              <a:rPr lang="en-US" dirty="0">
-                <a:solidFill>
-                  <a:schemeClr val="accent1"/>
-                </a:solidFill>
-              </a:rPr>
-              <a:t>” will allow the player to cast spells. This uses energy </a:t>
-            </a:r>
-          </a:p>
-          <a:p>
-            <a:pPr lvl="1"/>
-            <a:r>
-              <a:rPr lang="en-US" dirty="0">
-                <a:solidFill>
-                  <a:schemeClr val="accent1"/>
-                </a:solidFill>
-              </a:rPr>
-              <a:t>Connecting three of the same runes in a row will refill some of their energy bar </a:t>
-            </a:r>
-          </a:p>
-          <a:p>
-            <a:r>
-              <a:rPr lang="en-US" dirty="0">
-                <a:solidFill>
-                  <a:schemeClr val="accent1"/>
-                </a:solidFill>
-              </a:rPr>
-              <a:t>Player must cast spells to defeat the enemy before they lose all of their health</a:t>
-            </a:r>
-          </a:p>
-          <a:p>
-            <a:r>
-              <a:rPr lang="en-US" dirty="0">
-                <a:solidFill>
-                  <a:schemeClr val="accent1"/>
-                </a:solidFill>
-              </a:rPr>
-              <a:t>Player can face challenging bosses that significantly alter the standard rules of the game. </a:t>
-            </a:r>
-          </a:p>
-        </p:txBody>
-      </p:sp>
-      <p:pic>
-        <p:nvPicPr>
-          <p:cNvPr id="4" name="Picture 3" descr="A close up of a logo&#10;&#10;Description generated with high confidence">
-            <a:extLst>
-              <a:ext uri="{FF2B5EF4-FFF2-40B4-BE49-F238E27FC236}">
-                <a16:creationId xmlns:a16="http://schemas.microsoft.com/office/drawing/2014/main" id="{42A1AB75-5A33-42B5-931F-682F4084FD7E}"/>
-              </a:ext>
-            </a:extLst>
-          </p:cNvPr>
-          <p:cNvPicPr>
-            <a:picLocks noChangeAspect="1"/>
-          </p:cNvPicPr>
-          <p:nvPr/>
-        </p:nvPicPr>
-        <p:blipFill>
-          <a:blip r:embed="rId2"/>
-          <a:stretch>
-            <a:fillRect/>
-          </a:stretch>
-        </p:blipFill>
-        <p:spPr>
-          <a:xfrm>
-            <a:off x="10413210" y="5153324"/>
-            <a:ext cx="1447532" cy="1447532"/>
-          </a:xfrm>
-          <a:prstGeom prst="rect">
-            <a:avLst/>
-          </a:prstGeom>
-        </p:spPr>
-      </p:pic>
+            <a:endParaRPr lang="en-US"/>
+          </a:p>
+        </p:txBody>
+      </p:sp>
     </p:spTree>
     <p:extLst>
       <p:ext uri="{BB962C8B-B14F-4D97-AF65-F5344CB8AC3E}">
-        <p14:creationId xmlns:p14="http://schemas.microsoft.com/office/powerpoint/2010/main" val="3854225857"/>
+        <p14:creationId xmlns:p14="http://schemas.microsoft.com/office/powerpoint/2010/main" val="872691335"/>
       </p:ext>
     </p:extLst>
   </p:cSld>
@@ -6892,7 +6420,7 @@
           <p:cNvPr id="2" name="Title 1">
             <a:extLst>
               <a:ext uri="{FF2B5EF4-FFF2-40B4-BE49-F238E27FC236}">
-                <a16:creationId xmlns:a16="http://schemas.microsoft.com/office/drawing/2014/main" id="{8BA3F8E6-841C-4855-972F-F238036EE6F7}"/>
+                <a16:creationId xmlns:a16="http://schemas.microsoft.com/office/drawing/2014/main" id="{A4D5EE3B-1080-4F64-BEED-695281AE4AFB}"/>
               </a:ext>
             </a:extLst>
           </p:cNvPr>
@@ -6909,12 +6437,8 @@
           <a:lstStyle/>
           <a:p>
             <a:r>
-              <a:rPr lang="en-US" dirty="0">
-                <a:solidFill>
-                  <a:schemeClr val="accent2"/>
-                </a:solidFill>
-              </a:rPr>
-              <a:t>Demo </a:t>
+              <a:rPr lang="en-US" dirty="0"/>
+              <a:t>Future Work </a:t>
             </a:r>
           </a:p>
         </p:txBody>
@@ -6924,7 +6448,7 @@
           <p:cNvPr id="3" name="Content Placeholder 2">
             <a:extLst>
               <a:ext uri="{FF2B5EF4-FFF2-40B4-BE49-F238E27FC236}">
-                <a16:creationId xmlns:a16="http://schemas.microsoft.com/office/drawing/2014/main" id="{1395AD4C-E6B9-46B3-9FD3-98304FBF19DA}"/>
+                <a16:creationId xmlns:a16="http://schemas.microsoft.com/office/drawing/2014/main" id="{F2DD3725-A513-4E76-B0B2-E4657C97DCCA}"/>
               </a:ext>
             </a:extLst>
           </p:cNvPr>
@@ -6937,47 +6461,140 @@
         </p:nvSpPr>
         <p:spPr/>
         <p:txBody>
-          <a:bodyPr/>
-          <a:lstStyle/>
-          <a:p>
-            <a:endParaRPr lang="en-US"/>
-          </a:p>
-        </p:txBody>
-      </p:sp>
-      <p:pic>
-        <p:nvPicPr>
-          <p:cNvPr id="4" name="Picture 3" descr="A close up of a logo&#10;&#10;Description generated with high confidence">
-            <a:extLst>
-              <a:ext uri="{FF2B5EF4-FFF2-40B4-BE49-F238E27FC236}">
-                <a16:creationId xmlns:a16="http://schemas.microsoft.com/office/drawing/2014/main" id="{1E58B061-8667-4B4F-A9EE-2AB4609C4930}"/>
-              </a:ext>
-            </a:extLst>
-          </p:cNvPr>
-          <p:cNvPicPr>
-            <a:picLocks noChangeAspect="1"/>
-          </p:cNvPicPr>
-          <p:nvPr/>
-        </p:nvPicPr>
-        <p:blipFill>
-          <a:blip r:embed="rId2"/>
-          <a:stretch>
-            <a:fillRect/>
-          </a:stretch>
-        </p:blipFill>
-        <p:spPr>
-          <a:xfrm>
-            <a:off x="10413210" y="5153324"/>
-            <a:ext cx="1447532" cy="1447532"/>
-          </a:xfrm>
-          <a:prstGeom prst="rect">
-            <a:avLst/>
-          </a:prstGeom>
-        </p:spPr>
-      </p:pic>
+          <a:bodyPr>
+            <a:normAutofit lnSpcReduction="10000"/>
+          </a:bodyPr>
+          <a:lstStyle/>
+          <a:p>
+            <a:r>
+              <a:rPr lang="en-US" dirty="0">
+                <a:solidFill>
+                  <a:schemeClr val="tx1"/>
+                </a:solidFill>
+              </a:rPr>
+              <a:t>Improve visuals </a:t>
+            </a:r>
+          </a:p>
+          <a:p>
+            <a:r>
+              <a:rPr lang="en-US" dirty="0">
+                <a:solidFill>
+                  <a:schemeClr val="tx1"/>
+                </a:solidFill>
+              </a:rPr>
+              <a:t>Adjust gameplay to encourage different styles of play </a:t>
+            </a:r>
+          </a:p>
+          <a:p>
+            <a:pPr lvl="1"/>
+            <a:r>
+              <a:rPr lang="en-US" dirty="0">
+                <a:solidFill>
+                  <a:schemeClr val="tx1"/>
+                </a:solidFill>
+              </a:rPr>
+              <a:t>Different enemy types have different weaknesses/strengths, which must be adapted to </a:t>
+            </a:r>
+          </a:p>
+          <a:p>
+            <a:pPr lvl="1"/>
+            <a:r>
+              <a:rPr lang="en-US" dirty="0">
+                <a:solidFill>
+                  <a:schemeClr val="tx1"/>
+                </a:solidFill>
+              </a:rPr>
+              <a:t>Unlocking new runes and abilities over time encourage exploration </a:t>
+            </a:r>
+          </a:p>
+          <a:p>
+            <a:pPr lvl="1"/>
+            <a:r>
+              <a:rPr lang="en-US" dirty="0">
+                <a:solidFill>
+                  <a:schemeClr val="tx1"/>
+                </a:solidFill>
+              </a:rPr>
+              <a:t>Adding combos will encourage players to be more strategic with their runes </a:t>
+            </a:r>
+          </a:p>
+          <a:p>
+            <a:pPr lvl="1"/>
+            <a:r>
+              <a:rPr lang="en-US" dirty="0">
+                <a:solidFill>
+                  <a:schemeClr val="tx1"/>
+                </a:solidFill>
+              </a:rPr>
+              <a:t>Combining runes of different types will add new possibilities</a:t>
+            </a:r>
+          </a:p>
+          <a:p>
+            <a:pPr lvl="1"/>
+            <a:r>
+              <a:rPr lang="en-US" dirty="0">
+                <a:solidFill>
+                  <a:schemeClr val="tx1"/>
+                </a:solidFill>
+              </a:rPr>
+              <a:t>Expand the scope of animations, allowing players to anticipate and react to enemy actions </a:t>
+            </a:r>
+          </a:p>
+          <a:p>
+            <a:r>
+              <a:rPr lang="en-US" dirty="0">
+                <a:solidFill>
+                  <a:schemeClr val="tx1"/>
+                </a:solidFill>
+              </a:rPr>
+              <a:t>Higher levels of player customization </a:t>
+            </a:r>
+          </a:p>
+          <a:p>
+            <a:r>
+              <a:rPr lang="en-US" dirty="0">
+                <a:solidFill>
+                  <a:schemeClr val="tx1"/>
+                </a:solidFill>
+              </a:rPr>
+              <a:t>Add additional RPG elements (more characters, more customization, items, </a:t>
+            </a:r>
+            <a:r>
+              <a:rPr lang="en-US" dirty="0" err="1">
+                <a:solidFill>
+                  <a:schemeClr val="tx1"/>
+                </a:solidFill>
+              </a:rPr>
+              <a:t>etc</a:t>
+            </a:r>
+            <a:r>
+              <a:rPr lang="en-US" dirty="0">
+                <a:solidFill>
+                  <a:schemeClr val="tx1"/>
+                </a:solidFill>
+              </a:rPr>
+              <a:t>). </a:t>
+            </a:r>
+          </a:p>
+          <a:p>
+            <a:endParaRPr lang="en-US" dirty="0">
+              <a:solidFill>
+                <a:schemeClr val="tx1"/>
+              </a:solidFill>
+            </a:endParaRPr>
+          </a:p>
+          <a:p>
+            <a:pPr marL="0" indent="0">
+              <a:buNone/>
+            </a:pPr>
+            <a:endParaRPr lang="en-US" dirty="0"/>
+          </a:p>
+        </p:txBody>
+      </p:sp>
     </p:spTree>
     <p:extLst>
       <p:ext uri="{BB962C8B-B14F-4D97-AF65-F5344CB8AC3E}">
-        <p14:creationId xmlns:p14="http://schemas.microsoft.com/office/powerpoint/2010/main" val="872691335"/>
+        <p14:creationId xmlns:p14="http://schemas.microsoft.com/office/powerpoint/2010/main" val="2969183844"/>
       </p:ext>
     </p:extLst>
   </p:cSld>
@@ -7009,404 +6626,6 @@
           <p:cNvPr id="2" name="Title 1">
             <a:extLst>
               <a:ext uri="{FF2B5EF4-FFF2-40B4-BE49-F238E27FC236}">
-                <a16:creationId xmlns:a16="http://schemas.microsoft.com/office/drawing/2014/main" id="{2333718F-E2E9-4094-B3FF-89ED50F22CE9}"/>
-              </a:ext>
-            </a:extLst>
-          </p:cNvPr>
-          <p:cNvSpPr>
-            <a:spLocks noGrp="1"/>
-          </p:cNvSpPr>
-          <p:nvPr>
-            <p:ph type="title"/>
-          </p:nvPr>
-        </p:nvSpPr>
-        <p:spPr/>
-        <p:txBody>
-          <a:bodyPr/>
-          <a:lstStyle/>
-          <a:p>
-            <a:r>
-              <a:rPr lang="en-US" dirty="0">
-                <a:solidFill>
-                  <a:schemeClr val="accent2"/>
-                </a:solidFill>
-              </a:rPr>
-              <a:t>Challenges </a:t>
-            </a:r>
-          </a:p>
-        </p:txBody>
-      </p:sp>
-      <p:sp>
-        <p:nvSpPr>
-          <p:cNvPr id="3" name="Content Placeholder 2">
-            <a:extLst>
-              <a:ext uri="{FF2B5EF4-FFF2-40B4-BE49-F238E27FC236}">
-                <a16:creationId xmlns:a16="http://schemas.microsoft.com/office/drawing/2014/main" id="{CC24B83A-F527-48AD-9E97-301509BA00CE}"/>
-              </a:ext>
-            </a:extLst>
-          </p:cNvPr>
-          <p:cNvSpPr>
-            <a:spLocks noGrp="1"/>
-          </p:cNvSpPr>
-          <p:nvPr>
-            <p:ph idx="1"/>
-          </p:nvPr>
-        </p:nvSpPr>
-        <p:spPr/>
-        <p:txBody>
-          <a:bodyPr>
-            <a:normAutofit/>
-          </a:bodyPr>
-          <a:lstStyle/>
-          <a:p>
-            <a:r>
-              <a:rPr lang="en-US" sz="2400" dirty="0">
-                <a:solidFill>
-                  <a:schemeClr val="accent1"/>
-                </a:solidFill>
-              </a:rPr>
-              <a:t>Working with the Processing environment </a:t>
-            </a:r>
-          </a:p>
-          <a:p>
-            <a:pPr lvl="1"/>
-            <a:r>
-              <a:rPr lang="en-US" sz="2400" dirty="0">
-                <a:solidFill>
-                  <a:schemeClr val="accent1"/>
-                </a:solidFill>
-              </a:rPr>
-              <a:t>Tabbed structure made it difficult to work with many files </a:t>
-            </a:r>
-          </a:p>
-          <a:p>
-            <a:pPr lvl="1"/>
-            <a:r>
-              <a:rPr lang="en-US" sz="2400" dirty="0">
-                <a:solidFill>
-                  <a:schemeClr val="accent1"/>
-                </a:solidFill>
-              </a:rPr>
-              <a:t>Very limited IDE made development slow </a:t>
-            </a:r>
-          </a:p>
-          <a:p>
-            <a:r>
-              <a:rPr lang="en-US" sz="2400" dirty="0">
-                <a:solidFill>
-                  <a:schemeClr val="accent1"/>
-                </a:solidFill>
-              </a:rPr>
-              <a:t>Converting from Processing to Java </a:t>
-            </a:r>
-          </a:p>
-        </p:txBody>
-      </p:sp>
-      <p:pic>
-        <p:nvPicPr>
-          <p:cNvPr id="4" name="Picture 3" descr="A close up of a logo&#10;&#10;Description generated with high confidence">
-            <a:extLst>
-              <a:ext uri="{FF2B5EF4-FFF2-40B4-BE49-F238E27FC236}">
-                <a16:creationId xmlns:a16="http://schemas.microsoft.com/office/drawing/2014/main" id="{223CCD8D-D872-4199-BFA0-E0C1049CEF1C}"/>
-              </a:ext>
-            </a:extLst>
-          </p:cNvPr>
-          <p:cNvPicPr>
-            <a:picLocks noChangeAspect="1"/>
-          </p:cNvPicPr>
-          <p:nvPr/>
-        </p:nvPicPr>
-        <p:blipFill>
-          <a:blip r:embed="rId2"/>
-          <a:stretch>
-            <a:fillRect/>
-          </a:stretch>
-        </p:blipFill>
-        <p:spPr>
-          <a:xfrm>
-            <a:off x="10413210" y="5153324"/>
-            <a:ext cx="1447532" cy="1447532"/>
-          </a:xfrm>
-          <a:prstGeom prst="rect">
-            <a:avLst/>
-          </a:prstGeom>
-        </p:spPr>
-      </p:pic>
-    </p:spTree>
-    <p:extLst>
-      <p:ext uri="{BB962C8B-B14F-4D97-AF65-F5344CB8AC3E}">
-        <p14:creationId xmlns:p14="http://schemas.microsoft.com/office/powerpoint/2010/main" val="184836384"/>
-      </p:ext>
-    </p:extLst>
-  </p:cSld>
-  <p:clrMapOvr>
-    <a:masterClrMapping/>
-  </p:clrMapOvr>
-</p:sld>
-</file>
-
-<file path=ppt/slides/slide17.xml><?xml version="1.0" encoding="utf-8"?>
-<p:sld xmlns:a="http://schemas.openxmlformats.org/drawingml/2006/main" xmlns:r="http://schemas.openxmlformats.org/officeDocument/2006/relationships" xmlns:p="http://schemas.openxmlformats.org/presentationml/2006/main">
-  <p:cSld>
-    <p:spTree>
-      <p:nvGrpSpPr>
-        <p:cNvPr id="1" name=""/>
-        <p:cNvGrpSpPr/>
-        <p:nvPr/>
-      </p:nvGrpSpPr>
-      <p:grpSpPr>
-        <a:xfrm>
-          <a:off x="0" y="0"/>
-          <a:ext cx="0" cy="0"/>
-          <a:chOff x="0" y="0"/>
-          <a:chExt cx="0" cy="0"/>
-        </a:xfrm>
-      </p:grpSpPr>
-      <p:sp>
-        <p:nvSpPr>
-          <p:cNvPr id="2" name="Title 1">
-            <a:extLst>
-              <a:ext uri="{FF2B5EF4-FFF2-40B4-BE49-F238E27FC236}">
-                <a16:creationId xmlns:a16="http://schemas.microsoft.com/office/drawing/2014/main" id="{A4D5EE3B-1080-4F64-BEED-695281AE4AFB}"/>
-              </a:ext>
-            </a:extLst>
-          </p:cNvPr>
-          <p:cNvSpPr>
-            <a:spLocks noGrp="1"/>
-          </p:cNvSpPr>
-          <p:nvPr>
-            <p:ph type="title"/>
-          </p:nvPr>
-        </p:nvSpPr>
-        <p:spPr/>
-        <p:txBody>
-          <a:bodyPr/>
-          <a:lstStyle/>
-          <a:p>
-            <a:r>
-              <a:rPr lang="en-US" dirty="0">
-                <a:solidFill>
-                  <a:schemeClr val="accent2"/>
-                </a:solidFill>
-              </a:rPr>
-              <a:t>Future Work </a:t>
-            </a:r>
-          </a:p>
-        </p:txBody>
-      </p:sp>
-      <p:sp>
-        <p:nvSpPr>
-          <p:cNvPr id="3" name="Content Placeholder 2">
-            <a:extLst>
-              <a:ext uri="{FF2B5EF4-FFF2-40B4-BE49-F238E27FC236}">
-                <a16:creationId xmlns:a16="http://schemas.microsoft.com/office/drawing/2014/main" id="{F2DD3725-A513-4E76-B0B2-E4657C97DCCA}"/>
-              </a:ext>
-            </a:extLst>
-          </p:cNvPr>
-          <p:cNvSpPr>
-            <a:spLocks noGrp="1"/>
-          </p:cNvSpPr>
-          <p:nvPr>
-            <p:ph idx="1"/>
-          </p:nvPr>
-        </p:nvSpPr>
-        <p:spPr/>
-        <p:txBody>
-          <a:bodyPr>
-            <a:normAutofit lnSpcReduction="10000"/>
-          </a:bodyPr>
-          <a:lstStyle/>
-          <a:p>
-            <a:r>
-              <a:rPr lang="en-US" dirty="0">
-                <a:solidFill>
-                  <a:schemeClr val="accent1"/>
-                </a:solidFill>
-              </a:rPr>
-              <a:t>Improve visuals </a:t>
-            </a:r>
-          </a:p>
-          <a:p>
-            <a:r>
-              <a:rPr lang="en-US" dirty="0">
-                <a:solidFill>
-                  <a:schemeClr val="accent1"/>
-                </a:solidFill>
-              </a:rPr>
-              <a:t>Adjust gameplay to encourage different styles of play </a:t>
-            </a:r>
-          </a:p>
-          <a:p>
-            <a:pPr lvl="1"/>
-            <a:r>
-              <a:rPr lang="en-US" dirty="0">
-                <a:solidFill>
-                  <a:schemeClr val="accent1"/>
-                </a:solidFill>
-              </a:rPr>
-              <a:t>Different enemy types have different weaknesses/strengths, which must be adapted to </a:t>
-            </a:r>
-          </a:p>
-          <a:p>
-            <a:pPr lvl="1"/>
-            <a:r>
-              <a:rPr lang="en-US" dirty="0">
-                <a:solidFill>
-                  <a:schemeClr val="accent1"/>
-                </a:solidFill>
-              </a:rPr>
-              <a:t>Unlocking new runes and abilities over time encourage exploration </a:t>
-            </a:r>
-          </a:p>
-          <a:p>
-            <a:pPr lvl="1"/>
-            <a:r>
-              <a:rPr lang="en-US" dirty="0">
-                <a:solidFill>
-                  <a:schemeClr val="accent1"/>
-                </a:solidFill>
-              </a:rPr>
-              <a:t>Adding combos will encourage players to be more strategic with their runes </a:t>
-            </a:r>
-          </a:p>
-          <a:p>
-            <a:pPr lvl="1"/>
-            <a:r>
-              <a:rPr lang="en-US" dirty="0">
-                <a:solidFill>
-                  <a:schemeClr val="accent1"/>
-                </a:solidFill>
-              </a:rPr>
-              <a:t>Combining runes of different types will add new possibilities</a:t>
-            </a:r>
-          </a:p>
-          <a:p>
-            <a:pPr lvl="1"/>
-            <a:r>
-              <a:rPr lang="en-US" dirty="0">
-                <a:solidFill>
-                  <a:schemeClr val="accent1"/>
-                </a:solidFill>
-              </a:rPr>
-              <a:t>Expand the scope of animations, allowing players to anticipate and react to enemy actions </a:t>
-            </a:r>
-          </a:p>
-          <a:p>
-            <a:r>
-              <a:rPr lang="en-US" dirty="0">
-                <a:solidFill>
-                  <a:schemeClr val="accent1"/>
-                </a:solidFill>
-              </a:rPr>
-              <a:t>Higher levels of player customization </a:t>
-            </a:r>
-          </a:p>
-          <a:p>
-            <a:r>
-              <a:rPr lang="en-US" dirty="0">
-                <a:solidFill>
-                  <a:schemeClr val="accent1"/>
-                </a:solidFill>
-              </a:rPr>
-              <a:t>Add additional RPG elements (more characters, more customization, items, </a:t>
-            </a:r>
-            <a:r>
-              <a:rPr lang="en-US" dirty="0" err="1">
-                <a:solidFill>
-                  <a:schemeClr val="accent1"/>
-                </a:solidFill>
-              </a:rPr>
-              <a:t>etc</a:t>
-            </a:r>
-            <a:r>
-              <a:rPr lang="en-US" dirty="0">
-                <a:solidFill>
-                  <a:schemeClr val="accent1"/>
-                </a:solidFill>
-              </a:rPr>
-              <a:t>). </a:t>
-            </a:r>
-          </a:p>
-          <a:p>
-            <a:endParaRPr lang="en-US" dirty="0">
-              <a:solidFill>
-                <a:schemeClr val="accent1"/>
-              </a:solidFill>
-            </a:endParaRPr>
-          </a:p>
-          <a:p>
-            <a:pPr marL="0" indent="0">
-              <a:buNone/>
-            </a:pPr>
-            <a:endParaRPr lang="en-US" dirty="0"/>
-          </a:p>
-        </p:txBody>
-      </p:sp>
-      <p:pic>
-        <p:nvPicPr>
-          <p:cNvPr id="4" name="Picture 3" descr="A close up of a logo&#10;&#10;Description generated with high confidence">
-            <a:extLst>
-              <a:ext uri="{FF2B5EF4-FFF2-40B4-BE49-F238E27FC236}">
-                <a16:creationId xmlns:a16="http://schemas.microsoft.com/office/drawing/2014/main" id="{67719883-22CE-4499-A2E2-A0840CCA9CCD}"/>
-              </a:ext>
-            </a:extLst>
-          </p:cNvPr>
-          <p:cNvPicPr>
-            <a:picLocks noChangeAspect="1"/>
-          </p:cNvPicPr>
-          <p:nvPr/>
-        </p:nvPicPr>
-        <p:blipFill>
-          <a:blip r:embed="rId2"/>
-          <a:stretch>
-            <a:fillRect/>
-          </a:stretch>
-        </p:blipFill>
-        <p:spPr>
-          <a:xfrm>
-            <a:off x="10413210" y="5153324"/>
-            <a:ext cx="1447532" cy="1447532"/>
-          </a:xfrm>
-          <a:prstGeom prst="rect">
-            <a:avLst/>
-          </a:prstGeom>
-        </p:spPr>
-      </p:pic>
-    </p:spTree>
-    <p:extLst>
-      <p:ext uri="{BB962C8B-B14F-4D97-AF65-F5344CB8AC3E}">
-        <p14:creationId xmlns:p14="http://schemas.microsoft.com/office/powerpoint/2010/main" val="2969183844"/>
-      </p:ext>
-    </p:extLst>
-  </p:cSld>
-  <p:clrMapOvr>
-    <a:masterClrMapping/>
-  </p:clrMapOvr>
-</p:sld>
-</file>
-
-<file path=ppt/slides/slide18.xml><?xml version="1.0" encoding="utf-8"?>
-<p:sld xmlns:a="http://schemas.openxmlformats.org/drawingml/2006/main" xmlns:r="http://schemas.openxmlformats.org/officeDocument/2006/relationships" xmlns:p="http://schemas.openxmlformats.org/presentationml/2006/main">
-  <p:cSld>
-    <p:spTree>
-      <p:nvGrpSpPr>
-        <p:cNvPr id="1" name=""/>
-        <p:cNvGrpSpPr/>
-        <p:nvPr/>
-      </p:nvGrpSpPr>
-      <p:grpSpPr>
-        <a:xfrm>
-          <a:off x="0" y="0"/>
-          <a:ext cx="0" cy="0"/>
-          <a:chOff x="0" y="0"/>
-          <a:chExt cx="0" cy="0"/>
-        </a:xfrm>
-      </p:grpSpPr>
-      <p:sp>
-        <p:nvSpPr>
-          <p:cNvPr id="2" name="Title 1">
-            <a:extLst>
-              <a:ext uri="{FF2B5EF4-FFF2-40B4-BE49-F238E27FC236}">
                 <a16:creationId xmlns:a16="http://schemas.microsoft.com/office/drawing/2014/main" id="{C9D51AB2-939D-471A-82D5-E1978652FA4F}"/>
               </a:ext>
             </a:extLst>
@@ -7418,22 +6637,13 @@
             <p:ph type="title"/>
           </p:nvPr>
         </p:nvSpPr>
-        <p:spPr>
-          <a:xfrm>
-            <a:off x="606995" y="618392"/>
-            <a:ext cx="8596668" cy="1320800"/>
-          </a:xfrm>
-        </p:spPr>
+        <p:spPr/>
         <p:txBody>
           <a:bodyPr/>
           <a:lstStyle/>
           <a:p>
             <a:r>
-              <a:rPr lang="en-US" dirty="0">
-                <a:solidFill>
-                  <a:schemeClr val="accent2"/>
-                </a:solidFill>
-              </a:rPr>
+              <a:rPr lang="en-US" dirty="0"/>
               <a:t>Any Questions? </a:t>
             </a:r>
           </a:p>
@@ -7464,36 +6674,6 @@
           </a:p>
         </p:txBody>
       </p:sp>
-      <p:pic>
-        <p:nvPicPr>
-          <p:cNvPr id="4" name="Picture 3" descr="A close up of a logo&#10;&#10;Description generated with high confidence">
-            <a:extLst>
-              <a:ext uri="{FF2B5EF4-FFF2-40B4-BE49-F238E27FC236}">
-                <a16:creationId xmlns:a16="http://schemas.microsoft.com/office/drawing/2014/main" id="{1E10D7E1-6BB3-4B93-B324-57BEAE3C73EA}"/>
-              </a:ext>
-            </a:extLst>
-          </p:cNvPr>
-          <p:cNvPicPr>
-            <a:picLocks noChangeAspect="1"/>
-          </p:cNvPicPr>
-          <p:nvPr/>
-        </p:nvPicPr>
-        <p:blipFill>
-          <a:blip r:embed="rId2"/>
-          <a:stretch>
-            <a:fillRect/>
-          </a:stretch>
-        </p:blipFill>
-        <p:spPr>
-          <a:xfrm>
-            <a:off x="10413210" y="5153324"/>
-            <a:ext cx="1447532" cy="1447532"/>
-          </a:xfrm>
-          <a:prstGeom prst="rect">
-            <a:avLst/>
-          </a:prstGeom>
-        </p:spPr>
-      </p:pic>
     </p:spTree>
     <p:extLst>
       <p:ext uri="{BB962C8B-B14F-4D97-AF65-F5344CB8AC3E}">
@@ -7554,13 +6734,10 @@
           <a:p>
             <a:pPr algn="r"/>
             <a:r>
-              <a:rPr lang="en-US" dirty="0">
-                <a:solidFill>
-                  <a:schemeClr val="accent2"/>
-                </a:solidFill>
-              </a:rPr>
+              <a:rPr lang="en-US"/>
               <a:t>Original Project Goal </a:t>
             </a:r>
+            <a:endParaRPr lang="en-US" dirty="0"/>
           </a:p>
         </p:txBody>
       </p:sp>
@@ -7628,36 +6805,6 @@
           </a:p>
         </p:txBody>
       </p:sp>
-      <p:pic>
-        <p:nvPicPr>
-          <p:cNvPr id="5" name="Picture 4" descr="A close up of a logo&#10;&#10;Description generated with high confidence">
-            <a:extLst>
-              <a:ext uri="{FF2B5EF4-FFF2-40B4-BE49-F238E27FC236}">
-                <a16:creationId xmlns:a16="http://schemas.microsoft.com/office/drawing/2014/main" id="{58711999-8B35-4146-9F88-479EB6FC1169}"/>
-              </a:ext>
-            </a:extLst>
-          </p:cNvPr>
-          <p:cNvPicPr>
-            <a:picLocks noChangeAspect="1"/>
-          </p:cNvPicPr>
-          <p:nvPr/>
-        </p:nvPicPr>
-        <p:blipFill>
-          <a:blip r:embed="rId2"/>
-          <a:stretch>
-            <a:fillRect/>
-          </a:stretch>
-        </p:blipFill>
-        <p:spPr>
-          <a:xfrm>
-            <a:off x="10413210" y="5153324"/>
-            <a:ext cx="1447532" cy="1447532"/>
-          </a:xfrm>
-          <a:prstGeom prst="rect">
-            <a:avLst/>
-          </a:prstGeom>
-        </p:spPr>
-      </p:pic>
     </p:spTree>
     <p:extLst>
       <p:ext uri="{BB962C8B-B14F-4D97-AF65-F5344CB8AC3E}">
@@ -7715,16 +6862,8 @@
           <a:lstStyle/>
           <a:p>
             <a:r>
-              <a:rPr lang="en-US" dirty="0">
-                <a:solidFill>
-                  <a:schemeClr val="accent2"/>
-                </a:solidFill>
-              </a:rPr>
-              <a:t>Requirements</a:t>
-            </a:r>
-            <a:r>
               <a:rPr lang="en-US" dirty="0"/>
-              <a:t> </a:t>
+              <a:t>Requirements </a:t>
             </a:r>
           </a:p>
         </p:txBody>
@@ -7788,36 +6927,6 @@
           </a:p>
         </p:txBody>
       </p:sp>
-      <p:pic>
-        <p:nvPicPr>
-          <p:cNvPr id="5" name="Picture 4" descr="A close up of a logo&#10;&#10;Description generated with high confidence">
-            <a:extLst>
-              <a:ext uri="{FF2B5EF4-FFF2-40B4-BE49-F238E27FC236}">
-                <a16:creationId xmlns:a16="http://schemas.microsoft.com/office/drawing/2014/main" id="{5F2E04FC-950C-4060-9B3A-8FA0CFBD1877}"/>
-              </a:ext>
-            </a:extLst>
-          </p:cNvPr>
-          <p:cNvPicPr>
-            <a:picLocks noChangeAspect="1"/>
-          </p:cNvPicPr>
-          <p:nvPr/>
-        </p:nvPicPr>
-        <p:blipFill>
-          <a:blip r:embed="rId2"/>
-          <a:stretch>
-            <a:fillRect/>
-          </a:stretch>
-        </p:blipFill>
-        <p:spPr>
-          <a:xfrm>
-            <a:off x="10413210" y="5153324"/>
-            <a:ext cx="1447532" cy="1447532"/>
-          </a:xfrm>
-          <a:prstGeom prst="rect">
-            <a:avLst/>
-          </a:prstGeom>
-        </p:spPr>
-      </p:pic>
     </p:spTree>
     <p:extLst>
       <p:ext uri="{BB962C8B-B14F-4D97-AF65-F5344CB8AC3E}">
@@ -7878,11 +6987,7 @@
           <a:p>
             <a:pPr algn="r"/>
             <a:r>
-              <a:rPr lang="en-US" sz="5200" dirty="0">
-                <a:solidFill>
-                  <a:schemeClr val="accent2"/>
-                </a:solidFill>
-              </a:rPr>
+              <a:rPr lang="en-US" sz="5200" dirty="0"/>
               <a:t>Timeline</a:t>
             </a:r>
           </a:p>
@@ -8166,11 +7271,7 @@
           <a:p>
             <a:pPr algn="r"/>
             <a:r>
-              <a:rPr lang="en-US" sz="2400" dirty="0">
-                <a:solidFill>
-                  <a:schemeClr val="accent2"/>
-                </a:solidFill>
-              </a:rPr>
+              <a:rPr lang="en-US" sz="2400" dirty="0"/>
               <a:t>Planned</a:t>
             </a:r>
           </a:p>
@@ -8278,11 +7379,7 @@
           <a:p>
             <a:pPr algn="r"/>
             <a:r>
-              <a:rPr lang="en-US" sz="2400" dirty="0">
-                <a:solidFill>
-                  <a:schemeClr val="accent2"/>
-                </a:solidFill>
-              </a:rPr>
+              <a:rPr lang="en-US" sz="2400" dirty="0"/>
               <a:t>Actual</a:t>
             </a:r>
           </a:p>
@@ -8672,36 +7769,6 @@
           </a:p>
         </p:txBody>
       </p:sp>
-      <p:pic>
-        <p:nvPicPr>
-          <p:cNvPr id="10" name="Picture 9" descr="A close up of a logo&#10;&#10;Description generated with high confidence">
-            <a:extLst>
-              <a:ext uri="{FF2B5EF4-FFF2-40B4-BE49-F238E27FC236}">
-                <a16:creationId xmlns:a16="http://schemas.microsoft.com/office/drawing/2014/main" id="{4D0F9E77-FA1D-45B2-BAF2-92BC565E9B4D}"/>
-              </a:ext>
-            </a:extLst>
-          </p:cNvPr>
-          <p:cNvPicPr>
-            <a:picLocks noChangeAspect="1"/>
-          </p:cNvPicPr>
-          <p:nvPr/>
-        </p:nvPicPr>
-        <p:blipFill>
-          <a:blip r:embed="rId2"/>
-          <a:stretch>
-            <a:fillRect/>
-          </a:stretch>
-        </p:blipFill>
-        <p:spPr>
-          <a:xfrm>
-            <a:off x="10413210" y="5153324"/>
-            <a:ext cx="1447532" cy="1447532"/>
-          </a:xfrm>
-          <a:prstGeom prst="rect">
-            <a:avLst/>
-          </a:prstGeom>
-        </p:spPr>
-      </p:pic>
     </p:spTree>
     <p:extLst>
       <p:ext uri="{BB962C8B-B14F-4D97-AF65-F5344CB8AC3E}">
@@ -8754,11 +7821,7 @@
           <a:lstStyle/>
           <a:p>
             <a:r>
-              <a:rPr lang="en-US" dirty="0">
-                <a:solidFill>
-                  <a:schemeClr val="accent2"/>
-                </a:solidFill>
-              </a:rPr>
+              <a:rPr lang="en-US" dirty="0"/>
               <a:t>Technologies Used</a:t>
             </a:r>
           </a:p>
@@ -8829,36 +7892,6 @@
           <a:xfrm>
             <a:off x="9446601" y="1457325"/>
             <a:ext cx="1971675" cy="1971675"/>
-          </a:xfrm>
-          <a:prstGeom prst="rect">
-            <a:avLst/>
-          </a:prstGeom>
-        </p:spPr>
-      </p:pic>
-      <p:pic>
-        <p:nvPicPr>
-          <p:cNvPr id="6" name="Picture 5" descr="A close up of a logo&#10;&#10;Description generated with high confidence">
-            <a:extLst>
-              <a:ext uri="{FF2B5EF4-FFF2-40B4-BE49-F238E27FC236}">
-                <a16:creationId xmlns:a16="http://schemas.microsoft.com/office/drawing/2014/main" id="{C0560E88-D5FE-488E-94D5-790F07525AC1}"/>
-              </a:ext>
-            </a:extLst>
-          </p:cNvPr>
-          <p:cNvPicPr>
-            <a:picLocks noChangeAspect="1"/>
-          </p:cNvPicPr>
-          <p:nvPr/>
-        </p:nvPicPr>
-        <p:blipFill>
-          <a:blip r:embed="rId3"/>
-          <a:stretch>
-            <a:fillRect/>
-          </a:stretch>
-        </p:blipFill>
-        <p:spPr>
-          <a:xfrm>
-            <a:off x="10413210" y="5162849"/>
-            <a:ext cx="1447532" cy="1447532"/>
           </a:xfrm>
           <a:prstGeom prst="rect">
             <a:avLst/>
@@ -8911,19 +7944,21 @@
             <p:ph type="title"/>
           </p:nvPr>
         </p:nvSpPr>
-        <p:spPr/>
+        <p:spPr>
+          <a:xfrm>
+            <a:off x="677334" y="609600"/>
+            <a:ext cx="8596668" cy="1320800"/>
+          </a:xfrm>
+        </p:spPr>
         <p:txBody>
           <a:bodyPr/>
           <a:lstStyle/>
           <a:p>
             <a:r>
-              <a:rPr lang="en-US" dirty="0">
-                <a:solidFill>
-                  <a:schemeClr val="accent2"/>
-                </a:solidFill>
-              </a:rPr>
+              <a:rPr lang="en-US"/>
               <a:t>Overall Structure </a:t>
             </a:r>
+            <a:endParaRPr lang="en-US" dirty="0"/>
           </a:p>
         </p:txBody>
       </p:sp>
@@ -8951,36 +7986,6 @@
           <a:xfrm>
             <a:off x="795337" y="1270000"/>
             <a:ext cx="7510463" cy="4787900"/>
-          </a:xfrm>
-          <a:prstGeom prst="rect">
-            <a:avLst/>
-          </a:prstGeom>
-        </p:spPr>
-      </p:pic>
-      <p:pic>
-        <p:nvPicPr>
-          <p:cNvPr id="6" name="Picture 5" descr="A close up of a logo&#10;&#10;Description generated with high confidence">
-            <a:extLst>
-              <a:ext uri="{FF2B5EF4-FFF2-40B4-BE49-F238E27FC236}">
-                <a16:creationId xmlns:a16="http://schemas.microsoft.com/office/drawing/2014/main" id="{7B7C04BC-B0FF-47E4-9BF3-0F16611C2652}"/>
-              </a:ext>
-            </a:extLst>
-          </p:cNvPr>
-          <p:cNvPicPr>
-            <a:picLocks noChangeAspect="1"/>
-          </p:cNvPicPr>
-          <p:nvPr/>
-        </p:nvPicPr>
-        <p:blipFill>
-          <a:blip r:embed="rId3"/>
-          <a:stretch>
-            <a:fillRect/>
-          </a:stretch>
-        </p:blipFill>
-        <p:spPr>
-          <a:xfrm>
-            <a:off x="10413210" y="5153324"/>
-            <a:ext cx="1447532" cy="1447532"/>
           </a:xfrm>
           <a:prstGeom prst="rect">
             <a:avLst/>
@@ -9022,7 +8027,7 @@
           <p:cNvPr id="2" name="Title 1">
             <a:extLst>
               <a:ext uri="{FF2B5EF4-FFF2-40B4-BE49-F238E27FC236}">
-                <a16:creationId xmlns:a16="http://schemas.microsoft.com/office/drawing/2014/main" id="{639B60AD-DC66-47DF-93F4-6AF9118EC38F}"/>
+                <a16:creationId xmlns:a16="http://schemas.microsoft.com/office/drawing/2014/main" id="{2D3EF30E-CF36-485C-8A6B-2D0EAF9D90EA}"/>
               </a:ext>
             </a:extLst>
           </p:cNvPr>
@@ -9033,616 +8038,116 @@
             <p:ph type="title"/>
           </p:nvPr>
         </p:nvSpPr>
-        <p:spPr>
-          <a:xfrm>
-            <a:off x="677334" y="609600"/>
-            <a:ext cx="8596668" cy="621323"/>
-          </a:xfrm>
-        </p:spPr>
-        <p:txBody>
-          <a:bodyPr>
-            <a:normAutofit fontScale="90000"/>
-          </a:bodyPr>
-          <a:lstStyle/>
-          <a:p>
-            <a:r>
-              <a:rPr lang="en-US" dirty="0">
-                <a:solidFill>
-                  <a:schemeClr val="accent2"/>
-                </a:solidFill>
-              </a:rPr>
-              <a:t>Control Flow </a:t>
-            </a:r>
-          </a:p>
-        </p:txBody>
-      </p:sp>
-      <p:sp>
-        <p:nvSpPr>
-          <p:cNvPr id="5" name="Rectangle: Rounded Corners 4">
+        <p:spPr/>
+        <p:txBody>
+          <a:bodyPr/>
+          <a:lstStyle/>
+          <a:p>
+            <a:r>
+              <a:rPr lang="en-US" dirty="0"/>
+              <a:t>The Main Class</a:t>
+            </a:r>
+          </a:p>
+        </p:txBody>
+      </p:sp>
+      <p:sp>
+        <p:nvSpPr>
+          <p:cNvPr id="3" name="Content Placeholder 2">
             <a:extLst>
               <a:ext uri="{FF2B5EF4-FFF2-40B4-BE49-F238E27FC236}">
-                <a16:creationId xmlns:a16="http://schemas.microsoft.com/office/drawing/2014/main" id="{43070586-0056-492A-A989-7ECE7CAF86C3}"/>
+                <a16:creationId xmlns:a16="http://schemas.microsoft.com/office/drawing/2014/main" id="{7120DB0F-FB77-4342-B627-FDB5CEB938F2}"/>
               </a:ext>
             </a:extLst>
           </p:cNvPr>
-          <p:cNvSpPr/>
-          <p:nvPr/>
+          <p:cNvSpPr>
+            <a:spLocks noGrp="1"/>
+          </p:cNvSpPr>
+          <p:nvPr>
+            <p:ph idx="1"/>
+          </p:nvPr>
         </p:nvSpPr>
         <p:spPr>
           <a:xfrm>
-            <a:off x="228601" y="2154115"/>
-            <a:ext cx="1899138" cy="782516"/>
+            <a:off x="677334" y="1411551"/>
+            <a:ext cx="8596668" cy="5446450"/>
           </a:xfrm>
-          <a:prstGeom prst="roundRect">
-            <a:avLst/>
-          </a:prstGeom>
         </p:spPr>
-        <p:style>
-          <a:lnRef idx="2">
-            <a:schemeClr val="accent1">
-              <a:shade val="50000"/>
-            </a:schemeClr>
-          </a:lnRef>
-          <a:fillRef idx="1">
-            <a:schemeClr val="accent1"/>
-          </a:fillRef>
-          <a:effectRef idx="0">
-            <a:schemeClr val="accent1"/>
-          </a:effectRef>
-          <a:fontRef idx="minor">
-            <a:schemeClr val="lt1"/>
-          </a:fontRef>
-        </p:style>
-        <p:txBody>
-          <a:bodyPr rtlCol="0" anchor="ctr"/>
-          <a:lstStyle/>
-          <a:p>
-            <a:pPr algn="ctr"/>
+        <p:txBody>
+          <a:bodyPr/>
+          <a:lstStyle/>
+          <a:p>
             <a:r>
               <a:rPr lang="en-US" dirty="0"/>
-              <a:t>Start Menu</a:t>
-            </a:r>
-          </a:p>
-        </p:txBody>
-      </p:sp>
-      <p:sp>
-        <p:nvSpPr>
-          <p:cNvPr id="6" name="Rectangle: Rounded Corners 5">
-            <a:extLst>
-              <a:ext uri="{FF2B5EF4-FFF2-40B4-BE49-F238E27FC236}">
-                <a16:creationId xmlns:a16="http://schemas.microsoft.com/office/drawing/2014/main" id="{C78DBE98-3CD8-428F-AAD2-C60239BE8F60}"/>
-              </a:ext>
-            </a:extLst>
-          </p:cNvPr>
-          <p:cNvSpPr/>
-          <p:nvPr/>
-        </p:nvSpPr>
-        <p:spPr>
-          <a:xfrm>
-            <a:off x="2514600" y="3244362"/>
-            <a:ext cx="1899138" cy="782516"/>
-          </a:xfrm>
-          <a:prstGeom prst="roundRect">
-            <a:avLst/>
-          </a:prstGeom>
-        </p:spPr>
-        <p:style>
-          <a:lnRef idx="2">
-            <a:schemeClr val="accent1">
-              <a:shade val="50000"/>
-            </a:schemeClr>
-          </a:lnRef>
-          <a:fillRef idx="1">
-            <a:schemeClr val="accent1"/>
-          </a:fillRef>
-          <a:effectRef idx="0">
-            <a:schemeClr val="accent1"/>
-          </a:effectRef>
-          <a:fontRef idx="minor">
-            <a:schemeClr val="lt1"/>
-          </a:fontRef>
-        </p:style>
-        <p:txBody>
-          <a:bodyPr rtlCol="0" anchor="ctr"/>
-          <a:lstStyle/>
-          <a:p>
-            <a:pPr algn="ctr"/>
+              <a:t>Processing has 2 required functions in the main class – Setup and Draw</a:t>
+            </a:r>
+          </a:p>
+          <a:p>
+            <a:pPr lvl="1"/>
             <a:r>
               <a:rPr lang="en-US" dirty="0"/>
-              <a:t>New Character</a:t>
-            </a:r>
-          </a:p>
-        </p:txBody>
-      </p:sp>
-      <p:sp>
-        <p:nvSpPr>
-          <p:cNvPr id="7" name="Rectangle: Rounded Corners 6">
-            <a:extLst>
-              <a:ext uri="{FF2B5EF4-FFF2-40B4-BE49-F238E27FC236}">
-                <a16:creationId xmlns:a16="http://schemas.microsoft.com/office/drawing/2014/main" id="{E27504EF-DA94-423F-8EB7-DF6421F75D84}"/>
-              </a:ext>
-            </a:extLst>
-          </p:cNvPr>
-          <p:cNvSpPr/>
-          <p:nvPr/>
-        </p:nvSpPr>
-        <p:spPr>
-          <a:xfrm>
-            <a:off x="2514600" y="1477107"/>
-            <a:ext cx="1899138" cy="782516"/>
-          </a:xfrm>
-          <a:prstGeom prst="roundRect">
-            <a:avLst/>
-          </a:prstGeom>
-        </p:spPr>
-        <p:style>
-          <a:lnRef idx="2">
-            <a:schemeClr val="accent1">
-              <a:shade val="50000"/>
-            </a:schemeClr>
-          </a:lnRef>
-          <a:fillRef idx="1">
-            <a:schemeClr val="accent1"/>
-          </a:fillRef>
-          <a:effectRef idx="0">
-            <a:schemeClr val="accent1"/>
-          </a:effectRef>
-          <a:fontRef idx="minor">
-            <a:schemeClr val="lt1"/>
-          </a:fontRef>
-        </p:style>
-        <p:txBody>
-          <a:bodyPr rtlCol="0" anchor="ctr"/>
-          <a:lstStyle/>
-          <a:p>
-            <a:pPr algn="ctr"/>
+              <a:t>Setup initializes all of the global variables and sets the screen dimensions. Gets called once, before anything else happens </a:t>
+            </a:r>
+          </a:p>
+          <a:p>
+            <a:pPr lvl="1"/>
             <a:r>
               <a:rPr lang="en-US" dirty="0"/>
-              <a:t>Load Character</a:t>
-            </a:r>
-          </a:p>
-        </p:txBody>
-      </p:sp>
-      <p:sp>
-        <p:nvSpPr>
-          <p:cNvPr id="8" name="Rectangle: Rounded Corners 7">
-            <a:extLst>
-              <a:ext uri="{FF2B5EF4-FFF2-40B4-BE49-F238E27FC236}">
-                <a16:creationId xmlns:a16="http://schemas.microsoft.com/office/drawing/2014/main" id="{29C837EB-973F-4DE5-B377-E7EECE3A6854}"/>
-              </a:ext>
-            </a:extLst>
-          </p:cNvPr>
-          <p:cNvSpPr/>
-          <p:nvPr/>
-        </p:nvSpPr>
-        <p:spPr>
-          <a:xfrm>
-            <a:off x="5073162" y="2373923"/>
-            <a:ext cx="1899138" cy="782516"/>
-          </a:xfrm>
-          <a:prstGeom prst="roundRect">
-            <a:avLst/>
-          </a:prstGeom>
-        </p:spPr>
-        <p:style>
-          <a:lnRef idx="2">
-            <a:schemeClr val="accent1">
-              <a:shade val="50000"/>
-            </a:schemeClr>
-          </a:lnRef>
-          <a:fillRef idx="1">
-            <a:schemeClr val="accent1"/>
-          </a:fillRef>
-          <a:effectRef idx="0">
-            <a:schemeClr val="accent1"/>
-          </a:effectRef>
-          <a:fontRef idx="minor">
-            <a:schemeClr val="lt1"/>
-          </a:fontRef>
-        </p:style>
-        <p:txBody>
-          <a:bodyPr rtlCol="0" anchor="ctr"/>
-          <a:lstStyle/>
-          <a:p>
-            <a:pPr algn="ctr"/>
+              <a:t>The Draw function is the primary game loop. Gets called repeatedly until program is closed</a:t>
+            </a:r>
+          </a:p>
+          <a:p>
+            <a:pPr lvl="2"/>
             <a:r>
               <a:rPr lang="en-US" dirty="0"/>
-              <a:t>Map Scene </a:t>
-            </a:r>
-          </a:p>
-        </p:txBody>
-      </p:sp>
-      <p:sp>
-        <p:nvSpPr>
-          <p:cNvPr id="9" name="Rectangle: Rounded Corners 8">
-            <a:extLst>
-              <a:ext uri="{FF2B5EF4-FFF2-40B4-BE49-F238E27FC236}">
-                <a16:creationId xmlns:a16="http://schemas.microsoft.com/office/drawing/2014/main" id="{F7D846A1-3116-4F1B-A49C-3B1F73A54362}"/>
-              </a:ext>
-            </a:extLst>
-          </p:cNvPr>
-          <p:cNvSpPr/>
-          <p:nvPr/>
-        </p:nvSpPr>
-        <p:spPr>
-          <a:xfrm>
-            <a:off x="8018585" y="2373923"/>
-            <a:ext cx="1899138" cy="782516"/>
-          </a:xfrm>
-          <a:prstGeom prst="roundRect">
-            <a:avLst/>
-          </a:prstGeom>
-        </p:spPr>
-        <p:style>
-          <a:lnRef idx="2">
-            <a:schemeClr val="accent1">
-              <a:shade val="50000"/>
-            </a:schemeClr>
-          </a:lnRef>
-          <a:fillRef idx="1">
-            <a:schemeClr val="accent1"/>
-          </a:fillRef>
-          <a:effectRef idx="0">
-            <a:schemeClr val="accent1"/>
-          </a:effectRef>
-          <a:fontRef idx="minor">
-            <a:schemeClr val="lt1"/>
-          </a:fontRef>
-        </p:style>
-        <p:txBody>
-          <a:bodyPr rtlCol="0" anchor="ctr"/>
-          <a:lstStyle/>
-          <a:p>
-            <a:pPr algn="ctr"/>
+              <a:t>Everything that happens in the game gets called from the Draw function</a:t>
+            </a:r>
+          </a:p>
+          <a:p>
             <a:r>
               <a:rPr lang="en-US" dirty="0"/>
-              <a:t>Game Level </a:t>
-            </a:r>
-          </a:p>
-        </p:txBody>
-      </p:sp>
-      <p:cxnSp>
-        <p:nvCxnSpPr>
-          <p:cNvPr id="11" name="Straight Arrow Connector 10">
-            <a:extLst>
-              <a:ext uri="{FF2B5EF4-FFF2-40B4-BE49-F238E27FC236}">
-                <a16:creationId xmlns:a16="http://schemas.microsoft.com/office/drawing/2014/main" id="{84CF75FD-06AB-48BB-AE15-E1EC09137594}"/>
-              </a:ext>
-            </a:extLst>
-          </p:cNvPr>
-          <p:cNvCxnSpPr>
-            <a:endCxn id="7" idx="1"/>
-          </p:cNvCxnSpPr>
-          <p:nvPr/>
-        </p:nvCxnSpPr>
-        <p:spPr>
-          <a:xfrm flipV="1">
-            <a:off x="1037492" y="1868365"/>
-            <a:ext cx="1477108" cy="285750"/>
-          </a:xfrm>
-          <a:prstGeom prst="straightConnector1">
-            <a:avLst/>
-          </a:prstGeom>
-          <a:ln>
-            <a:tailEnd type="triangle"/>
-          </a:ln>
-        </p:spPr>
-        <p:style>
-          <a:lnRef idx="1">
-            <a:schemeClr val="dk1"/>
-          </a:lnRef>
-          <a:fillRef idx="0">
-            <a:schemeClr val="dk1"/>
-          </a:fillRef>
-          <a:effectRef idx="0">
-            <a:schemeClr val="dk1"/>
-          </a:effectRef>
-          <a:fontRef idx="minor">
-            <a:schemeClr val="tx1"/>
-          </a:fontRef>
-        </p:style>
-      </p:cxnSp>
-      <p:cxnSp>
-        <p:nvCxnSpPr>
-          <p:cNvPr id="12" name="Straight Arrow Connector 11">
-            <a:extLst>
-              <a:ext uri="{FF2B5EF4-FFF2-40B4-BE49-F238E27FC236}">
-                <a16:creationId xmlns:a16="http://schemas.microsoft.com/office/drawing/2014/main" id="{60BA827B-A1AC-401D-9FF9-13E7CDF7A4CB}"/>
-              </a:ext>
-            </a:extLst>
-          </p:cNvPr>
-          <p:cNvCxnSpPr>
-            <a:cxnSpLocks/>
-            <a:stCxn id="5" idx="2"/>
-            <a:endCxn id="6" idx="1"/>
-          </p:cNvCxnSpPr>
-          <p:nvPr/>
-        </p:nvCxnSpPr>
-        <p:spPr>
-          <a:xfrm>
-            <a:off x="1178170" y="2936631"/>
-            <a:ext cx="1336430" cy="698989"/>
-          </a:xfrm>
-          <a:prstGeom prst="straightConnector1">
-            <a:avLst/>
-          </a:prstGeom>
-          <a:ln>
-            <a:tailEnd type="triangle"/>
-          </a:ln>
-        </p:spPr>
-        <p:style>
-          <a:lnRef idx="1">
-            <a:schemeClr val="dk1"/>
-          </a:lnRef>
-          <a:fillRef idx="0">
-            <a:schemeClr val="dk1"/>
-          </a:fillRef>
-          <a:effectRef idx="0">
-            <a:schemeClr val="dk1"/>
-          </a:effectRef>
-          <a:fontRef idx="minor">
-            <a:schemeClr val="tx1"/>
-          </a:fontRef>
-        </p:style>
-      </p:cxnSp>
-      <p:cxnSp>
-        <p:nvCxnSpPr>
-          <p:cNvPr id="15" name="Straight Arrow Connector 14">
-            <a:extLst>
-              <a:ext uri="{FF2B5EF4-FFF2-40B4-BE49-F238E27FC236}">
-                <a16:creationId xmlns:a16="http://schemas.microsoft.com/office/drawing/2014/main" id="{596039C5-A8A4-4688-A50C-DFB26AFBC0C8}"/>
-              </a:ext>
-            </a:extLst>
-          </p:cNvPr>
-          <p:cNvCxnSpPr>
-            <a:cxnSpLocks/>
-            <a:stCxn id="7" idx="3"/>
-          </p:cNvCxnSpPr>
-          <p:nvPr/>
-        </p:nvCxnSpPr>
-        <p:spPr>
-          <a:xfrm>
-            <a:off x="4413738" y="1868365"/>
-            <a:ext cx="1204547" cy="505558"/>
-          </a:xfrm>
-          <a:prstGeom prst="straightConnector1">
-            <a:avLst/>
-          </a:prstGeom>
-          <a:ln>
-            <a:tailEnd type="triangle"/>
-          </a:ln>
-        </p:spPr>
-        <p:style>
-          <a:lnRef idx="1">
-            <a:schemeClr val="dk1"/>
-          </a:lnRef>
-          <a:fillRef idx="0">
-            <a:schemeClr val="dk1"/>
-          </a:fillRef>
-          <a:effectRef idx="0">
-            <a:schemeClr val="dk1"/>
-          </a:effectRef>
-          <a:fontRef idx="minor">
-            <a:schemeClr val="tx1"/>
-          </a:fontRef>
-        </p:style>
-      </p:cxnSp>
-      <p:cxnSp>
-        <p:nvCxnSpPr>
-          <p:cNvPr id="18" name="Straight Arrow Connector 17">
-            <a:extLst>
-              <a:ext uri="{FF2B5EF4-FFF2-40B4-BE49-F238E27FC236}">
-                <a16:creationId xmlns:a16="http://schemas.microsoft.com/office/drawing/2014/main" id="{525CFD5B-EB93-4D2F-B378-4EB04DB453CF}"/>
-              </a:ext>
-            </a:extLst>
-          </p:cNvPr>
-          <p:cNvCxnSpPr>
-            <a:cxnSpLocks/>
-            <a:stCxn id="6" idx="3"/>
-          </p:cNvCxnSpPr>
-          <p:nvPr/>
-        </p:nvCxnSpPr>
-        <p:spPr>
-          <a:xfrm flipV="1">
-            <a:off x="4413738" y="3156439"/>
-            <a:ext cx="1204547" cy="479181"/>
-          </a:xfrm>
-          <a:prstGeom prst="straightConnector1">
-            <a:avLst/>
-          </a:prstGeom>
-          <a:ln>
-            <a:tailEnd type="triangle"/>
-          </a:ln>
-        </p:spPr>
-        <p:style>
-          <a:lnRef idx="1">
-            <a:schemeClr val="dk1"/>
-          </a:lnRef>
-          <a:fillRef idx="0">
-            <a:schemeClr val="dk1"/>
-          </a:fillRef>
-          <a:effectRef idx="0">
-            <a:schemeClr val="dk1"/>
-          </a:effectRef>
-          <a:fontRef idx="minor">
-            <a:schemeClr val="tx1"/>
-          </a:fontRef>
-        </p:style>
-      </p:cxnSp>
-      <p:cxnSp>
-        <p:nvCxnSpPr>
-          <p:cNvPr id="21" name="Straight Arrow Connector 20">
-            <a:extLst>
-              <a:ext uri="{FF2B5EF4-FFF2-40B4-BE49-F238E27FC236}">
-                <a16:creationId xmlns:a16="http://schemas.microsoft.com/office/drawing/2014/main" id="{962671C3-34F6-4C5B-9118-8455B212BC2D}"/>
-              </a:ext>
-            </a:extLst>
-          </p:cNvPr>
-          <p:cNvCxnSpPr>
-            <a:cxnSpLocks/>
-          </p:cNvCxnSpPr>
-          <p:nvPr/>
-        </p:nvCxnSpPr>
-        <p:spPr>
-          <a:xfrm flipV="1">
-            <a:off x="6972300" y="2545373"/>
-            <a:ext cx="1046285" cy="19050"/>
-          </a:xfrm>
-          <a:prstGeom prst="straightConnector1">
-            <a:avLst/>
-          </a:prstGeom>
-          <a:ln>
-            <a:tailEnd type="triangle"/>
-          </a:ln>
-        </p:spPr>
-        <p:style>
-          <a:lnRef idx="1">
-            <a:schemeClr val="dk1"/>
-          </a:lnRef>
-          <a:fillRef idx="0">
-            <a:schemeClr val="dk1"/>
-          </a:fillRef>
-          <a:effectRef idx="0">
-            <a:schemeClr val="dk1"/>
-          </a:effectRef>
-          <a:fontRef idx="minor">
-            <a:schemeClr val="tx1"/>
-          </a:fontRef>
-        </p:style>
-      </p:cxnSp>
-      <p:cxnSp>
-        <p:nvCxnSpPr>
-          <p:cNvPr id="24" name="Straight Arrow Connector 23">
-            <a:extLst>
-              <a:ext uri="{FF2B5EF4-FFF2-40B4-BE49-F238E27FC236}">
-                <a16:creationId xmlns:a16="http://schemas.microsoft.com/office/drawing/2014/main" id="{AD6A3A07-3C81-4583-B24A-F577BBCAEFAB}"/>
-              </a:ext>
-            </a:extLst>
-          </p:cNvPr>
-          <p:cNvCxnSpPr>
-            <a:cxnSpLocks/>
-            <a:stCxn id="9" idx="1"/>
-            <a:endCxn id="8" idx="3"/>
-          </p:cNvCxnSpPr>
-          <p:nvPr/>
-        </p:nvCxnSpPr>
-        <p:spPr>
-          <a:xfrm flipH="1">
-            <a:off x="6972300" y="2765181"/>
-            <a:ext cx="1046285" cy="0"/>
-          </a:xfrm>
-          <a:prstGeom prst="straightConnector1">
-            <a:avLst/>
-          </a:prstGeom>
-          <a:ln>
-            <a:tailEnd type="triangle"/>
-          </a:ln>
-        </p:spPr>
-        <p:style>
-          <a:lnRef idx="1">
-            <a:schemeClr val="dk1"/>
-          </a:lnRef>
-          <a:fillRef idx="0">
-            <a:schemeClr val="dk1"/>
-          </a:fillRef>
-          <a:effectRef idx="0">
-            <a:schemeClr val="dk1"/>
-          </a:effectRef>
-          <a:fontRef idx="minor">
-            <a:schemeClr val="tx1"/>
-          </a:fontRef>
-        </p:style>
-      </p:cxnSp>
-      <p:sp>
-        <p:nvSpPr>
-          <p:cNvPr id="27" name="Arrow: U-Turn 26">
-            <a:extLst>
-              <a:ext uri="{FF2B5EF4-FFF2-40B4-BE49-F238E27FC236}">
-                <a16:creationId xmlns:a16="http://schemas.microsoft.com/office/drawing/2014/main" id="{EAB51DCB-2030-488A-A9D4-7408C0BD58E3}"/>
-              </a:ext>
-            </a:extLst>
-          </p:cNvPr>
-          <p:cNvSpPr/>
-          <p:nvPr/>
-        </p:nvSpPr>
-        <p:spPr>
-          <a:xfrm rot="10800000">
-            <a:off x="465991" y="3241431"/>
-            <a:ext cx="8634045" cy="1176704"/>
-          </a:xfrm>
-          <a:prstGeom prst="uturnArrow">
-            <a:avLst>
-              <a:gd name="adj1" fmla="val 7041"/>
-              <a:gd name="adj2" fmla="val 25000"/>
-              <a:gd name="adj3" fmla="val 18469"/>
-              <a:gd name="adj4" fmla="val 43750"/>
-              <a:gd name="adj5" fmla="val 100000"/>
-            </a:avLst>
-          </a:prstGeom>
-        </p:spPr>
-        <p:style>
-          <a:lnRef idx="2">
-            <a:schemeClr val="accent1">
-              <a:shade val="50000"/>
-            </a:schemeClr>
-          </a:lnRef>
-          <a:fillRef idx="1">
-            <a:schemeClr val="accent1"/>
-          </a:fillRef>
-          <a:effectRef idx="0">
-            <a:schemeClr val="accent1"/>
-          </a:effectRef>
-          <a:fontRef idx="minor">
-            <a:schemeClr val="lt1"/>
-          </a:fontRef>
-        </p:style>
-        <p:txBody>
-          <a:bodyPr rtlCol="0" anchor="ctr"/>
-          <a:lstStyle/>
-          <a:p>
-            <a:pPr algn="ctr"/>
-            <a:endParaRPr lang="en-US">
-              <a:solidFill>
-                <a:schemeClr val="tx1"/>
-              </a:solidFill>
-            </a:endParaRPr>
-          </a:p>
-        </p:txBody>
-      </p:sp>
-      <p:pic>
-        <p:nvPicPr>
-          <p:cNvPr id="29" name="Picture 28" descr="A close up of a logo&#10;&#10;Description generated with high confidence">
-            <a:extLst>
-              <a:ext uri="{FF2B5EF4-FFF2-40B4-BE49-F238E27FC236}">
-                <a16:creationId xmlns:a16="http://schemas.microsoft.com/office/drawing/2014/main" id="{599399AF-69E9-45E4-B9DE-0FA4F2F6C892}"/>
-              </a:ext>
-            </a:extLst>
-          </p:cNvPr>
-          <p:cNvPicPr>
-            <a:picLocks noChangeAspect="1"/>
-          </p:cNvPicPr>
-          <p:nvPr/>
-        </p:nvPicPr>
-        <p:blipFill>
-          <a:blip r:embed="rId2"/>
-          <a:stretch>
-            <a:fillRect/>
-          </a:stretch>
-        </p:blipFill>
-        <p:spPr>
-          <a:xfrm>
-            <a:off x="10413210" y="5153324"/>
-            <a:ext cx="1447532" cy="1447532"/>
-          </a:xfrm>
-          <a:prstGeom prst="rect">
-            <a:avLst/>
-          </a:prstGeom>
-        </p:spPr>
-      </p:pic>
+              <a:t>Has a number of variables to keep track of the passage of time, framerate, screen size, etc. </a:t>
+            </a:r>
+          </a:p>
+          <a:p>
+            <a:r>
+              <a:rPr lang="en-US" dirty="0"/>
+              <a:t>All global information is kept in the Main class. Anything else in the program can reference these variables. </a:t>
+            </a:r>
+          </a:p>
+          <a:p>
+            <a:r>
+              <a:rPr lang="en-US" dirty="0"/>
+              <a:t>Most important variables are the Player and the current Scene. </a:t>
+            </a:r>
+          </a:p>
+          <a:p>
+            <a:r>
+              <a:rPr lang="en-US" dirty="0"/>
+              <a:t>Main class also has a number of input functions (such as </a:t>
+            </a:r>
+            <a:r>
+              <a:rPr lang="en-US" dirty="0" err="1"/>
+              <a:t>KeyPressed</a:t>
+            </a:r>
+            <a:r>
+              <a:rPr lang="en-US" dirty="0"/>
+              <a:t> or </a:t>
+            </a:r>
+            <a:r>
+              <a:rPr lang="en-US" dirty="0" err="1"/>
+              <a:t>MouseClicked</a:t>
+            </a:r>
+            <a:r>
+              <a:rPr lang="en-US" dirty="0"/>
+              <a:t>). These functions automatically call the corresponding function in the current scene </a:t>
+            </a:r>
+          </a:p>
+        </p:txBody>
+      </p:sp>
     </p:spTree>
     <p:extLst>
       <p:ext uri="{BB962C8B-B14F-4D97-AF65-F5344CB8AC3E}">
-        <p14:creationId xmlns:p14="http://schemas.microsoft.com/office/powerpoint/2010/main" val="14325577"/>
+        <p14:creationId xmlns:p14="http://schemas.microsoft.com/office/powerpoint/2010/main" val="405521532"/>
       </p:ext>
     </p:extLst>
   </p:cSld>
@@ -9674,7 +8179,7 @@
           <p:cNvPr id="2" name="Title 1">
             <a:extLst>
               <a:ext uri="{FF2B5EF4-FFF2-40B4-BE49-F238E27FC236}">
-                <a16:creationId xmlns:a16="http://schemas.microsoft.com/office/drawing/2014/main" id="{2D3EF30E-CF36-485C-8A6B-2D0EAF9D90EA}"/>
+                <a16:creationId xmlns:a16="http://schemas.microsoft.com/office/drawing/2014/main" id="{F24FA39B-E526-4521-AFA8-BD42A897257A}"/>
               </a:ext>
             </a:extLst>
           </p:cNvPr>
@@ -9691,12 +8196,8 @@
           <a:lstStyle/>
           <a:p>
             <a:r>
-              <a:rPr lang="en-US" dirty="0">
-                <a:solidFill>
-                  <a:schemeClr val="accent2"/>
-                </a:solidFill>
-              </a:rPr>
-              <a:t>The Main Class</a:t>
+              <a:rPr lang="en-US" dirty="0"/>
+              <a:t>The Scene Class </a:t>
             </a:r>
           </a:p>
         </p:txBody>
@@ -9706,7 +8207,7 @@
           <p:cNvPr id="3" name="Content Placeholder 2">
             <a:extLst>
               <a:ext uri="{FF2B5EF4-FFF2-40B4-BE49-F238E27FC236}">
-                <a16:creationId xmlns:a16="http://schemas.microsoft.com/office/drawing/2014/main" id="{7120DB0F-FB77-4342-B627-FDB5CEB938F2}"/>
+                <a16:creationId xmlns:a16="http://schemas.microsoft.com/office/drawing/2014/main" id="{DFE7D60F-31DB-4988-90E4-9D39903B6336}"/>
               </a:ext>
             </a:extLst>
           </p:cNvPr>
@@ -9717,166 +8218,46 @@
             <p:ph idx="1"/>
           </p:nvPr>
         </p:nvSpPr>
-        <p:spPr>
-          <a:xfrm>
-            <a:off x="677334" y="1411551"/>
-            <a:ext cx="8596668" cy="5446450"/>
-          </a:xfrm>
-        </p:spPr>
+        <p:spPr/>
         <p:txBody>
           <a:bodyPr/>
           <a:lstStyle/>
           <a:p>
             <a:r>
-              <a:rPr lang="en-US" dirty="0">
-                <a:solidFill>
-                  <a:schemeClr val="tx2"/>
-                </a:solidFill>
-              </a:rPr>
-              <a:t>Processing has 2 required functions in the main class – Setup and Draw</a:t>
-            </a:r>
-          </a:p>
-          <a:p>
-            <a:pPr lvl="1"/>
-            <a:r>
-              <a:rPr lang="en-US" dirty="0">
-                <a:solidFill>
-                  <a:schemeClr val="tx2"/>
-                </a:solidFill>
-              </a:rPr>
-              <a:t>Setup initializes all of the global variables and sets the screen dimensions. Gets called once, before anything else happens </a:t>
-            </a:r>
-          </a:p>
-          <a:p>
-            <a:pPr lvl="1"/>
-            <a:r>
-              <a:rPr lang="en-US" dirty="0">
-                <a:solidFill>
-                  <a:schemeClr val="tx2"/>
-                </a:solidFill>
-              </a:rPr>
-              <a:t>The Draw function is the primary game loop. Gets called repeatedly until program is closed</a:t>
-            </a:r>
-          </a:p>
-          <a:p>
-            <a:pPr lvl="2"/>
-            <a:r>
-              <a:rPr lang="en-US" dirty="0">
-                <a:solidFill>
-                  <a:schemeClr val="tx2"/>
-                </a:solidFill>
-              </a:rPr>
-              <a:t>Everything that happens in the game gets called from the Draw function</a:t>
-            </a:r>
-          </a:p>
-          <a:p>
-            <a:r>
-              <a:rPr lang="en-US" dirty="0">
-                <a:solidFill>
-                  <a:schemeClr val="tx2"/>
-                </a:solidFill>
-              </a:rPr>
-              <a:t>Has a number of variables to keep track of the passage of time, framerate, screen size, etc. </a:t>
-            </a:r>
-          </a:p>
-          <a:p>
-            <a:r>
-              <a:rPr lang="en-US" dirty="0">
-                <a:solidFill>
-                  <a:schemeClr val="tx2"/>
-                </a:solidFill>
-              </a:rPr>
-              <a:t>All global information is kept in the Main class. Anything else in the program can reference these variables. </a:t>
-            </a:r>
-          </a:p>
-          <a:p>
-            <a:r>
-              <a:rPr lang="en-US" dirty="0">
-                <a:solidFill>
-                  <a:schemeClr val="tx2"/>
-                </a:solidFill>
-              </a:rPr>
-              <a:t>Most important variables are the Player and the current Scene. </a:t>
-            </a:r>
-          </a:p>
-          <a:p>
-            <a:r>
-              <a:rPr lang="en-US" dirty="0">
-                <a:solidFill>
-                  <a:schemeClr val="tx2"/>
-                </a:solidFill>
-              </a:rPr>
-              <a:t>Main class also has a number of input functions (such as </a:t>
-            </a:r>
-            <a:r>
-              <a:rPr lang="en-US" dirty="0" err="1">
-                <a:solidFill>
-                  <a:schemeClr val="tx2"/>
-                </a:solidFill>
-              </a:rPr>
-              <a:t>KeyPressed</a:t>
-            </a:r>
-            <a:r>
-              <a:rPr lang="en-US" dirty="0">
-                <a:solidFill>
-                  <a:schemeClr val="tx2"/>
-                </a:solidFill>
-              </a:rPr>
-              <a:t> or </a:t>
-            </a:r>
-            <a:r>
-              <a:rPr lang="en-US" dirty="0" err="1">
-                <a:solidFill>
-                  <a:schemeClr val="tx2"/>
-                </a:solidFill>
-              </a:rPr>
-              <a:t>MouseClicked</a:t>
-            </a:r>
-            <a:r>
-              <a:rPr lang="en-US" dirty="0">
-                <a:solidFill>
-                  <a:schemeClr val="tx2"/>
-                </a:solidFill>
-              </a:rPr>
-              <a:t>). These functions automatically call the corresponding function in the current scene </a:t>
-            </a:r>
-          </a:p>
-        </p:txBody>
-      </p:sp>
-      <p:pic>
-        <p:nvPicPr>
-          <p:cNvPr id="5" name="Picture 4" descr="A close up of a logo&#10;&#10;Description generated with high confidence">
-            <a:extLst>
-              <a:ext uri="{FF2B5EF4-FFF2-40B4-BE49-F238E27FC236}">
-                <a16:creationId xmlns:a16="http://schemas.microsoft.com/office/drawing/2014/main" id="{48E3845E-346C-483B-A96D-D71DC06C9CF5}"/>
-              </a:ext>
-            </a:extLst>
-          </p:cNvPr>
-          <p:cNvPicPr>
-            <a:picLocks noChangeAspect="1"/>
-          </p:cNvPicPr>
-          <p:nvPr/>
-        </p:nvPicPr>
-        <p:blipFill>
-          <a:blip r:embed="rId2"/>
-          <a:stretch>
-            <a:fillRect/>
-          </a:stretch>
-        </p:blipFill>
-        <p:spPr>
-          <a:xfrm>
-            <a:off x="10413210" y="5153324"/>
-            <a:ext cx="1447532" cy="1447532"/>
-          </a:xfrm>
-          <a:prstGeom prst="rect">
-            <a:avLst/>
-          </a:prstGeom>
-        </p:spPr>
-      </p:pic>
+              <a:rPr lang="en-US" dirty="0"/>
+              <a:t>The scene class does the majority of the actual drawing, as well as input and output</a:t>
+            </a:r>
+          </a:p>
+          <a:p>
+            <a:r>
+              <a:rPr lang="en-US" dirty="0"/>
+              <a:t>All input actions automatically trigger in the Main class, which call this class to actually handle the input </a:t>
+            </a:r>
+          </a:p>
+          <a:p>
+            <a:r>
+              <a:rPr lang="en-US" dirty="0"/>
+              <a:t>Various different scenes for different purposes – Map scene for moving across map, menu scenes, skill tree scene, and the actual primary gameplay scenes.</a:t>
+            </a:r>
+          </a:p>
+          <a:p>
+            <a:r>
+              <a:rPr lang="en-US" dirty="0"/>
+              <a:t>Only one scene is active at a time, when a new action takes place a new scene is loaded. </a:t>
+            </a:r>
+          </a:p>
+          <a:p>
+            <a:r>
+              <a:rPr lang="en-US" dirty="0"/>
+              <a:t>All information in a given scene is local and temporary, and gets lost when a new scene is loaded </a:t>
+            </a:r>
+          </a:p>
+        </p:txBody>
+      </p:sp>
     </p:spTree>
     <p:extLst>
       <p:ext uri="{BB962C8B-B14F-4D97-AF65-F5344CB8AC3E}">
-        <p14:creationId xmlns:p14="http://schemas.microsoft.com/office/powerpoint/2010/main" val="405521532"/>
+        <p14:creationId xmlns:p14="http://schemas.microsoft.com/office/powerpoint/2010/main" val="2133012138"/>
       </p:ext>
     </p:extLst>
   </p:cSld>
@@ -9908,7 +8289,7 @@
           <p:cNvPr id="2" name="Title 1">
             <a:extLst>
               <a:ext uri="{FF2B5EF4-FFF2-40B4-BE49-F238E27FC236}">
-                <a16:creationId xmlns:a16="http://schemas.microsoft.com/office/drawing/2014/main" id="{F24FA39B-E526-4521-AFA8-BD42A897257A}"/>
+                <a16:creationId xmlns:a16="http://schemas.microsoft.com/office/drawing/2014/main" id="{8CF1AC6D-2DFE-4F7C-900D-B6C36DDC4536}"/>
               </a:ext>
             </a:extLst>
           </p:cNvPr>
@@ -9925,12 +8306,8 @@
           <a:lstStyle/>
           <a:p>
             <a:r>
-              <a:rPr lang="en-US" dirty="0">
-                <a:solidFill>
-                  <a:schemeClr val="accent2"/>
-                </a:solidFill>
-              </a:rPr>
-              <a:t>The Scene Class </a:t>
+              <a:rPr lang="en-US" dirty="0"/>
+              <a:t>The Game Scene</a:t>
             </a:r>
           </a:p>
         </p:txBody>
@@ -9940,7 +8317,7 @@
           <p:cNvPr id="3" name="Content Placeholder 2">
             <a:extLst>
               <a:ext uri="{FF2B5EF4-FFF2-40B4-BE49-F238E27FC236}">
-                <a16:creationId xmlns:a16="http://schemas.microsoft.com/office/drawing/2014/main" id="{DFE7D60F-31DB-4988-90E4-9D39903B6336}"/>
+                <a16:creationId xmlns:a16="http://schemas.microsoft.com/office/drawing/2014/main" id="{4172CAE2-EEE6-440B-8946-66F777D23A32}"/>
               </a:ext>
             </a:extLst>
           </p:cNvPr>
@@ -9957,90 +8334,48 @@
           <a:lstStyle/>
           <a:p>
             <a:r>
-              <a:rPr lang="en-US" dirty="0">
-                <a:solidFill>
-                  <a:schemeClr val="tx2"/>
-                </a:solidFill>
-              </a:rPr>
-              <a:t>The scene class does the majority of the actual drawing, as well as input and output</a:t>
-            </a:r>
-          </a:p>
-          <a:p>
-            <a:r>
-              <a:rPr lang="en-US" dirty="0">
-                <a:solidFill>
-                  <a:schemeClr val="tx2"/>
-                </a:solidFill>
-              </a:rPr>
-              <a:t>All input actions automatically trigger in the Main class, which call this class to actually handle the input </a:t>
-            </a:r>
-          </a:p>
-          <a:p>
-            <a:r>
-              <a:rPr lang="en-US" dirty="0">
-                <a:solidFill>
-                  <a:schemeClr val="tx2"/>
-                </a:solidFill>
-              </a:rPr>
-              <a:t>Various different scenes for different purposes – Map scene for moving across map, menu scenes, and the actual primary gameplay scenes.</a:t>
-            </a:r>
-          </a:p>
-          <a:p>
-            <a:r>
-              <a:rPr lang="en-US" dirty="0">
-                <a:solidFill>
-                  <a:schemeClr val="tx2"/>
-                </a:solidFill>
-              </a:rPr>
-              <a:t>Only one scene is active at a time, when a new action takes place a new scene is loaded. </a:t>
-            </a:r>
-          </a:p>
-          <a:p>
-            <a:r>
-              <a:rPr lang="en-US" dirty="0">
-                <a:solidFill>
-                  <a:schemeClr val="tx2"/>
-                </a:solidFill>
-              </a:rPr>
-              <a:t>All information in a given scene is local and temporary, and gets lost when a new scene is loaded </a:t>
-            </a:r>
-          </a:p>
-        </p:txBody>
-      </p:sp>
-      <p:pic>
-        <p:nvPicPr>
-          <p:cNvPr id="4" name="Picture 3" descr="A close up of a logo&#10;&#10;Description generated with high confidence">
-            <a:extLst>
-              <a:ext uri="{FF2B5EF4-FFF2-40B4-BE49-F238E27FC236}">
-                <a16:creationId xmlns:a16="http://schemas.microsoft.com/office/drawing/2014/main" id="{D65F6FFF-FFDA-46D8-B40E-EDA4CF53DB4D}"/>
-              </a:ext>
-            </a:extLst>
-          </p:cNvPr>
-          <p:cNvPicPr>
-            <a:picLocks noChangeAspect="1"/>
-          </p:cNvPicPr>
-          <p:nvPr/>
-        </p:nvPicPr>
-        <p:blipFill>
-          <a:blip r:embed="rId2"/>
-          <a:stretch>
-            <a:fillRect/>
-          </a:stretch>
-        </p:blipFill>
-        <p:spPr>
-          <a:xfrm>
-            <a:off x="10413210" y="5153324"/>
-            <a:ext cx="1447532" cy="1447532"/>
-          </a:xfrm>
-          <a:prstGeom prst="rect">
-            <a:avLst/>
-          </a:prstGeom>
-        </p:spPr>
-      </p:pic>
+              <a:rPr lang="en-US" dirty="0"/>
+              <a:t>The majority of the actual gameplay takes place in this scene. </a:t>
+            </a:r>
+          </a:p>
+          <a:p>
+            <a:r>
+              <a:rPr lang="en-US" dirty="0"/>
+              <a:t>The top of the screen is reserved for drawing the characters and enemies. Players should be able to watch the battle happen, reflecting their actions on the bottom of the screen. </a:t>
+            </a:r>
+          </a:p>
+          <a:p>
+            <a:r>
+              <a:rPr lang="en-US" dirty="0"/>
+              <a:t>The bottom half of the screen is where gameplay takes place</a:t>
+            </a:r>
+          </a:p>
+          <a:p>
+            <a:r>
+              <a:rPr lang="en-US" dirty="0"/>
+              <a:t>Every time the draw loop is called, the “</a:t>
+            </a:r>
+            <a:r>
+              <a:rPr lang="en-US" dirty="0" err="1"/>
+              <a:t>DrawScene</a:t>
+            </a:r>
+            <a:r>
+              <a:rPr lang="en-US" dirty="0"/>
+              <a:t>” function is called. This draws all of the health and energy bars, the characters, as well as the runes.</a:t>
+            </a:r>
+          </a:p>
+          <a:p>
+            <a:r>
+              <a:rPr lang="en-US" dirty="0"/>
+              <a:t>Eventually the game scene will have its own subclasses for different levels. Currently have 2 game scenes – one for the regular levels, and one for the Boss level.  </a:t>
+            </a:r>
+          </a:p>
+        </p:txBody>
+      </p:sp>
     </p:spTree>
     <p:extLst>
       <p:ext uri="{BB962C8B-B14F-4D97-AF65-F5344CB8AC3E}">
-        <p14:creationId xmlns:p14="http://schemas.microsoft.com/office/powerpoint/2010/main" val="2133012138"/>
+        <p14:creationId xmlns:p14="http://schemas.microsoft.com/office/powerpoint/2010/main" val="4259955254"/>
       </p:ext>
     </p:extLst>
   </p:cSld>
@@ -10053,42 +8388,42 @@
 <file path=ppt/theme/theme1.xml><?xml version="1.0" encoding="utf-8"?>
 <a:theme xmlns:a="http://schemas.openxmlformats.org/drawingml/2006/main" name="Facet">
   <a:themeElements>
-    <a:clrScheme name="Custom 2">
+    <a:clrScheme name="Facet">
       <a:dk1>
-        <a:srgbClr val="28A47C"/>
+        <a:sysClr val="windowText" lastClr="000000"/>
       </a:dk1>
       <a:lt1>
-        <a:srgbClr val="EDF6F9"/>
+        <a:sysClr val="window" lastClr="FFFFFF"/>
       </a:lt1>
       <a:dk2>
-        <a:srgbClr val="2E946B"/>
+        <a:srgbClr val="2C3C43"/>
       </a:dk2>
       <a:lt2>
-        <a:srgbClr val="D8F5FA"/>
+        <a:srgbClr val="EBEBEB"/>
       </a:lt2>
       <a:accent1>
-        <a:srgbClr val="28A47C"/>
+        <a:srgbClr val="90C226"/>
       </a:accent1>
       <a:accent2>
-        <a:srgbClr val="F7A511"/>
+        <a:srgbClr val="54A021"/>
       </a:accent2>
       <a:accent3>
-        <a:srgbClr val="2E946B"/>
+        <a:srgbClr val="E6B91E"/>
       </a:accent3>
       <a:accent4>
-        <a:srgbClr val="42D0A2"/>
+        <a:srgbClr val="E76618"/>
       </a:accent4>
       <a:accent5>
-        <a:srgbClr val="3FCDE7"/>
+        <a:srgbClr val="C42F1A"/>
       </a:accent5>
       <a:accent6>
-        <a:srgbClr val="A9D3E1"/>
+        <a:srgbClr val="918655"/>
       </a:accent6>
       <a:hlink>
-        <a:srgbClr val="EDF6F9"/>
+        <a:srgbClr val="99CA3C"/>
       </a:hlink>
       <a:folHlink>
-        <a:srgbClr val="A9D3E1"/>
+        <a:srgbClr val="B9D181"/>
       </a:folHlink>
     </a:clrScheme>
     <a:fontScheme name="Facet">
@@ -10301,7 +8636,7 @@
   <a:extraClrSchemeLst/>
   <a:extLst>
     <a:ext uri="{05A4C25C-085E-4340-85A3-A5531E510DB2}">
-      <thm15:themeFamily xmlns:thm15="http://schemas.microsoft.com/office/thememl/2012/main" name="Facet" id="{C0C680CD-088A-49FC-A102-D699147F32B2}" vid="{0B5AB586-D108-4FC1-8368-649FE654B894}"/>
+      <thm15:themeFamily xmlns:thm15="http://schemas.microsoft.com/office/thememl/2012/main" name="Facet" id="{C0C680CD-088A-49FC-A102-D699147F32B2}" vid="{CFBC31BA-B70F-4F30-BCAA-4F3011E16C4D}"/>
     </a:ext>
   </a:extLst>
 </a:theme>

</xml_diff>